<commit_message>
[FONTSIZE] Added font size documentation in developer docs
</commit_message>
<xml_diff>
--- a/docs/diagrams/FontSizeCommandDiagrams.pptx
+++ b/docs/diagrams/FontSizeCommandDiagrams.pptx
@@ -198,7 +198,7 @@
           <a:p>
             <a:fld id="{756A9B74-E80F-5C4E-A7DD-E49C20F7C5ED}" type="datetimeFigureOut">
               <a:rPr lang="en-US" smtClean="0"/>
-              <a:t>11/1/17</a:t>
+              <a:t>11/4/17</a:t>
             </a:fld>
             <a:endParaRPr lang="en-US"/>
           </a:p>
@@ -597,7 +597,7 @@
           <a:p>
             <a:fld id="{4C707D6F-0D04-EC44-A702-F7C7F0C5C2B0}" type="datetimeFigureOut">
               <a:rPr lang="en-US" smtClean="0"/>
-              <a:t>11/1/17</a:t>
+              <a:t>11/4/17</a:t>
             </a:fld>
             <a:endParaRPr lang="en-US"/>
           </a:p>
@@ -762,7 +762,7 @@
           <a:p>
             <a:fld id="{4C707D6F-0D04-EC44-A702-F7C7F0C5C2B0}" type="datetimeFigureOut">
               <a:rPr lang="en-US" smtClean="0"/>
-              <a:t>11/1/17</a:t>
+              <a:t>11/4/17</a:t>
             </a:fld>
             <a:endParaRPr lang="en-US"/>
           </a:p>
@@ -937,7 +937,7 @@
           <a:p>
             <a:fld id="{4C707D6F-0D04-EC44-A702-F7C7F0C5C2B0}" type="datetimeFigureOut">
               <a:rPr lang="en-US" smtClean="0"/>
-              <a:t>11/1/17</a:t>
+              <a:t>11/4/17</a:t>
             </a:fld>
             <a:endParaRPr lang="en-US"/>
           </a:p>
@@ -1102,7 +1102,7 @@
           <a:p>
             <a:fld id="{4C707D6F-0D04-EC44-A702-F7C7F0C5C2B0}" type="datetimeFigureOut">
               <a:rPr lang="en-US" smtClean="0"/>
-              <a:t>11/1/17</a:t>
+              <a:t>11/4/17</a:t>
             </a:fld>
             <a:endParaRPr lang="en-US"/>
           </a:p>
@@ -1343,7 +1343,7 @@
           <a:p>
             <a:fld id="{4C707D6F-0D04-EC44-A702-F7C7F0C5C2B0}" type="datetimeFigureOut">
               <a:rPr lang="en-US" smtClean="0"/>
-              <a:t>11/1/17</a:t>
+              <a:t>11/4/17</a:t>
             </a:fld>
             <a:endParaRPr lang="en-US"/>
           </a:p>
@@ -1570,7 +1570,7 @@
           <a:p>
             <a:fld id="{4C707D6F-0D04-EC44-A702-F7C7F0C5C2B0}" type="datetimeFigureOut">
               <a:rPr lang="en-US" smtClean="0"/>
-              <a:t>11/1/17</a:t>
+              <a:t>11/4/17</a:t>
             </a:fld>
             <a:endParaRPr lang="en-US"/>
           </a:p>
@@ -1932,7 +1932,7 @@
           <a:p>
             <a:fld id="{4C707D6F-0D04-EC44-A702-F7C7F0C5C2B0}" type="datetimeFigureOut">
               <a:rPr lang="en-US" smtClean="0"/>
-              <a:t>11/1/17</a:t>
+              <a:t>11/4/17</a:t>
             </a:fld>
             <a:endParaRPr lang="en-US"/>
           </a:p>
@@ -2045,7 +2045,7 @@
           <a:p>
             <a:fld id="{4C707D6F-0D04-EC44-A702-F7C7F0C5C2B0}" type="datetimeFigureOut">
               <a:rPr lang="en-US" smtClean="0"/>
-              <a:t>11/1/17</a:t>
+              <a:t>11/4/17</a:t>
             </a:fld>
             <a:endParaRPr lang="en-US"/>
           </a:p>
@@ -2135,7 +2135,7 @@
           <a:p>
             <a:fld id="{4C707D6F-0D04-EC44-A702-F7C7F0C5C2B0}" type="datetimeFigureOut">
               <a:rPr lang="en-US" smtClean="0"/>
-              <a:t>11/1/17</a:t>
+              <a:t>11/4/17</a:t>
             </a:fld>
             <a:endParaRPr lang="en-US"/>
           </a:p>
@@ -2407,7 +2407,7 @@
           <a:p>
             <a:fld id="{4C707D6F-0D04-EC44-A702-F7C7F0C5C2B0}" type="datetimeFigureOut">
               <a:rPr lang="en-US" smtClean="0"/>
-              <a:t>11/1/17</a:t>
+              <a:t>11/4/17</a:t>
             </a:fld>
             <a:endParaRPr lang="en-US"/>
           </a:p>
@@ -2659,7 +2659,7 @@
           <a:p>
             <a:fld id="{4C707D6F-0D04-EC44-A702-F7C7F0C5C2B0}" type="datetimeFigureOut">
               <a:rPr lang="en-US" smtClean="0"/>
-              <a:t>11/1/17</a:t>
+              <a:t>11/4/17</a:t>
             </a:fld>
             <a:endParaRPr lang="en-US"/>
           </a:p>
@@ -2867,7 +2867,7 @@
           <a:p>
             <a:fld id="{4C707D6F-0D04-EC44-A702-F7C7F0C5C2B0}" type="datetimeFigureOut">
               <a:rPr lang="en-US" smtClean="0"/>
-              <a:t>11/1/17</a:t>
+              <a:t>11/4/17</a:t>
             </a:fld>
             <a:endParaRPr lang="en-US"/>
           </a:p>
@@ -3281,7 +3281,7 @@
         <p:spPr>
           <a:xfrm>
             <a:off x="474133" y="395111"/>
-            <a:ext cx="10905067" cy="6197600"/>
+            <a:ext cx="7621355" cy="5883769"/>
           </a:xfrm>
           <a:prstGeom prst="rect">
             <a:avLst/>
@@ -3306,7 +3306,7 @@
           <a:lstStyle/>
           <a:p>
             <a:pPr algn="ctr"/>
-            <a:endParaRPr lang="en-US"/>
+            <a:endParaRPr lang="en-US" sz="1200"/>
           </a:p>
         </p:txBody>
       </p:sp>
@@ -3319,14 +3319,14 @@
           <p:nvPr>
             <p:extLst>
               <p:ext uri="{D42A27DB-BD31-4B8C-83A1-F6EECF244321}">
-                <p14:modId xmlns:p14="http://schemas.microsoft.com/office/powerpoint/2010/main" val="760110057"/>
+                <p14:modId xmlns:p14="http://schemas.microsoft.com/office/powerpoint/2010/main" val="1237572775"/>
               </p:ext>
             </p:extLst>
           </p:nvPr>
         </p:nvGraphicFramePr>
         <p:xfrm>
-          <a:off x="4275945" y="1797630"/>
-          <a:ext cx="1668652" cy="1651000"/>
+          <a:off x="1472897" y="4705987"/>
+          <a:ext cx="2123204" cy="1259840"/>
         </p:xfrm>
         <a:graphic>
           <a:graphicData uri="http://schemas.openxmlformats.org/drawingml/2006/table">
@@ -3335,7 +3335,7 @@
                 <a:tableStyleId>{073A0DAA-6AF3-43AB-8588-CEC1D06C72B9}</a:tableStyleId>
               </a:tblPr>
               <a:tblGrid>
-                <a:gridCol w="1668652"/>
+                <a:gridCol w="2123204"/>
               </a:tblGrid>
               <a:tr h="370840">
                 <a:tc>
@@ -3345,10 +3345,10 @@
                     <a:p>
                       <a:pPr algn="just"/>
                       <a:r>
-                        <a:rPr lang="en-US" dirty="0" err="1" smtClean="0"/>
-                        <a:t>SortCommand</a:t>
-                      </a:r>
-                      <a:endParaRPr lang="en-US" dirty="0"/>
+                        <a:rPr lang="en-US" sz="1400" dirty="0" err="1" smtClean="0"/>
+                        <a:t>PersonCard</a:t>
+                      </a:r>
+                      <a:endParaRPr lang="en-US" sz="1400" dirty="0"/>
                     </a:p>
                   </a:txBody>
                   <a:tcPr/>
@@ -3360,30 +3360,15 @@
                     <a:bodyPr/>
                     <a:lstStyle/>
                     <a:p>
-                      <a:pPr marL="0" indent="0" algn="just">
+                      <a:pPr marL="0" indent="0" algn="ctr">
                         <a:buFontTx/>
                         <a:buNone/>
                       </a:pPr>
                       <a:r>
-                        <a:rPr lang="en-US" dirty="0" smtClean="0"/>
-                        <a:t>- field:</a:t>
-                      </a:r>
-                      <a:r>
-                        <a:rPr lang="en-US" baseline="0" dirty="0" smtClean="0"/>
-                        <a:t> String</a:t>
-                      </a:r>
-                      <a:endParaRPr lang="en-US" dirty="0" smtClean="0"/>
-                    </a:p>
-                    <a:p>
-                      <a:pPr marL="0" indent="0" algn="just">
-                        <a:buFontTx/>
-                        <a:buNone/>
-                      </a:pPr>
-                      <a:r>
-                        <a:rPr lang="en-US" dirty="0" smtClean="0"/>
-                        <a:t>- order: String</a:t>
-                      </a:r>
-                      <a:endParaRPr lang="en-US" dirty="0"/>
+                        <a:rPr lang="mr-IN" sz="1400" dirty="0" smtClean="0"/>
+                        <a:t>…</a:t>
+                      </a:r>
+                      <a:endParaRPr lang="en-US" sz="1400" dirty="0"/>
                     </a:p>
                   </a:txBody>
                   <a:tcPr/>
@@ -3397,33 +3382,25 @@
                     <a:p>
                       <a:pPr algn="just"/>
                       <a:r>
-                        <a:rPr lang="en-US" dirty="0" smtClean="0"/>
+                        <a:rPr lang="en-US" sz="1400" dirty="0" smtClean="0"/>
                         <a:t>+ </a:t>
                       </a:r>
                       <a:r>
-                        <a:rPr lang="en-US" dirty="0" err="1" smtClean="0"/>
-                        <a:t>getField</a:t>
-                      </a:r>
-                      <a:r>
-                        <a:rPr lang="en-US" dirty="0" smtClean="0"/>
+                        <a:rPr lang="en-US" sz="1400" dirty="0" err="1" smtClean="0"/>
+                        <a:t>updateAttributeSizes</a:t>
+                      </a:r>
+                      <a:r>
+                        <a:rPr lang="en-US" sz="1400" dirty="0" smtClean="0"/>
                         <a:t>()</a:t>
                       </a:r>
                     </a:p>
                     <a:p>
-                      <a:pPr algn="just"/>
-                      <a:r>
-                        <a:rPr lang="en-US" dirty="0" smtClean="0"/>
-                        <a:t>+ </a:t>
-                      </a:r>
-                      <a:r>
-                        <a:rPr lang="en-US" dirty="0" err="1" smtClean="0"/>
-                        <a:t>getOrder</a:t>
-                      </a:r>
-                      <a:r>
-                        <a:rPr lang="en-US" dirty="0" smtClean="0"/>
-                        <a:t>()</a:t>
-                      </a:r>
-                      <a:endParaRPr lang="en-US" dirty="0"/>
+                      <a:pPr algn="ctr"/>
+                      <a:r>
+                        <a:rPr lang="mr-IN" sz="1400" dirty="0" smtClean="0"/>
+                        <a:t>…</a:t>
+                      </a:r>
+                      <a:endParaRPr lang="en-US" sz="1400" dirty="0"/>
                     </a:p>
                   </a:txBody>
                   <a:tcPr/>
@@ -3435,21 +3412,21 @@
       </p:graphicFrame>
       <p:graphicFrame>
         <p:nvGraphicFramePr>
-          <p:cNvPr id="18" name="Table 17"/>
+          <p:cNvPr id="22" name="Table 21"/>
           <p:cNvGraphicFramePr>
             <a:graphicFrameLocks noGrp="1"/>
           </p:cNvGraphicFramePr>
           <p:nvPr>
             <p:extLst>
               <p:ext uri="{D42A27DB-BD31-4B8C-83A1-F6EECF244321}">
-                <p14:modId xmlns:p14="http://schemas.microsoft.com/office/powerpoint/2010/main" val="988370686"/>
+                <p14:modId xmlns:p14="http://schemas.microsoft.com/office/powerpoint/2010/main" val="251057287"/>
               </p:ext>
             </p:extLst>
           </p:nvPr>
         </p:nvGraphicFramePr>
         <p:xfrm>
-          <a:off x="1312031" y="4175127"/>
-          <a:ext cx="2284070" cy="741680"/>
+          <a:off x="1312031" y="2623130"/>
+          <a:ext cx="2284070" cy="1473200"/>
         </p:xfrm>
         <a:graphic>
           <a:graphicData uri="http://schemas.openxmlformats.org/drawingml/2006/table">
@@ -3469,7 +3446,7 @@
                       <a:pPr algn="just"/>
                       <a:r>
                         <a:rPr lang="en-US" sz="1600" dirty="0" err="1" smtClean="0"/>
-                        <a:t>SortCommandParser</a:t>
+                        <a:t>PersonListPanel</a:t>
                       </a:r>
                       <a:endParaRPr lang="en-US" sz="1600" dirty="0"/>
                     </a:p>
@@ -3483,134 +3460,12 @@
                     <a:bodyPr/>
                     <a:lstStyle/>
                     <a:p>
-                      <a:pPr algn="just"/>
-                      <a:r>
-                        <a:rPr lang="en-US" dirty="0" smtClean="0"/>
-                        <a:t>+ parse(String</a:t>
-                      </a:r>
-                      <a:r>
-                        <a:rPr lang="en-US" baseline="0" dirty="0" smtClean="0"/>
-                        <a:t> </a:t>
-                      </a:r>
-                      <a:r>
-                        <a:rPr lang="en-US" baseline="0" dirty="0" err="1" smtClean="0"/>
-                        <a:t>args</a:t>
-                      </a:r>
-                      <a:r>
-                        <a:rPr lang="en-US" baseline="0" dirty="0" smtClean="0"/>
-                        <a:t>)</a:t>
+                      <a:pPr algn="ctr"/>
+                      <a:r>
+                        <a:rPr lang="mr-IN" dirty="0" smtClean="0"/>
+                        <a:t>…</a:t>
                       </a:r>
                       <a:endParaRPr lang="en-US" dirty="0"/>
-                    </a:p>
-                  </a:txBody>
-                  <a:tcPr/>
-                </a:tc>
-              </a:tr>
-            </a:tbl>
-          </a:graphicData>
-        </a:graphic>
-      </p:graphicFrame>
-      <p:graphicFrame>
-        <p:nvGraphicFramePr>
-          <p:cNvPr id="19" name="Table 18"/>
-          <p:cNvGraphicFramePr>
-            <a:graphicFrameLocks noGrp="1"/>
-          </p:cNvGraphicFramePr>
-          <p:nvPr>
-            <p:extLst>
-              <p:ext uri="{D42A27DB-BD31-4B8C-83A1-F6EECF244321}">
-                <p14:modId xmlns:p14="http://schemas.microsoft.com/office/powerpoint/2010/main" val="1936995643"/>
-              </p:ext>
-            </p:extLst>
-          </p:nvPr>
-        </p:nvGraphicFramePr>
-        <p:xfrm>
-          <a:off x="6641965" y="1137541"/>
-          <a:ext cx="4462204" cy="2733154"/>
-        </p:xfrm>
-        <a:graphic>
-          <a:graphicData uri="http://schemas.openxmlformats.org/drawingml/2006/table">
-            <a:tbl>
-              <a:tblPr firstRow="1" bandRow="1">
-                <a:tableStyleId>{073A0DAA-6AF3-43AB-8588-CEC1D06C72B9}</a:tableStyleId>
-              </a:tblPr>
-              <a:tblGrid>
-                <a:gridCol w="4462204"/>
-              </a:tblGrid>
-              <a:tr h="355714">
-                <a:tc>
-                  <a:txBody>
-                    <a:bodyPr/>
-                    <a:lstStyle/>
-                    <a:p>
-                      <a:pPr algn="just"/>
-                      <a:r>
-                        <a:rPr lang="en-US" sz="1600" dirty="0" err="1" smtClean="0"/>
-                        <a:t>AddressBook</a:t>
-                      </a:r>
-                      <a:endParaRPr lang="en-US" sz="1600" dirty="0"/>
-                    </a:p>
-                  </a:txBody>
-                  <a:tcPr/>
-                </a:tc>
-              </a:tr>
-              <a:tr h="370840">
-                <a:tc>
-                  <a:txBody>
-                    <a:bodyPr/>
-                    <a:lstStyle/>
-                    <a:p>
-                      <a:pPr marL="0" indent="0" algn="just">
-                        <a:buFontTx/>
-                        <a:buNone/>
-                      </a:pPr>
-                      <a:r>
-                        <a:rPr lang="en-US" sz="1600" dirty="0" smtClean="0"/>
-                        <a:t>- persons: </a:t>
-                      </a:r>
-                      <a:r>
-                        <a:rPr lang="en-US" sz="1600" dirty="0" err="1" smtClean="0"/>
-                        <a:t>UniquePersonList</a:t>
-                      </a:r>
-                      <a:endParaRPr lang="en-US" sz="1600" dirty="0" smtClean="0"/>
-                    </a:p>
-                    <a:p>
-                      <a:pPr marL="0" indent="0" algn="just">
-                        <a:buFontTx/>
-                        <a:buNone/>
-                      </a:pPr>
-                      <a:r>
-                        <a:rPr lang="en-US" sz="1600" dirty="0" smtClean="0"/>
-                        <a:t>- tags:</a:t>
-                      </a:r>
-                      <a:r>
-                        <a:rPr lang="en-US" sz="1600" baseline="0" dirty="0" smtClean="0"/>
-                        <a:t> </a:t>
-                      </a:r>
-                      <a:r>
-                        <a:rPr lang="en-US" sz="1600" baseline="0" dirty="0" err="1" smtClean="0"/>
-                        <a:t>UniqueTagList</a:t>
-                      </a:r>
-                      <a:endParaRPr lang="en-US" sz="1600" baseline="0" dirty="0" smtClean="0"/>
-                    </a:p>
-                    <a:p>
-                      <a:pPr marL="0" indent="0" algn="just">
-                        <a:buFontTx/>
-                        <a:buNone/>
-                      </a:pPr>
-                      <a:r>
-                        <a:rPr lang="en-US" sz="1600" dirty="0" smtClean="0"/>
-                        <a:t>- tasks:</a:t>
-                      </a:r>
-                      <a:r>
-                        <a:rPr lang="en-US" sz="1600" baseline="0" dirty="0" smtClean="0"/>
-                        <a:t> </a:t>
-                      </a:r>
-                      <a:r>
-                        <a:rPr lang="en-US" sz="1600" baseline="0" dirty="0" err="1" smtClean="0"/>
-                        <a:t>UniqueTasksList</a:t>
-                      </a:r>
-                      <a:endParaRPr lang="en-US" sz="1600" dirty="0"/>
                     </a:p>
                   </a:txBody>
                   <a:tcPr/>
@@ -3624,127 +3479,42 @@
                     <a:p>
                       <a:pPr algn="just"/>
                       <a:r>
-                        <a:rPr lang="en-US" sz="1600" dirty="0" smtClean="0"/>
-                        <a:t>+ parse(String</a:t>
-                      </a:r>
-                      <a:r>
-                        <a:rPr lang="en-US" sz="1600" baseline="0" dirty="0" smtClean="0"/>
+                        <a:rPr lang="en-US" sz="1400" dirty="0" smtClean="0"/>
+                        <a:t>+</a:t>
+                      </a:r>
+                      <a:r>
+                        <a:rPr lang="en-US" sz="1400" baseline="0" dirty="0" smtClean="0"/>
                         <a:t> </a:t>
                       </a:r>
                       <a:r>
-                        <a:rPr lang="en-US" sz="1600" baseline="0" dirty="0" err="1" smtClean="0"/>
-                        <a:t>args</a:t>
-                      </a:r>
-                      <a:r>
-                        <a:rPr lang="en-US" sz="1600" baseline="0" dirty="0" smtClean="0"/>
-                        <a:t>)</a:t>
-                      </a:r>
+                        <a:rPr lang="en-US" sz="1400" baseline="0" dirty="0" err="1" smtClean="0"/>
+                        <a:t>increaseFontSize</a:t>
+                      </a:r>
+                      <a:endParaRPr lang="en-US" sz="1400" baseline="0" dirty="0" smtClean="0"/>
                     </a:p>
                     <a:p>
                       <a:pPr algn="just"/>
                       <a:r>
-                        <a:rPr lang="en-US" sz="1600" baseline="0" dirty="0" smtClean="0"/>
+                        <a:rPr lang="en-US" sz="1400" baseline="0" dirty="0" smtClean="0"/>
                         <a:t>+ </a:t>
                       </a:r>
                       <a:r>
-                        <a:rPr lang="en-US" sz="1600" baseline="0" dirty="0" err="1" smtClean="0"/>
-                        <a:t>setPersons</a:t>
-                      </a:r>
-                      <a:r>
-                        <a:rPr lang="en-US" sz="1600" baseline="0" dirty="0" smtClean="0"/>
-                        <a:t>(List&lt;</a:t>
-                      </a:r>
-                      <a:r>
-                        <a:rPr lang="en-US" sz="1600" baseline="0" dirty="0" err="1" smtClean="0"/>
-                        <a:t>ReadOnlyPerson</a:t>
-                      </a:r>
-                      <a:r>
-                        <a:rPr lang="en-US" sz="1600" baseline="0" dirty="0" smtClean="0"/>
-                        <a:t>&gt; persons)</a:t>
-                      </a:r>
+                        <a:rPr lang="en-US" sz="1400" baseline="0" dirty="0" err="1" smtClean="0"/>
+                        <a:t>decreaseFontSize</a:t>
+                      </a:r>
+                      <a:endParaRPr lang="en-US" sz="1400" baseline="0" dirty="0" smtClean="0"/>
                     </a:p>
                     <a:p>
                       <a:pPr algn="just"/>
                       <a:r>
-                        <a:rPr lang="en-US" sz="1600" baseline="0" dirty="0" smtClean="0"/>
+                        <a:rPr lang="en-US" sz="1400" baseline="0" dirty="0" smtClean="0"/>
                         <a:t>+ </a:t>
                       </a:r>
                       <a:r>
-                        <a:rPr lang="en-US" sz="1600" kern="1200" dirty="0" err="1" smtClean="0">
-                          <a:effectLst/>
-                        </a:rPr>
-                        <a:t>setTags</a:t>
-                      </a:r>
-                      <a:r>
-                        <a:rPr lang="en-US" sz="1600" dirty="0" smtClean="0"/>
-                        <a:t>(Set&lt;Tag&gt; tags)</a:t>
-                      </a:r>
-                    </a:p>
-                    <a:p>
-                      <a:pPr algn="just"/>
-                      <a:r>
-                        <a:rPr lang="en-US" sz="1600" dirty="0" smtClean="0"/>
-                        <a:t>+ </a:t>
-                      </a:r>
-                      <a:r>
-                        <a:rPr lang="en-US" sz="1600" kern="1200" dirty="0" err="1" smtClean="0">
-                          <a:effectLst/>
-                        </a:rPr>
-                        <a:t>resetData</a:t>
-                      </a:r>
-                      <a:r>
-                        <a:rPr lang="en-US" sz="1600" dirty="0" smtClean="0"/>
-                        <a:t>(</a:t>
-                      </a:r>
-                      <a:r>
-                        <a:rPr lang="en-US" sz="1600" dirty="0" err="1" smtClean="0"/>
-                        <a:t>ReadOnlyAddressBook</a:t>
-                      </a:r>
-                      <a:r>
-                        <a:rPr lang="en-US" sz="1600" dirty="0" smtClean="0"/>
-                        <a:t> </a:t>
-                      </a:r>
-                      <a:r>
-                        <a:rPr lang="en-US" sz="1600" dirty="0" err="1" smtClean="0"/>
-                        <a:t>newData</a:t>
-                      </a:r>
-                      <a:r>
-                        <a:rPr lang="en-US" sz="1600" dirty="0" smtClean="0"/>
-                        <a:t>)</a:t>
-                      </a:r>
-                    </a:p>
-                    <a:p>
-                      <a:pPr algn="just"/>
-                      <a:r>
-                        <a:rPr lang="en-US" sz="1600" dirty="0" smtClean="0"/>
-                        <a:t>+ </a:t>
-                      </a:r>
-                      <a:r>
-                        <a:rPr lang="en-US" sz="1600" kern="1200" dirty="0" err="1" smtClean="0">
-                          <a:effectLst/>
-                        </a:rPr>
-                        <a:t>addPerson</a:t>
-                      </a:r>
-                      <a:r>
-                        <a:rPr lang="en-US" sz="1600" dirty="0" smtClean="0"/>
-                        <a:t>(</a:t>
-                      </a:r>
-                      <a:r>
-                        <a:rPr lang="en-US" sz="1600" dirty="0" err="1" smtClean="0"/>
-                        <a:t>ReadOnlyPerson</a:t>
-                      </a:r>
-                      <a:r>
-                        <a:rPr lang="en-US" sz="1600" dirty="0" smtClean="0"/>
-                        <a:t> p)</a:t>
-                      </a:r>
-                    </a:p>
-                    <a:p>
-                      <a:pPr algn="just"/>
-                      <a:r>
-                        <a:rPr lang="mr-IN" sz="1600" dirty="0" smtClean="0"/>
-                        <a:t>…</a:t>
-                      </a:r>
-                      <a:endParaRPr lang="en-US" sz="1600" dirty="0"/>
+                        <a:rPr lang="en-US" sz="1400" baseline="0" dirty="0" err="1" smtClean="0"/>
+                        <a:t>resetFontSize</a:t>
+                      </a:r>
+                      <a:endParaRPr lang="en-US" sz="1400" dirty="0" smtClean="0"/>
                     </a:p>
                   </a:txBody>
                   <a:tcPr/>
@@ -3756,290 +3526,21 @@
       </p:graphicFrame>
       <p:graphicFrame>
         <p:nvGraphicFramePr>
-          <p:cNvPr id="20" name="Table 19"/>
+          <p:cNvPr id="25" name="Table 24"/>
           <p:cNvGraphicFramePr>
             <a:graphicFrameLocks noGrp="1"/>
           </p:cNvGraphicFramePr>
           <p:nvPr>
             <p:extLst>
               <p:ext uri="{D42A27DB-BD31-4B8C-83A1-F6EECF244321}">
-                <p14:modId xmlns:p14="http://schemas.microsoft.com/office/powerpoint/2010/main" val="1381167028"/>
+                <p14:modId xmlns:p14="http://schemas.microsoft.com/office/powerpoint/2010/main" val="2089167028"/>
               </p:ext>
             </p:extLst>
           </p:nvPr>
         </p:nvGraphicFramePr>
         <p:xfrm>
-          <a:off x="4275945" y="4175127"/>
-          <a:ext cx="6299200" cy="2260600"/>
-        </p:xfrm>
-        <a:graphic>
-          <a:graphicData uri="http://schemas.openxmlformats.org/drawingml/2006/table">
-            <a:tbl>
-              <a:tblPr firstRow="1" bandRow="1">
-                <a:tableStyleId>{073A0DAA-6AF3-43AB-8588-CEC1D06C72B9}</a:tableStyleId>
-              </a:tblPr>
-              <a:tblGrid>
-                <a:gridCol w="6299200"/>
-              </a:tblGrid>
-              <a:tr h="370840">
-                <a:tc>
-                  <a:txBody>
-                    <a:bodyPr/>
-                    <a:lstStyle/>
-                    <a:p>
-                      <a:pPr algn="just"/>
-                      <a:r>
-                        <a:rPr lang="en-US" sz="1600" dirty="0" err="1" smtClean="0"/>
-                        <a:t>UniquePersonList</a:t>
-                      </a:r>
-                      <a:endParaRPr lang="en-US" sz="1600" dirty="0"/>
-                    </a:p>
-                  </a:txBody>
-                  <a:tcPr/>
-                </a:tc>
-              </a:tr>
-              <a:tr h="370840">
-                <a:tc>
-                  <a:txBody>
-                    <a:bodyPr/>
-                    <a:lstStyle/>
-                    <a:p>
-                      <a:pPr marL="0" indent="0" algn="just">
-                        <a:buFontTx/>
-                        <a:buNone/>
-                      </a:pPr>
-                      <a:r>
-                        <a:rPr lang="en-US" sz="1600" dirty="0" smtClean="0"/>
-                        <a:t>- </a:t>
-                      </a:r>
-                      <a:r>
-                        <a:rPr lang="en-US" sz="1600" dirty="0" err="1" smtClean="0"/>
-                        <a:t>internalList</a:t>
-                      </a:r>
-                      <a:r>
-                        <a:rPr lang="en-US" sz="1600" baseline="0" dirty="0" smtClean="0"/>
-                        <a:t>: </a:t>
-                      </a:r>
-                      <a:r>
-                        <a:rPr lang="en-US" sz="1600" baseline="0" dirty="0" err="1" smtClean="0"/>
-                        <a:t>ObservableList</a:t>
-                      </a:r>
-                      <a:r>
-                        <a:rPr lang="en-US" sz="1600" baseline="0" dirty="0" smtClean="0"/>
-                        <a:t>&lt;Person&gt;</a:t>
-                      </a:r>
-                      <a:endParaRPr lang="en-US" sz="1600" dirty="0" smtClean="0"/>
-                    </a:p>
-                    <a:p>
-                      <a:pPr marL="0" indent="0" algn="just">
-                        <a:buFontTx/>
-                        <a:buNone/>
-                      </a:pPr>
-                      <a:r>
-                        <a:rPr lang="en-US" sz="1600" dirty="0" smtClean="0"/>
-                        <a:t>- </a:t>
-                      </a:r>
-                      <a:r>
-                        <a:rPr lang="en-US" sz="1600" dirty="0" err="1" smtClean="0"/>
-                        <a:t>mappedList</a:t>
-                      </a:r>
-                      <a:r>
-                        <a:rPr lang="en-US" sz="1600" dirty="0" smtClean="0"/>
-                        <a:t>: </a:t>
-                      </a:r>
-                      <a:r>
-                        <a:rPr lang="en-US" sz="1600" dirty="0" err="1" smtClean="0"/>
-                        <a:t>ObservableList</a:t>
-                      </a:r>
-                      <a:r>
-                        <a:rPr lang="en-US" sz="1600" dirty="0" smtClean="0"/>
-                        <a:t>&lt;</a:t>
-                      </a:r>
-                      <a:r>
-                        <a:rPr lang="en-US" sz="1600" dirty="0" err="1" smtClean="0"/>
-                        <a:t>ReadOnlyPerson</a:t>
-                      </a:r>
-                      <a:r>
-                        <a:rPr lang="en-US" sz="1600" dirty="0" smtClean="0"/>
-                        <a:t>&gt;</a:t>
-                      </a:r>
-                      <a:endParaRPr lang="en-US" sz="1600" baseline="0" dirty="0" smtClean="0"/>
-                    </a:p>
-                    <a:p>
-                      <a:pPr marL="0" indent="0" algn="just">
-                        <a:buFontTx/>
-                        <a:buNone/>
-                      </a:pPr>
-                      <a:r>
-                        <a:rPr lang="en-US" sz="1600" dirty="0" smtClean="0"/>
-                        <a:t>- tasks:</a:t>
-                      </a:r>
-                      <a:r>
-                        <a:rPr lang="en-US" sz="1600" baseline="0" dirty="0" smtClean="0"/>
-                        <a:t> </a:t>
-                      </a:r>
-                      <a:r>
-                        <a:rPr lang="en-US" sz="1600" baseline="0" dirty="0" err="1" smtClean="0"/>
-                        <a:t>UniqueTasksList</a:t>
-                      </a:r>
-                      <a:endParaRPr lang="en-US" sz="1600" dirty="0"/>
-                    </a:p>
-                  </a:txBody>
-                  <a:tcPr/>
-                </a:tc>
-              </a:tr>
-              <a:tr h="370840">
-                <a:tc>
-                  <a:txBody>
-                    <a:bodyPr/>
-                    <a:lstStyle/>
-                    <a:p>
-                      <a:pPr algn="just"/>
-                      <a:r>
-                        <a:rPr lang="en-US" sz="1600" dirty="0" smtClean="0"/>
-                        <a:t>+ </a:t>
-                      </a:r>
-                      <a:r>
-                        <a:rPr lang="en-US" sz="1600" kern="1200" dirty="0" smtClean="0">
-                          <a:effectLst/>
-                        </a:rPr>
-                        <a:t>contains</a:t>
-                      </a:r>
-                      <a:r>
-                        <a:rPr lang="en-US" sz="1600" dirty="0" smtClean="0"/>
-                        <a:t>(</a:t>
-                      </a:r>
-                      <a:r>
-                        <a:rPr lang="en-US" sz="1600" dirty="0" err="1" smtClean="0"/>
-                        <a:t>ReadOnlyPerson</a:t>
-                      </a:r>
-                      <a:r>
-                        <a:rPr lang="en-US" sz="1600" dirty="0" smtClean="0"/>
-                        <a:t> </a:t>
-                      </a:r>
-                      <a:r>
-                        <a:rPr lang="en-US" sz="1600" dirty="0" err="1" smtClean="0"/>
-                        <a:t>toCheck</a:t>
-                      </a:r>
-                      <a:r>
-                        <a:rPr lang="en-US" sz="1600" dirty="0" smtClean="0"/>
-                        <a:t>)</a:t>
-                      </a:r>
-                    </a:p>
-                    <a:p>
-                      <a:pPr algn="just"/>
-                      <a:r>
-                        <a:rPr lang="en-US" sz="1600" baseline="0" dirty="0" smtClean="0"/>
-                        <a:t>+ </a:t>
-                      </a:r>
-                      <a:r>
-                        <a:rPr lang="en-US" sz="1600" kern="1200" dirty="0" smtClean="0">
-                          <a:effectLst/>
-                        </a:rPr>
-                        <a:t>add</a:t>
-                      </a:r>
-                      <a:r>
-                        <a:rPr lang="en-US" sz="1600" dirty="0" smtClean="0"/>
-                        <a:t>(</a:t>
-                      </a:r>
-                      <a:r>
-                        <a:rPr lang="en-US" sz="1600" dirty="0" err="1" smtClean="0"/>
-                        <a:t>ReadOnlyPerson</a:t>
-                      </a:r>
-                      <a:r>
-                        <a:rPr lang="en-US" sz="1600" dirty="0" smtClean="0"/>
-                        <a:t> </a:t>
-                      </a:r>
-                      <a:r>
-                        <a:rPr lang="en-US" sz="1600" dirty="0" err="1" smtClean="0"/>
-                        <a:t>toAdd</a:t>
-                      </a:r>
-                      <a:r>
-                        <a:rPr lang="en-US" sz="1600" dirty="0" smtClean="0"/>
-                        <a:t>)</a:t>
-                      </a:r>
-                      <a:endParaRPr lang="en-US" sz="1600" baseline="0" dirty="0" smtClean="0"/>
-                    </a:p>
-                    <a:p>
-                      <a:pPr algn="just"/>
-                      <a:r>
-                        <a:rPr lang="en-US" sz="1600" baseline="0" dirty="0" smtClean="0"/>
-                        <a:t>+ </a:t>
-                      </a:r>
-                      <a:r>
-                        <a:rPr lang="en-US" sz="1600" kern="1200" dirty="0" err="1" smtClean="0">
-                          <a:effectLst/>
-                        </a:rPr>
-                        <a:t>setPerson</a:t>
-                      </a:r>
-                      <a:r>
-                        <a:rPr lang="en-US" sz="1600" dirty="0" smtClean="0"/>
-                        <a:t>(</a:t>
-                      </a:r>
-                      <a:r>
-                        <a:rPr lang="en-US" sz="1600" dirty="0" err="1" smtClean="0"/>
-                        <a:t>ReadOnlyPerson</a:t>
-                      </a:r>
-                      <a:r>
-                        <a:rPr lang="en-US" sz="1600" dirty="0" smtClean="0"/>
-                        <a:t> target</a:t>
-                      </a:r>
-                      <a:r>
-                        <a:rPr lang="en-US" sz="1600" kern="1200" dirty="0" smtClean="0">
-                          <a:effectLst/>
-                        </a:rPr>
-                        <a:t>, </a:t>
-                      </a:r>
-                      <a:r>
-                        <a:rPr lang="en-US" sz="1600" dirty="0" err="1" smtClean="0"/>
-                        <a:t>ReadOnlyPerson</a:t>
-                      </a:r>
-                      <a:r>
-                        <a:rPr lang="en-US" sz="1600" dirty="0" smtClean="0"/>
-                        <a:t> </a:t>
-                      </a:r>
-                      <a:r>
-                        <a:rPr lang="en-US" sz="1600" dirty="0" err="1" smtClean="0"/>
-                        <a:t>editedPerson</a:t>
-                      </a:r>
-                      <a:r>
-                        <a:rPr lang="en-US" sz="1600" dirty="0" smtClean="0"/>
-                        <a:t>)</a:t>
-                      </a:r>
-                    </a:p>
-                    <a:p>
-                      <a:pPr algn="just"/>
-                      <a:r>
-                        <a:rPr lang="mr-IN" sz="1600" dirty="0" smtClean="0"/>
-                        <a:t>…</a:t>
-                      </a:r>
-                      <a:endParaRPr lang="en-US" sz="1600" dirty="0"/>
-                    </a:p>
-                  </a:txBody>
-                  <a:tcPr/>
-                </a:tc>
-              </a:tr>
-            </a:tbl>
-          </a:graphicData>
-        </a:graphic>
-      </p:graphicFrame>
-      <p:graphicFrame>
-        <p:nvGraphicFramePr>
-          <p:cNvPr id="22" name="Table 21"/>
-          <p:cNvGraphicFramePr>
-            <a:graphicFrameLocks noGrp="1"/>
-          </p:cNvGraphicFramePr>
-          <p:nvPr>
-            <p:extLst>
-              <p:ext uri="{D42A27DB-BD31-4B8C-83A1-F6EECF244321}">
-                <p14:modId xmlns:p14="http://schemas.microsoft.com/office/powerpoint/2010/main" val="2049795980"/>
-              </p:ext>
-            </p:extLst>
-          </p:nvPr>
-        </p:nvGraphicFramePr>
-        <p:xfrm>
-          <a:off x="1312031" y="2623130"/>
-          <a:ext cx="2284070" cy="1112520"/>
+          <a:off x="1312031" y="817770"/>
+          <a:ext cx="2284070" cy="1473200"/>
         </p:xfrm>
         <a:graphic>
           <a:graphicData uri="http://schemas.openxmlformats.org/drawingml/2006/table">
@@ -4058,10 +3559,10 @@
                     <a:p>
                       <a:pPr algn="just"/>
                       <a:r>
-                        <a:rPr lang="en-US" sz="1600" dirty="0" err="1" smtClean="0"/>
-                        <a:t>AddressBookParser</a:t>
-                      </a:r>
-                      <a:endParaRPr lang="en-US" sz="1600" dirty="0"/>
+                        <a:rPr lang="en-US" sz="1400" dirty="0" err="1" smtClean="0"/>
+                        <a:t>MainWindow</a:t>
+                      </a:r>
+                      <a:endParaRPr lang="en-US" sz="1400" dirty="0"/>
                     </a:p>
                   </a:txBody>
                   <a:tcPr/>
@@ -4075,10 +3576,10 @@
                     <a:p>
                       <a:pPr algn="ctr"/>
                       <a:r>
-                        <a:rPr lang="mr-IN" dirty="0" smtClean="0"/>
+                        <a:rPr lang="mr-IN" sz="1200" dirty="0" smtClean="0"/>
                         <a:t>…</a:t>
                       </a:r>
-                      <a:endParaRPr lang="en-US" dirty="0"/>
+                      <a:endParaRPr lang="en-US" sz="1200" dirty="0"/>
                     </a:p>
                   </a:txBody>
                   <a:tcPr/>
@@ -4090,94 +3591,40 @@
                     <a:bodyPr/>
                     <a:lstStyle/>
                     <a:p>
-                      <a:pPr algn="ctr"/>
-                      <a:r>
-                        <a:rPr lang="mr-IN" dirty="0" smtClean="0"/>
-                        <a:t>…</a:t>
-                      </a:r>
-                      <a:endParaRPr lang="en-US" dirty="0"/>
+                      <a:pPr algn="just"/>
+                      <a:r>
+                        <a:rPr lang="en-US" sz="1400" dirty="0" smtClean="0"/>
+                        <a:t>+ </a:t>
+                      </a:r>
+                      <a:r>
+                        <a:rPr lang="en-US" sz="1400" dirty="0" err="1" smtClean="0"/>
+                        <a:t>increaseFontSize</a:t>
+                      </a:r>
+                      <a:endParaRPr lang="en-US" sz="1400" dirty="0" smtClean="0"/>
                     </a:p>
-                  </a:txBody>
-                  <a:tcPr/>
-                </a:tc>
-              </a:tr>
-            </a:tbl>
-          </a:graphicData>
-        </a:graphic>
-      </p:graphicFrame>
-      <p:graphicFrame>
-        <p:nvGraphicFramePr>
-          <p:cNvPr id="25" name="Table 24"/>
-          <p:cNvGraphicFramePr>
-            <a:graphicFrameLocks noGrp="1"/>
-          </p:cNvGraphicFramePr>
-          <p:nvPr>
-            <p:extLst>
-              <p:ext uri="{D42A27DB-BD31-4B8C-83A1-F6EECF244321}">
-                <p14:modId xmlns:p14="http://schemas.microsoft.com/office/powerpoint/2010/main" val="944493451"/>
-              </p:ext>
-            </p:extLst>
-          </p:nvPr>
-        </p:nvGraphicFramePr>
-        <p:xfrm>
-          <a:off x="1329554" y="1137541"/>
-          <a:ext cx="2284070" cy="1112520"/>
-        </p:xfrm>
-        <a:graphic>
-          <a:graphicData uri="http://schemas.openxmlformats.org/drawingml/2006/table">
-            <a:tbl>
-              <a:tblPr firstRow="1" bandRow="1">
-                <a:tableStyleId>{073A0DAA-6AF3-43AB-8588-CEC1D06C72B9}</a:tableStyleId>
-              </a:tblPr>
-              <a:tblGrid>
-                <a:gridCol w="2284070"/>
-              </a:tblGrid>
-              <a:tr h="370840">
-                <a:tc>
-                  <a:txBody>
-                    <a:bodyPr/>
-                    <a:lstStyle/>
                     <a:p>
                       <a:pPr algn="just"/>
                       <a:r>
-                        <a:rPr lang="en-US" sz="1600" dirty="0" err="1" smtClean="0"/>
-                        <a:t>LogicManager</a:t>
-                      </a:r>
-                      <a:endParaRPr lang="en-US" sz="1600" dirty="0"/>
+                        <a:rPr lang="en-US" sz="1400" dirty="0" smtClean="0"/>
+                        <a:t>+ </a:t>
+                      </a:r>
+                      <a:r>
+                        <a:rPr lang="en-US" sz="1400" dirty="0" err="1" smtClean="0"/>
+                        <a:t>decreaseFontSize</a:t>
+                      </a:r>
+                      <a:endParaRPr lang="en-US" sz="1400" dirty="0" smtClean="0"/>
                     </a:p>
-                  </a:txBody>
-                  <a:tcPr/>
-                </a:tc>
-              </a:tr>
-              <a:tr h="370840">
-                <a:tc>
-                  <a:txBody>
-                    <a:bodyPr/>
-                    <a:lstStyle/>
                     <a:p>
-                      <a:pPr algn="ctr"/>
-                      <a:r>
-                        <a:rPr lang="mr-IN" dirty="0" smtClean="0"/>
-                        <a:t>…</a:t>
-                      </a:r>
-                      <a:endParaRPr lang="en-US" dirty="0"/>
-                    </a:p>
-                  </a:txBody>
-                  <a:tcPr/>
-                </a:tc>
-              </a:tr>
-              <a:tr h="370840">
-                <a:tc>
-                  <a:txBody>
-                    <a:bodyPr/>
-                    <a:lstStyle/>
-                    <a:p>
-                      <a:pPr algn="ctr"/>
-                      <a:r>
-                        <a:rPr lang="mr-IN" dirty="0" smtClean="0"/>
-                        <a:t>…</a:t>
-                      </a:r>
-                      <a:endParaRPr lang="en-US" dirty="0"/>
+                      <a:pPr algn="just"/>
+                      <a:r>
+                        <a:rPr lang="en-US" sz="1400" dirty="0" smtClean="0"/>
+                        <a:t>+ </a:t>
+                      </a:r>
+                      <a:r>
+                        <a:rPr lang="en-US" sz="1400" dirty="0" err="1" smtClean="0"/>
+                        <a:t>resetFontSize</a:t>
+                      </a:r>
+                      <a:endParaRPr lang="en-US" sz="1400" dirty="0" smtClean="0"/>
                     </a:p>
                   </a:txBody>
                   <a:tcPr/>
@@ -4191,49 +3638,15 @@
         <p:nvCxnSpPr>
           <p:cNvPr id="7" name="Straight Arrow Connector 6"/>
           <p:cNvCxnSpPr>
+            <a:stCxn id="25" idx="2"/>
             <a:endCxn id="22" idx="0"/>
           </p:cNvCxnSpPr>
           <p:nvPr/>
         </p:nvCxnSpPr>
         <p:spPr>
           <a:xfrm>
-            <a:off x="2454066" y="2250061"/>
-            <a:ext cx="0" cy="373069"/>
-          </a:xfrm>
-          <a:prstGeom prst="straightConnector1">
-            <a:avLst/>
-          </a:prstGeom>
-          <a:ln>
-            <a:tailEnd type="triangle"/>
-          </a:ln>
-        </p:spPr>
-        <p:style>
-          <a:lnRef idx="1">
-            <a:schemeClr val="accent1"/>
-          </a:lnRef>
-          <a:fillRef idx="0">
-            <a:schemeClr val="accent1"/>
-          </a:fillRef>
-          <a:effectRef idx="0">
-            <a:schemeClr val="accent1"/>
-          </a:effectRef>
-          <a:fontRef idx="minor">
-            <a:schemeClr val="tx1"/>
-          </a:fontRef>
-        </p:style>
-      </p:cxnSp>
-      <p:cxnSp>
-        <p:nvCxnSpPr>
-          <p:cNvPr id="12" name="Straight Arrow Connector 11"/>
-          <p:cNvCxnSpPr>
-            <a:endCxn id="18" idx="0"/>
-          </p:cNvCxnSpPr>
-          <p:nvPr/>
-        </p:nvCxnSpPr>
-        <p:spPr>
-          <a:xfrm>
-            <a:off x="2454066" y="3735650"/>
-            <a:ext cx="0" cy="439477"/>
+            <a:off x="2454066" y="2290970"/>
+            <a:ext cx="0" cy="332160"/>
           </a:xfrm>
           <a:prstGeom prst="straightConnector1">
             <a:avLst/>
@@ -4261,14 +3674,308 @@
         <p:nvCxnSpPr>
           <p:cNvPr id="29" name="Straight Arrow Connector 28"/>
           <p:cNvCxnSpPr>
-            <a:endCxn id="16" idx="1"/>
+            <a:stCxn id="22" idx="2"/>
+            <a:endCxn id="16" idx="0"/>
           </p:cNvCxnSpPr>
           <p:nvPr/>
         </p:nvCxnSpPr>
         <p:spPr>
-          <a:xfrm flipV="1">
-            <a:off x="3596101" y="2623130"/>
-            <a:ext cx="679844" cy="1922837"/>
+          <a:xfrm>
+            <a:off x="2454066" y="4096330"/>
+            <a:ext cx="80433" cy="609657"/>
+          </a:xfrm>
+          <a:prstGeom prst="straightConnector1">
+            <a:avLst/>
+          </a:prstGeom>
+          <a:ln>
+            <a:tailEnd type="triangle"/>
+          </a:ln>
+        </p:spPr>
+        <p:style>
+          <a:lnRef idx="1">
+            <a:schemeClr val="accent1"/>
+          </a:lnRef>
+          <a:fillRef idx="0">
+            <a:schemeClr val="accent1"/>
+          </a:fillRef>
+          <a:effectRef idx="0">
+            <a:schemeClr val="accent1"/>
+          </a:effectRef>
+          <a:fontRef idx="minor">
+            <a:schemeClr val="tx1"/>
+          </a:fontRef>
+        </p:style>
+      </p:cxnSp>
+      <p:sp>
+        <p:nvSpPr>
+          <p:cNvPr id="35" name="TextBox 34"/>
+          <p:cNvSpPr txBox="1"/>
+          <p:nvPr/>
+        </p:nvSpPr>
+        <p:spPr>
+          <a:xfrm>
+            <a:off x="474133" y="393564"/>
+            <a:ext cx="3417346" cy="276999"/>
+          </a:xfrm>
+          <a:prstGeom prst="rect">
+            <a:avLst/>
+          </a:prstGeom>
+        </p:spPr>
+        <p:style>
+          <a:lnRef idx="2">
+            <a:schemeClr val="dk1"/>
+          </a:lnRef>
+          <a:fillRef idx="1">
+            <a:schemeClr val="lt1"/>
+          </a:fillRef>
+          <a:effectRef idx="0">
+            <a:schemeClr val="dk1"/>
+          </a:effectRef>
+          <a:fontRef idx="minor">
+            <a:schemeClr val="dk1"/>
+          </a:fontRef>
+        </p:style>
+        <p:txBody>
+          <a:bodyPr wrap="none" rtlCol="0">
+            <a:spAutoFit/>
+          </a:bodyPr>
+          <a:lstStyle/>
+          <a:p>
+            <a:r>
+              <a:rPr lang="en-US" sz="1200" dirty="0" smtClean="0"/>
+              <a:t>UML Class Diagram for Font Size Change Through UI</a:t>
+            </a:r>
+            <a:endParaRPr lang="en-US" sz="1200" dirty="0"/>
+          </a:p>
+        </p:txBody>
+      </p:sp>
+      <p:graphicFrame>
+        <p:nvGraphicFramePr>
+          <p:cNvPr id="26" name="Table 25"/>
+          <p:cNvGraphicFramePr>
+            <a:graphicFrameLocks noGrp="1"/>
+          </p:cNvGraphicFramePr>
+          <p:nvPr>
+            <p:extLst>
+              <p:ext uri="{D42A27DB-BD31-4B8C-83A1-F6EECF244321}">
+                <p14:modId xmlns:p14="http://schemas.microsoft.com/office/powerpoint/2010/main" val="1006823134"/>
+              </p:ext>
+            </p:extLst>
+          </p:nvPr>
+        </p:nvGraphicFramePr>
+        <p:xfrm>
+          <a:off x="5587697" y="2900627"/>
+          <a:ext cx="2123204" cy="1259840"/>
+        </p:xfrm>
+        <a:graphic>
+          <a:graphicData uri="http://schemas.openxmlformats.org/drawingml/2006/table">
+            <a:tbl>
+              <a:tblPr firstRow="1" bandRow="1">
+                <a:tableStyleId>{073A0DAA-6AF3-43AB-8588-CEC1D06C72B9}</a:tableStyleId>
+              </a:tblPr>
+              <a:tblGrid>
+                <a:gridCol w="2123204"/>
+              </a:tblGrid>
+              <a:tr h="370840">
+                <a:tc>
+                  <a:txBody>
+                    <a:bodyPr/>
+                    <a:lstStyle/>
+                    <a:p>
+                      <a:pPr algn="just"/>
+                      <a:r>
+                        <a:rPr lang="en-US" sz="1400" dirty="0" err="1" smtClean="0"/>
+                        <a:t>TaskCard</a:t>
+                      </a:r>
+                      <a:endParaRPr lang="en-US" sz="1400" dirty="0"/>
+                    </a:p>
+                  </a:txBody>
+                  <a:tcPr/>
+                </a:tc>
+              </a:tr>
+              <a:tr h="370840">
+                <a:tc>
+                  <a:txBody>
+                    <a:bodyPr/>
+                    <a:lstStyle/>
+                    <a:p>
+                      <a:pPr marL="0" indent="0" algn="ctr">
+                        <a:buFontTx/>
+                        <a:buNone/>
+                      </a:pPr>
+                      <a:r>
+                        <a:rPr lang="mr-IN" sz="1400" dirty="0" smtClean="0"/>
+                        <a:t>…</a:t>
+                      </a:r>
+                      <a:endParaRPr lang="en-US" sz="1400" dirty="0"/>
+                    </a:p>
+                  </a:txBody>
+                  <a:tcPr/>
+                </a:tc>
+              </a:tr>
+              <a:tr h="370840">
+                <a:tc>
+                  <a:txBody>
+                    <a:bodyPr/>
+                    <a:lstStyle/>
+                    <a:p>
+                      <a:pPr algn="just"/>
+                      <a:r>
+                        <a:rPr lang="en-US" sz="1400" dirty="0" smtClean="0"/>
+                        <a:t>+ </a:t>
+                      </a:r>
+                      <a:r>
+                        <a:rPr lang="en-US" sz="1400" dirty="0" err="1" smtClean="0"/>
+                        <a:t>updateAttributeSizes</a:t>
+                      </a:r>
+                      <a:r>
+                        <a:rPr lang="en-US" sz="1400" dirty="0" smtClean="0"/>
+                        <a:t>()</a:t>
+                      </a:r>
+                    </a:p>
+                    <a:p>
+                      <a:pPr algn="ctr"/>
+                      <a:r>
+                        <a:rPr lang="mr-IN" sz="1400" dirty="0" smtClean="0"/>
+                        <a:t>…</a:t>
+                      </a:r>
+                      <a:endParaRPr lang="en-US" sz="1400" dirty="0"/>
+                    </a:p>
+                  </a:txBody>
+                  <a:tcPr/>
+                </a:tc>
+              </a:tr>
+            </a:tbl>
+          </a:graphicData>
+        </a:graphic>
+      </p:graphicFrame>
+      <p:graphicFrame>
+        <p:nvGraphicFramePr>
+          <p:cNvPr id="27" name="Table 26"/>
+          <p:cNvGraphicFramePr>
+            <a:graphicFrameLocks noGrp="1"/>
+          </p:cNvGraphicFramePr>
+          <p:nvPr>
+            <p:extLst>
+              <p:ext uri="{D42A27DB-BD31-4B8C-83A1-F6EECF244321}">
+                <p14:modId xmlns:p14="http://schemas.microsoft.com/office/powerpoint/2010/main" val="398177872"/>
+              </p:ext>
+            </p:extLst>
+          </p:nvPr>
+        </p:nvGraphicFramePr>
+        <p:xfrm>
+          <a:off x="5426831" y="817770"/>
+          <a:ext cx="2284070" cy="1473200"/>
+        </p:xfrm>
+        <a:graphic>
+          <a:graphicData uri="http://schemas.openxmlformats.org/drawingml/2006/table">
+            <a:tbl>
+              <a:tblPr firstRow="1" bandRow="1">
+                <a:tableStyleId>{073A0DAA-6AF3-43AB-8588-CEC1D06C72B9}</a:tableStyleId>
+              </a:tblPr>
+              <a:tblGrid>
+                <a:gridCol w="2284070"/>
+              </a:tblGrid>
+              <a:tr h="370840">
+                <a:tc>
+                  <a:txBody>
+                    <a:bodyPr/>
+                    <a:lstStyle/>
+                    <a:p>
+                      <a:pPr algn="just"/>
+                      <a:r>
+                        <a:rPr lang="en-US" sz="1600" dirty="0" err="1" smtClean="0"/>
+                        <a:t>TaskListPanel</a:t>
+                      </a:r>
+                      <a:endParaRPr lang="en-US" sz="1600" dirty="0"/>
+                    </a:p>
+                  </a:txBody>
+                  <a:tcPr/>
+                </a:tc>
+              </a:tr>
+              <a:tr h="370840">
+                <a:tc>
+                  <a:txBody>
+                    <a:bodyPr/>
+                    <a:lstStyle/>
+                    <a:p>
+                      <a:pPr algn="ctr"/>
+                      <a:r>
+                        <a:rPr lang="mr-IN" dirty="0" smtClean="0"/>
+                        <a:t>…</a:t>
+                      </a:r>
+                      <a:endParaRPr lang="en-US" dirty="0"/>
+                    </a:p>
+                  </a:txBody>
+                  <a:tcPr/>
+                </a:tc>
+              </a:tr>
+              <a:tr h="370840">
+                <a:tc>
+                  <a:txBody>
+                    <a:bodyPr/>
+                    <a:lstStyle/>
+                    <a:p>
+                      <a:pPr algn="just"/>
+                      <a:r>
+                        <a:rPr lang="en-US" sz="1400" dirty="0" smtClean="0"/>
+                        <a:t>+</a:t>
+                      </a:r>
+                      <a:r>
+                        <a:rPr lang="en-US" sz="1400" baseline="0" dirty="0" smtClean="0"/>
+                        <a:t> </a:t>
+                      </a:r>
+                      <a:r>
+                        <a:rPr lang="en-US" sz="1400" baseline="0" dirty="0" err="1" smtClean="0"/>
+                        <a:t>increaseFontSize</a:t>
+                      </a:r>
+                      <a:endParaRPr lang="en-US" sz="1400" baseline="0" dirty="0" smtClean="0"/>
+                    </a:p>
+                    <a:p>
+                      <a:pPr algn="just"/>
+                      <a:r>
+                        <a:rPr lang="en-US" sz="1400" baseline="0" dirty="0" smtClean="0"/>
+                        <a:t>+ </a:t>
+                      </a:r>
+                      <a:r>
+                        <a:rPr lang="en-US" sz="1400" baseline="0" dirty="0" err="1" smtClean="0"/>
+                        <a:t>decreaseFontSize</a:t>
+                      </a:r>
+                      <a:endParaRPr lang="en-US" sz="1400" baseline="0" dirty="0" smtClean="0"/>
+                    </a:p>
+                    <a:p>
+                      <a:pPr algn="just"/>
+                      <a:r>
+                        <a:rPr lang="en-US" sz="1400" baseline="0" dirty="0" smtClean="0"/>
+                        <a:t>+ </a:t>
+                      </a:r>
+                      <a:r>
+                        <a:rPr lang="en-US" sz="1400" baseline="0" dirty="0" err="1" smtClean="0"/>
+                        <a:t>resetFontSize</a:t>
+                      </a:r>
+                      <a:endParaRPr lang="en-US" sz="1400" dirty="0" smtClean="0"/>
+                    </a:p>
+                  </a:txBody>
+                  <a:tcPr/>
+                </a:tc>
+              </a:tr>
+            </a:tbl>
+          </a:graphicData>
+        </a:graphic>
+      </p:graphicFrame>
+      <p:cxnSp>
+        <p:nvCxnSpPr>
+          <p:cNvPr id="28" name="Straight Arrow Connector 27"/>
+          <p:cNvCxnSpPr>
+            <a:stCxn id="25" idx="3"/>
+            <a:endCxn id="27" idx="1"/>
+          </p:cNvCxnSpPr>
+          <p:nvPr/>
+        </p:nvCxnSpPr>
+        <p:spPr>
+          <a:xfrm>
+            <a:off x="3596101" y="1554370"/>
+            <a:ext cx="1830730" cy="0"/>
           </a:xfrm>
           <a:prstGeom prst="straightConnector1">
             <a:avLst/>
@@ -4294,16 +4001,17 @@
       </p:cxnSp>
       <p:cxnSp>
         <p:nvCxnSpPr>
-          <p:cNvPr id="31" name="Straight Arrow Connector 30"/>
+          <p:cNvPr id="30" name="Straight Arrow Connector 29"/>
           <p:cNvCxnSpPr>
-            <a:endCxn id="19" idx="1"/>
+            <a:stCxn id="27" idx="2"/>
+            <a:endCxn id="26" idx="0"/>
           </p:cNvCxnSpPr>
           <p:nvPr/>
         </p:nvCxnSpPr>
         <p:spPr>
-          <a:xfrm flipV="1">
-            <a:off x="5944597" y="2504118"/>
-            <a:ext cx="697368" cy="346342"/>
+          <a:xfrm>
+            <a:off x="6568866" y="2290970"/>
+            <a:ext cx="80433" cy="609657"/>
           </a:xfrm>
           <a:prstGeom prst="straightConnector1">
             <a:avLst/>
@@ -4327,88 +4035,6 @@
           </a:fontRef>
         </p:style>
       </p:cxnSp>
-      <p:cxnSp>
-        <p:nvCxnSpPr>
-          <p:cNvPr id="33" name="Straight Arrow Connector 32"/>
-          <p:cNvCxnSpPr>
-            <a:endCxn id="20" idx="0"/>
-          </p:cNvCxnSpPr>
-          <p:nvPr/>
-        </p:nvCxnSpPr>
-        <p:spPr>
-          <a:xfrm flipH="1">
-            <a:off x="7425545" y="3849740"/>
-            <a:ext cx="1368500" cy="325387"/>
-          </a:xfrm>
-          <a:prstGeom prst="straightConnector1">
-            <a:avLst/>
-          </a:prstGeom>
-          <a:ln>
-            <a:tailEnd type="triangle"/>
-          </a:ln>
-        </p:spPr>
-        <p:style>
-          <a:lnRef idx="1">
-            <a:schemeClr val="accent1"/>
-          </a:lnRef>
-          <a:fillRef idx="0">
-            <a:schemeClr val="accent1"/>
-          </a:fillRef>
-          <a:effectRef idx="0">
-            <a:schemeClr val="accent1"/>
-          </a:effectRef>
-          <a:fontRef idx="minor">
-            <a:schemeClr val="tx1"/>
-          </a:fontRef>
-        </p:style>
-      </p:cxnSp>
-      <p:sp>
-        <p:nvSpPr>
-          <p:cNvPr id="35" name="TextBox 34"/>
-          <p:cNvSpPr txBox="1"/>
-          <p:nvPr/>
-        </p:nvSpPr>
-        <p:spPr>
-          <a:xfrm>
-            <a:off x="474133" y="393564"/>
-            <a:ext cx="5042471" cy="369332"/>
-          </a:xfrm>
-          <a:prstGeom prst="rect">
-            <a:avLst/>
-          </a:prstGeom>
-        </p:spPr>
-        <p:style>
-          <a:lnRef idx="2">
-            <a:schemeClr val="dk1"/>
-          </a:lnRef>
-          <a:fillRef idx="1">
-            <a:schemeClr val="lt1"/>
-          </a:fillRef>
-          <a:effectRef idx="0">
-            <a:schemeClr val="dk1"/>
-          </a:effectRef>
-          <a:fontRef idx="minor">
-            <a:schemeClr val="dk1"/>
-          </a:fontRef>
-        </p:style>
-        <p:txBody>
-          <a:bodyPr wrap="none" rtlCol="0">
-            <a:spAutoFit/>
-          </a:bodyPr>
-          <a:lstStyle/>
-          <a:p>
-            <a:r>
-              <a:rPr lang="en-US" dirty="0" smtClean="0"/>
-              <a:t>UML Class Diagram for </a:t>
-            </a:r>
-            <a:r>
-              <a:rPr lang="en-US" dirty="0" smtClean="0"/>
-              <a:t>Font Size Change Through UI</a:t>
-            </a:r>
-            <a:endParaRPr lang="en-US" dirty="0"/>
-          </a:p>
-        </p:txBody>
-      </p:sp>
     </p:spTree>
     <p:extLst>
       <p:ext uri="{BB962C8B-B14F-4D97-AF65-F5344CB8AC3E}">
@@ -4448,14 +4074,14 @@
       </p:grpSpPr>
       <p:sp>
         <p:nvSpPr>
-          <p:cNvPr id="34" name="Rectangle 33"/>
+          <p:cNvPr id="15" name="Rectangle 14"/>
           <p:cNvSpPr/>
           <p:nvPr/>
         </p:nvSpPr>
         <p:spPr>
           <a:xfrm>
             <a:off x="474133" y="395111"/>
-            <a:ext cx="10905067" cy="6197600"/>
+            <a:ext cx="11303339" cy="5883769"/>
           </a:xfrm>
           <a:prstGeom prst="rect">
             <a:avLst/>
@@ -4480,36 +4106,36 @@
           <a:lstStyle/>
           <a:p>
             <a:pPr algn="ctr"/>
-            <a:endParaRPr lang="en-US"/>
+            <a:endParaRPr lang="en-US" sz="1200"/>
           </a:p>
         </p:txBody>
       </p:sp>
       <p:graphicFrame>
         <p:nvGraphicFramePr>
-          <p:cNvPr id="16" name="Table 15"/>
+          <p:cNvPr id="17" name="Table 16"/>
           <p:cNvGraphicFramePr>
             <a:graphicFrameLocks noGrp="1"/>
           </p:cNvGraphicFramePr>
           <p:nvPr>
             <p:extLst>
               <p:ext uri="{D42A27DB-BD31-4B8C-83A1-F6EECF244321}">
-                <p14:modId xmlns:p14="http://schemas.microsoft.com/office/powerpoint/2010/main" val="1289603391"/>
+                <p14:modId xmlns:p14="http://schemas.microsoft.com/office/powerpoint/2010/main" val="1071767061"/>
               </p:ext>
             </p:extLst>
           </p:nvPr>
         </p:nvGraphicFramePr>
         <p:xfrm>
-          <a:off x="4275945" y="1797630"/>
-          <a:ext cx="1668652" cy="1651000"/>
+          <a:off x="6121214" y="4622917"/>
+          <a:ext cx="2123204" cy="1259840"/>
         </p:xfrm>
         <a:graphic>
           <a:graphicData uri="http://schemas.openxmlformats.org/drawingml/2006/table">
             <a:tbl>
               <a:tblPr firstRow="1" bandRow="1">
-                <a:tableStyleId>{93296810-A885-4BE3-A3E7-6D5BEEA58F35}</a:tableStyleId>
+                <a:tableStyleId>{5C22544A-7EE6-4342-B048-85BDC9FD1C3A}</a:tableStyleId>
               </a:tblPr>
               <a:tblGrid>
-                <a:gridCol w="1668652"/>
+                <a:gridCol w="2123204"/>
               </a:tblGrid>
               <a:tr h="370840">
                 <a:tc>
@@ -4519,10 +4145,10 @@
                     <a:p>
                       <a:pPr algn="just"/>
                       <a:r>
-                        <a:rPr lang="en-US" dirty="0" err="1" smtClean="0"/>
-                        <a:t>SortCommand</a:t>
-                      </a:r>
-                      <a:endParaRPr lang="en-US" dirty="0"/>
+                        <a:rPr lang="en-US" sz="1400" dirty="0" err="1" smtClean="0"/>
+                        <a:t>PersonCard</a:t>
+                      </a:r>
+                      <a:endParaRPr lang="en-US" sz="1400" dirty="0"/>
                     </a:p>
                   </a:txBody>
                   <a:tcPr/>
@@ -4534,28 +4160,110 @@
                     <a:bodyPr/>
                     <a:lstStyle/>
                     <a:p>
-                      <a:pPr marL="0" indent="0" algn="just">
+                      <a:pPr marL="0" indent="0" algn="ctr">
                         <a:buFontTx/>
                         <a:buNone/>
                       </a:pPr>
                       <a:r>
-                        <a:rPr lang="en-US" dirty="0" smtClean="0"/>
-                        <a:t>- field:</a:t>
-                      </a:r>
-                      <a:r>
-                        <a:rPr lang="en-US" baseline="0" dirty="0" smtClean="0"/>
-                        <a:t> String</a:t>
-                      </a:r>
-                      <a:endParaRPr lang="en-US" dirty="0" smtClean="0"/>
+                        <a:rPr lang="mr-IN" sz="1400" dirty="0" smtClean="0"/>
+                        <a:t>…</a:t>
+                      </a:r>
+                      <a:endParaRPr lang="en-US" sz="1400" dirty="0"/>
+                    </a:p>
+                  </a:txBody>
+                  <a:tcPr/>
+                </a:tc>
+              </a:tr>
+              <a:tr h="370840">
+                <a:tc>
+                  <a:txBody>
+                    <a:bodyPr/>
+                    <a:lstStyle/>
+                    <a:p>
+                      <a:pPr algn="just"/>
+                      <a:r>
+                        <a:rPr lang="en-US" sz="1400" dirty="0" smtClean="0"/>
+                        <a:t>+ </a:t>
+                      </a:r>
+                      <a:r>
+                        <a:rPr lang="en-US" sz="1400" dirty="0" err="1" smtClean="0"/>
+                        <a:t>updateAttributeSizes</a:t>
+                      </a:r>
+                      <a:r>
+                        <a:rPr lang="en-US" sz="1400" dirty="0" smtClean="0"/>
+                        <a:t>()</a:t>
+                      </a:r>
                     </a:p>
                     <a:p>
-                      <a:pPr marL="0" indent="0" algn="just">
-                        <a:buFontTx/>
-                        <a:buNone/>
-                      </a:pPr>
-                      <a:r>
-                        <a:rPr lang="en-US" dirty="0" smtClean="0"/>
-                        <a:t>- order: String</a:t>
+                      <a:pPr algn="ctr"/>
+                      <a:r>
+                        <a:rPr lang="mr-IN" sz="1400" dirty="0" smtClean="0"/>
+                        <a:t>…</a:t>
+                      </a:r>
+                      <a:endParaRPr lang="en-US" sz="1400" dirty="0"/>
+                    </a:p>
+                  </a:txBody>
+                  <a:tcPr/>
+                </a:tc>
+              </a:tr>
+            </a:tbl>
+          </a:graphicData>
+        </a:graphic>
+      </p:graphicFrame>
+      <p:graphicFrame>
+        <p:nvGraphicFramePr>
+          <p:cNvPr id="21" name="Table 20"/>
+          <p:cNvGraphicFramePr>
+            <a:graphicFrameLocks noGrp="1"/>
+          </p:cNvGraphicFramePr>
+          <p:nvPr>
+            <p:extLst>
+              <p:ext uri="{D42A27DB-BD31-4B8C-83A1-F6EECF244321}">
+                <p14:modId xmlns:p14="http://schemas.microsoft.com/office/powerpoint/2010/main" val="443862272"/>
+              </p:ext>
+            </p:extLst>
+          </p:nvPr>
+        </p:nvGraphicFramePr>
+        <p:xfrm>
+          <a:off x="5960348" y="2540060"/>
+          <a:ext cx="2284070" cy="1473200"/>
+        </p:xfrm>
+        <a:graphic>
+          <a:graphicData uri="http://schemas.openxmlformats.org/drawingml/2006/table">
+            <a:tbl>
+              <a:tblPr firstRow="1" bandRow="1">
+                <a:tableStyleId>{5C22544A-7EE6-4342-B048-85BDC9FD1C3A}</a:tableStyleId>
+              </a:tblPr>
+              <a:tblGrid>
+                <a:gridCol w="2284070"/>
+              </a:tblGrid>
+              <a:tr h="370840">
+                <a:tc>
+                  <a:txBody>
+                    <a:bodyPr/>
+                    <a:lstStyle/>
+                    <a:p>
+                      <a:pPr algn="just"/>
+                      <a:r>
+                        <a:rPr lang="en-US" sz="1600" dirty="0" err="1" smtClean="0"/>
+                        <a:t>PersonListPanel</a:t>
+                      </a:r>
+                      <a:endParaRPr lang="en-US" sz="1600" dirty="0"/>
+                    </a:p>
+                  </a:txBody>
+                  <a:tcPr/>
+                </a:tc>
+              </a:tr>
+              <a:tr h="370840">
+                <a:tc>
+                  <a:txBody>
+                    <a:bodyPr/>
+                    <a:lstStyle/>
+                    <a:p>
+                      <a:pPr algn="ctr"/>
+                      <a:r>
+                        <a:rPr lang="mr-IN" dirty="0" smtClean="0"/>
+                        <a:t>…</a:t>
                       </a:r>
                       <a:endParaRPr lang="en-US" dirty="0"/>
                     </a:p>
@@ -4571,33 +4279,42 @@
                     <a:p>
                       <a:pPr algn="just"/>
                       <a:r>
-                        <a:rPr lang="en-US" dirty="0" smtClean="0"/>
-                        <a:t>+ </a:t>
-                      </a:r>
-                      <a:r>
-                        <a:rPr lang="en-US" dirty="0" err="1" smtClean="0"/>
-                        <a:t>getField</a:t>
-                      </a:r>
-                      <a:r>
-                        <a:rPr lang="en-US" dirty="0" smtClean="0"/>
-                        <a:t>()</a:t>
-                      </a:r>
+                        <a:rPr lang="en-US" sz="1400" dirty="0" smtClean="0"/>
+                        <a:t>+</a:t>
+                      </a:r>
+                      <a:r>
+                        <a:rPr lang="en-US" sz="1400" baseline="0" dirty="0" smtClean="0"/>
+                        <a:t> </a:t>
+                      </a:r>
+                      <a:r>
+                        <a:rPr lang="en-US" sz="1400" baseline="0" dirty="0" err="1" smtClean="0"/>
+                        <a:t>increaseFontSize</a:t>
+                      </a:r>
+                      <a:endParaRPr lang="en-US" sz="1400" baseline="0" dirty="0" smtClean="0"/>
                     </a:p>
                     <a:p>
                       <a:pPr algn="just"/>
                       <a:r>
-                        <a:rPr lang="en-US" dirty="0" smtClean="0"/>
+                        <a:rPr lang="en-US" sz="1400" baseline="0" dirty="0" smtClean="0"/>
                         <a:t>+ </a:t>
                       </a:r>
                       <a:r>
-                        <a:rPr lang="en-US" dirty="0" err="1" smtClean="0"/>
-                        <a:t>getOrder</a:t>
-                      </a:r>
-                      <a:r>
-                        <a:rPr lang="en-US" dirty="0" smtClean="0"/>
-                        <a:t>()</a:t>
-                      </a:r>
-                      <a:endParaRPr lang="en-US" dirty="0"/>
+                        <a:rPr lang="en-US" sz="1400" baseline="0" dirty="0" err="1" smtClean="0"/>
+                        <a:t>decreaseFontSize</a:t>
+                      </a:r>
+                      <a:endParaRPr lang="en-US" sz="1400" baseline="0" dirty="0" smtClean="0"/>
+                    </a:p>
+                    <a:p>
+                      <a:pPr algn="just"/>
+                      <a:r>
+                        <a:rPr lang="en-US" sz="1400" baseline="0" dirty="0" smtClean="0"/>
+                        <a:t>+ </a:t>
+                      </a:r>
+                      <a:r>
+                        <a:rPr lang="en-US" sz="1400" baseline="0" dirty="0" err="1" smtClean="0"/>
+                        <a:t>resetFontSize</a:t>
+                      </a:r>
+                      <a:endParaRPr lang="en-US" sz="1400" dirty="0" smtClean="0"/>
                     </a:p>
                   </a:txBody>
                   <a:tcPr/>
@@ -4609,27 +4326,27 @@
       </p:graphicFrame>
       <p:graphicFrame>
         <p:nvGraphicFramePr>
-          <p:cNvPr id="18" name="Table 17"/>
+          <p:cNvPr id="23" name="Table 22"/>
           <p:cNvGraphicFramePr>
             <a:graphicFrameLocks noGrp="1"/>
           </p:cNvGraphicFramePr>
           <p:nvPr>
             <p:extLst>
               <p:ext uri="{D42A27DB-BD31-4B8C-83A1-F6EECF244321}">
-                <p14:modId xmlns:p14="http://schemas.microsoft.com/office/powerpoint/2010/main" val="423261465"/>
+                <p14:modId xmlns:p14="http://schemas.microsoft.com/office/powerpoint/2010/main" val="1782499473"/>
               </p:ext>
             </p:extLst>
           </p:nvPr>
         </p:nvGraphicFramePr>
         <p:xfrm>
-          <a:off x="1312031" y="4175127"/>
-          <a:ext cx="2284070" cy="741680"/>
+          <a:off x="5960348" y="734700"/>
+          <a:ext cx="2284070" cy="1473200"/>
         </p:xfrm>
         <a:graphic>
           <a:graphicData uri="http://schemas.openxmlformats.org/drawingml/2006/table">
             <a:tbl>
               <a:tblPr firstRow="1" bandRow="1">
-                <a:tableStyleId>{93296810-A885-4BE3-A3E7-6D5BEEA58F35}</a:tableStyleId>
+                <a:tableStyleId>{5C22544A-7EE6-4342-B048-85BDC9FD1C3A}</a:tableStyleId>
               </a:tblPr>
               <a:tblGrid>
                 <a:gridCol w="2284070"/>
@@ -4642,10 +4359,27 @@
                     <a:p>
                       <a:pPr algn="just"/>
                       <a:r>
-                        <a:rPr lang="en-US" sz="1600" dirty="0" err="1" smtClean="0"/>
-                        <a:t>SortCommandParser</a:t>
-                      </a:r>
-                      <a:endParaRPr lang="en-US" sz="1600" dirty="0"/>
+                        <a:rPr lang="en-US" sz="1400" dirty="0" err="1" smtClean="0"/>
+                        <a:t>MainWindow</a:t>
+                      </a:r>
+                      <a:endParaRPr lang="en-US" sz="1400" dirty="0"/>
+                    </a:p>
+                  </a:txBody>
+                  <a:tcPr/>
+                </a:tc>
+              </a:tr>
+              <a:tr h="370840">
+                <a:tc>
+                  <a:txBody>
+                    <a:bodyPr/>
+                    <a:lstStyle/>
+                    <a:p>
+                      <a:pPr algn="ctr"/>
+                      <a:r>
+                        <a:rPr lang="mr-IN" sz="1200" dirty="0" smtClean="0"/>
+                        <a:t>…</a:t>
+                      </a:r>
+                      <a:endParaRPr lang="en-US" sz="1200" dirty="0"/>
                     </a:p>
                   </a:txBody>
                   <a:tcPr/>
@@ -4659,699 +4393,38 @@
                     <a:p>
                       <a:pPr algn="just"/>
                       <a:r>
-                        <a:rPr lang="en-US" dirty="0" smtClean="0"/>
-                        <a:t>+ parse(String</a:t>
-                      </a:r>
-                      <a:r>
-                        <a:rPr lang="en-US" baseline="0" dirty="0" smtClean="0"/>
-                        <a:t> </a:t>
-                      </a:r>
-                      <a:r>
-                        <a:rPr lang="en-US" baseline="0" dirty="0" err="1" smtClean="0"/>
-                        <a:t>args</a:t>
-                      </a:r>
-                      <a:r>
-                        <a:rPr lang="en-US" baseline="0" dirty="0" smtClean="0"/>
-                        <a:t>)</a:t>
-                      </a:r>
-                      <a:endParaRPr lang="en-US" dirty="0"/>
-                    </a:p>
-                  </a:txBody>
-                  <a:tcPr/>
-                </a:tc>
-              </a:tr>
-            </a:tbl>
-          </a:graphicData>
-        </a:graphic>
-      </p:graphicFrame>
-      <p:graphicFrame>
-        <p:nvGraphicFramePr>
-          <p:cNvPr id="19" name="Table 18"/>
-          <p:cNvGraphicFramePr>
-            <a:graphicFrameLocks noGrp="1"/>
-          </p:cNvGraphicFramePr>
-          <p:nvPr>
-            <p:extLst>
-              <p:ext uri="{D42A27DB-BD31-4B8C-83A1-F6EECF244321}">
-                <p14:modId xmlns:p14="http://schemas.microsoft.com/office/powerpoint/2010/main" val="1959227013"/>
-              </p:ext>
-            </p:extLst>
-          </p:nvPr>
-        </p:nvGraphicFramePr>
-        <p:xfrm>
-          <a:off x="6641965" y="1137541"/>
-          <a:ext cx="4462204" cy="2733154"/>
-        </p:xfrm>
-        <a:graphic>
-          <a:graphicData uri="http://schemas.openxmlformats.org/drawingml/2006/table">
-            <a:tbl>
-              <a:tblPr firstRow="1" bandRow="1">
-                <a:tableStyleId>{93296810-A885-4BE3-A3E7-6D5BEEA58F35}</a:tableStyleId>
-              </a:tblPr>
-              <a:tblGrid>
-                <a:gridCol w="4462204"/>
-              </a:tblGrid>
-              <a:tr h="355714">
-                <a:tc>
-                  <a:txBody>
-                    <a:bodyPr/>
-                    <a:lstStyle/>
-                    <a:p>
-                      <a:pPr algn="just"/>
-                      <a:r>
-                        <a:rPr lang="en-US" sz="1600" dirty="0" err="1" smtClean="0"/>
-                        <a:t>AddressBook</a:t>
-                      </a:r>
-                      <a:endParaRPr lang="en-US" sz="1600" dirty="0"/>
-                    </a:p>
-                  </a:txBody>
-                  <a:tcPr/>
-                </a:tc>
-              </a:tr>
-              <a:tr h="370840">
-                <a:tc>
-                  <a:txBody>
-                    <a:bodyPr/>
-                    <a:lstStyle/>
-                    <a:p>
-                      <a:pPr marL="0" indent="0" algn="just">
-                        <a:buFontTx/>
-                        <a:buNone/>
-                      </a:pPr>
-                      <a:r>
-                        <a:rPr lang="en-US" sz="1600" dirty="0" smtClean="0"/>
-                        <a:t>- persons: </a:t>
-                      </a:r>
-                      <a:r>
-                        <a:rPr lang="en-US" sz="1600" dirty="0" err="1" smtClean="0"/>
-                        <a:t>UniquePersonList</a:t>
-                      </a:r>
-                      <a:endParaRPr lang="en-US" sz="1600" dirty="0" smtClean="0"/>
-                    </a:p>
-                    <a:p>
-                      <a:pPr marL="0" indent="0" algn="just">
-                        <a:buFontTx/>
-                        <a:buNone/>
-                      </a:pPr>
-                      <a:r>
-                        <a:rPr lang="en-US" sz="1600" dirty="0" smtClean="0"/>
-                        <a:t>- tags:</a:t>
-                      </a:r>
-                      <a:r>
-                        <a:rPr lang="en-US" sz="1600" baseline="0" dirty="0" smtClean="0"/>
-                        <a:t> </a:t>
-                      </a:r>
-                      <a:r>
-                        <a:rPr lang="en-US" sz="1600" baseline="0" dirty="0" err="1" smtClean="0"/>
-                        <a:t>UniqueTagList</a:t>
-                      </a:r>
-                      <a:endParaRPr lang="en-US" sz="1600" baseline="0" dirty="0" smtClean="0"/>
-                    </a:p>
-                    <a:p>
-                      <a:pPr marL="0" indent="0" algn="just">
-                        <a:buFontTx/>
-                        <a:buNone/>
-                      </a:pPr>
-                      <a:r>
-                        <a:rPr lang="en-US" sz="1600" dirty="0" smtClean="0"/>
-                        <a:t>- tasks:</a:t>
-                      </a:r>
-                      <a:r>
-                        <a:rPr lang="en-US" sz="1600" baseline="0" dirty="0" smtClean="0"/>
-                        <a:t> </a:t>
-                      </a:r>
-                      <a:r>
-                        <a:rPr lang="en-US" sz="1600" baseline="0" dirty="0" err="1" smtClean="0"/>
-                        <a:t>UniqueTasksList</a:t>
-                      </a:r>
-                      <a:endParaRPr lang="en-US" sz="1600" dirty="0"/>
-                    </a:p>
-                  </a:txBody>
-                  <a:tcPr/>
-                </a:tc>
-              </a:tr>
-              <a:tr h="370840">
-                <a:tc>
-                  <a:txBody>
-                    <a:bodyPr/>
-                    <a:lstStyle/>
-                    <a:p>
-                      <a:pPr algn="just"/>
-                      <a:r>
-                        <a:rPr lang="en-US" sz="1600" dirty="0" smtClean="0"/>
-                        <a:t>+ parse(String</a:t>
-                      </a:r>
-                      <a:r>
-                        <a:rPr lang="en-US" sz="1600" baseline="0" dirty="0" smtClean="0"/>
-                        <a:t> </a:t>
-                      </a:r>
-                      <a:r>
-                        <a:rPr lang="en-US" sz="1600" baseline="0" dirty="0" err="1" smtClean="0"/>
-                        <a:t>args</a:t>
-                      </a:r>
-                      <a:r>
-                        <a:rPr lang="en-US" sz="1600" baseline="0" dirty="0" smtClean="0"/>
-                        <a:t>)</a:t>
-                      </a:r>
+                        <a:rPr lang="en-US" sz="1400" dirty="0" smtClean="0"/>
+                        <a:t>+ </a:t>
+                      </a:r>
+                      <a:r>
+                        <a:rPr lang="en-US" sz="1400" dirty="0" err="1" smtClean="0"/>
+                        <a:t>increaseFontSize</a:t>
+                      </a:r>
+                      <a:endParaRPr lang="en-US" sz="1400" dirty="0" smtClean="0"/>
                     </a:p>
                     <a:p>
                       <a:pPr algn="just"/>
                       <a:r>
-                        <a:rPr lang="en-US" sz="1600" baseline="0" dirty="0" smtClean="0"/>
+                        <a:rPr lang="en-US" sz="1400" dirty="0" smtClean="0"/>
                         <a:t>+ </a:t>
                       </a:r>
                       <a:r>
-                        <a:rPr lang="en-US" sz="1600" baseline="0" dirty="0" err="1" smtClean="0"/>
-                        <a:t>setPersons</a:t>
-                      </a:r>
-                      <a:r>
-                        <a:rPr lang="en-US" sz="1600" baseline="0" dirty="0" smtClean="0"/>
-                        <a:t>(List&lt;</a:t>
-                      </a:r>
-                      <a:r>
-                        <a:rPr lang="en-US" sz="1600" baseline="0" dirty="0" err="1" smtClean="0"/>
-                        <a:t>ReadOnlyPerson</a:t>
-                      </a:r>
-                      <a:r>
-                        <a:rPr lang="en-US" sz="1600" baseline="0" dirty="0" smtClean="0"/>
-                        <a:t>&gt; persons)</a:t>
-                      </a:r>
+                        <a:rPr lang="en-US" sz="1400" dirty="0" err="1" smtClean="0"/>
+                        <a:t>decreaseFontSize</a:t>
+                      </a:r>
+                      <a:endParaRPr lang="en-US" sz="1400" dirty="0" smtClean="0"/>
                     </a:p>
                     <a:p>
                       <a:pPr algn="just"/>
                       <a:r>
-                        <a:rPr lang="en-US" sz="1600" baseline="0" dirty="0" smtClean="0"/>
+                        <a:rPr lang="en-US" sz="1400" dirty="0" smtClean="0"/>
                         <a:t>+ </a:t>
                       </a:r>
                       <a:r>
-                        <a:rPr lang="en-US" sz="1600" kern="1200" dirty="0" err="1" smtClean="0">
-                          <a:effectLst/>
-                        </a:rPr>
-                        <a:t>setTags</a:t>
-                      </a:r>
-                      <a:r>
-                        <a:rPr lang="en-US" sz="1600" dirty="0" smtClean="0"/>
-                        <a:t>(Set&lt;Tag&gt; tags)</a:t>
-                      </a:r>
-                    </a:p>
-                    <a:p>
-                      <a:pPr algn="just"/>
-                      <a:r>
-                        <a:rPr lang="en-US" sz="1600" dirty="0" smtClean="0"/>
-                        <a:t>+ </a:t>
-                      </a:r>
-                      <a:r>
-                        <a:rPr lang="en-US" sz="1600" kern="1200" dirty="0" err="1" smtClean="0">
-                          <a:effectLst/>
-                        </a:rPr>
-                        <a:t>resetData</a:t>
-                      </a:r>
-                      <a:r>
-                        <a:rPr lang="en-US" sz="1600" dirty="0" smtClean="0"/>
-                        <a:t>(</a:t>
-                      </a:r>
-                      <a:r>
-                        <a:rPr lang="en-US" sz="1600" dirty="0" err="1" smtClean="0"/>
-                        <a:t>ReadOnlyAddressBook</a:t>
-                      </a:r>
-                      <a:r>
-                        <a:rPr lang="en-US" sz="1600" dirty="0" smtClean="0"/>
-                        <a:t> </a:t>
-                      </a:r>
-                      <a:r>
-                        <a:rPr lang="en-US" sz="1600" dirty="0" err="1" smtClean="0"/>
-                        <a:t>newData</a:t>
-                      </a:r>
-                      <a:r>
-                        <a:rPr lang="en-US" sz="1600" dirty="0" smtClean="0"/>
-                        <a:t>)</a:t>
-                      </a:r>
-                    </a:p>
-                    <a:p>
-                      <a:pPr algn="just"/>
-                      <a:r>
-                        <a:rPr lang="en-US" sz="1600" dirty="0" smtClean="0"/>
-                        <a:t>+ </a:t>
-                      </a:r>
-                      <a:r>
-                        <a:rPr lang="en-US" sz="1600" kern="1200" dirty="0" err="1" smtClean="0">
-                          <a:effectLst/>
-                        </a:rPr>
-                        <a:t>addPerson</a:t>
-                      </a:r>
-                      <a:r>
-                        <a:rPr lang="en-US" sz="1600" dirty="0" smtClean="0"/>
-                        <a:t>(</a:t>
-                      </a:r>
-                      <a:r>
-                        <a:rPr lang="en-US" sz="1600" dirty="0" err="1" smtClean="0"/>
-                        <a:t>ReadOnlyPerson</a:t>
-                      </a:r>
-                      <a:r>
-                        <a:rPr lang="en-US" sz="1600" dirty="0" smtClean="0"/>
-                        <a:t> p)</a:t>
-                      </a:r>
-                    </a:p>
-                    <a:p>
-                      <a:pPr algn="just"/>
-                      <a:r>
-                        <a:rPr lang="mr-IN" sz="1600" dirty="0" smtClean="0"/>
-                        <a:t>…</a:t>
-                      </a:r>
-                      <a:endParaRPr lang="en-US" sz="1600" dirty="0"/>
-                    </a:p>
-                  </a:txBody>
-                  <a:tcPr/>
-                </a:tc>
-              </a:tr>
-            </a:tbl>
-          </a:graphicData>
-        </a:graphic>
-      </p:graphicFrame>
-      <p:graphicFrame>
-        <p:nvGraphicFramePr>
-          <p:cNvPr id="20" name="Table 19"/>
-          <p:cNvGraphicFramePr>
-            <a:graphicFrameLocks noGrp="1"/>
-          </p:cNvGraphicFramePr>
-          <p:nvPr>
-            <p:extLst>
-              <p:ext uri="{D42A27DB-BD31-4B8C-83A1-F6EECF244321}">
-                <p14:modId xmlns:p14="http://schemas.microsoft.com/office/powerpoint/2010/main" val="1361648040"/>
-              </p:ext>
-            </p:extLst>
-          </p:nvPr>
-        </p:nvGraphicFramePr>
-        <p:xfrm>
-          <a:off x="4275945" y="4175127"/>
-          <a:ext cx="6299200" cy="2260600"/>
-        </p:xfrm>
-        <a:graphic>
-          <a:graphicData uri="http://schemas.openxmlformats.org/drawingml/2006/table">
-            <a:tbl>
-              <a:tblPr firstRow="1" bandRow="1">
-                <a:tableStyleId>{93296810-A885-4BE3-A3E7-6D5BEEA58F35}</a:tableStyleId>
-              </a:tblPr>
-              <a:tblGrid>
-                <a:gridCol w="6299200"/>
-              </a:tblGrid>
-              <a:tr h="370840">
-                <a:tc>
-                  <a:txBody>
-                    <a:bodyPr/>
-                    <a:lstStyle/>
-                    <a:p>
-                      <a:pPr algn="just"/>
-                      <a:r>
-                        <a:rPr lang="en-US" sz="1600" dirty="0" err="1" smtClean="0"/>
-                        <a:t>UniquePersonList</a:t>
-                      </a:r>
-                      <a:endParaRPr lang="en-US" sz="1600" dirty="0"/>
-                    </a:p>
-                  </a:txBody>
-                  <a:tcPr/>
-                </a:tc>
-              </a:tr>
-              <a:tr h="370840">
-                <a:tc>
-                  <a:txBody>
-                    <a:bodyPr/>
-                    <a:lstStyle/>
-                    <a:p>
-                      <a:pPr marL="0" indent="0" algn="just">
-                        <a:buFontTx/>
-                        <a:buNone/>
-                      </a:pPr>
-                      <a:r>
-                        <a:rPr lang="en-US" sz="1600" dirty="0" smtClean="0"/>
-                        <a:t>- </a:t>
-                      </a:r>
-                      <a:r>
-                        <a:rPr lang="en-US" sz="1600" dirty="0" err="1" smtClean="0"/>
-                        <a:t>internalList</a:t>
-                      </a:r>
-                      <a:r>
-                        <a:rPr lang="en-US" sz="1600" baseline="0" dirty="0" smtClean="0"/>
-                        <a:t>: </a:t>
-                      </a:r>
-                      <a:r>
-                        <a:rPr lang="en-US" sz="1600" baseline="0" dirty="0" err="1" smtClean="0"/>
-                        <a:t>ObservableList</a:t>
-                      </a:r>
-                      <a:r>
-                        <a:rPr lang="en-US" sz="1600" baseline="0" dirty="0" smtClean="0"/>
-                        <a:t>&lt;Person&gt;</a:t>
-                      </a:r>
-                      <a:endParaRPr lang="en-US" sz="1600" dirty="0" smtClean="0"/>
-                    </a:p>
-                    <a:p>
-                      <a:pPr marL="0" indent="0" algn="just">
-                        <a:buFontTx/>
-                        <a:buNone/>
-                      </a:pPr>
-                      <a:r>
-                        <a:rPr lang="en-US" sz="1600" dirty="0" smtClean="0"/>
-                        <a:t>- </a:t>
-                      </a:r>
-                      <a:r>
-                        <a:rPr lang="en-US" sz="1600" dirty="0" err="1" smtClean="0"/>
-                        <a:t>mappedList</a:t>
-                      </a:r>
-                      <a:r>
-                        <a:rPr lang="en-US" sz="1600" dirty="0" smtClean="0"/>
-                        <a:t>: </a:t>
-                      </a:r>
-                      <a:r>
-                        <a:rPr lang="en-US" sz="1600" dirty="0" err="1" smtClean="0"/>
-                        <a:t>ObservableList</a:t>
-                      </a:r>
-                      <a:r>
-                        <a:rPr lang="en-US" sz="1600" dirty="0" smtClean="0"/>
-                        <a:t>&lt;</a:t>
-                      </a:r>
-                      <a:r>
-                        <a:rPr lang="en-US" sz="1600" dirty="0" err="1" smtClean="0"/>
-                        <a:t>ReadOnlyPerson</a:t>
-                      </a:r>
-                      <a:r>
-                        <a:rPr lang="en-US" sz="1600" dirty="0" smtClean="0"/>
-                        <a:t>&gt;</a:t>
-                      </a:r>
-                      <a:endParaRPr lang="en-US" sz="1600" baseline="0" dirty="0" smtClean="0"/>
-                    </a:p>
-                    <a:p>
-                      <a:pPr marL="0" indent="0" algn="just">
-                        <a:buFontTx/>
-                        <a:buNone/>
-                      </a:pPr>
-                      <a:r>
-                        <a:rPr lang="en-US" sz="1600" dirty="0" smtClean="0"/>
-                        <a:t>- tasks:</a:t>
-                      </a:r>
-                      <a:r>
-                        <a:rPr lang="en-US" sz="1600" baseline="0" dirty="0" smtClean="0"/>
-                        <a:t> </a:t>
-                      </a:r>
-                      <a:r>
-                        <a:rPr lang="en-US" sz="1600" baseline="0" dirty="0" err="1" smtClean="0"/>
-                        <a:t>UniqueTasksList</a:t>
-                      </a:r>
-                      <a:endParaRPr lang="en-US" sz="1600" dirty="0"/>
-                    </a:p>
-                  </a:txBody>
-                  <a:tcPr/>
-                </a:tc>
-              </a:tr>
-              <a:tr h="370840">
-                <a:tc>
-                  <a:txBody>
-                    <a:bodyPr/>
-                    <a:lstStyle/>
-                    <a:p>
-                      <a:pPr algn="just"/>
-                      <a:r>
-                        <a:rPr lang="en-US" sz="1600" dirty="0" smtClean="0"/>
-                        <a:t>+ </a:t>
-                      </a:r>
-                      <a:r>
-                        <a:rPr lang="en-US" sz="1600" kern="1200" dirty="0" smtClean="0">
-                          <a:effectLst/>
-                        </a:rPr>
-                        <a:t>contains</a:t>
-                      </a:r>
-                      <a:r>
-                        <a:rPr lang="en-US" sz="1600" dirty="0" smtClean="0"/>
-                        <a:t>(</a:t>
-                      </a:r>
-                      <a:r>
-                        <a:rPr lang="en-US" sz="1600" dirty="0" err="1" smtClean="0"/>
-                        <a:t>ReadOnlyPerson</a:t>
-                      </a:r>
-                      <a:r>
-                        <a:rPr lang="en-US" sz="1600" dirty="0" smtClean="0"/>
-                        <a:t> </a:t>
-                      </a:r>
-                      <a:r>
-                        <a:rPr lang="en-US" sz="1600" dirty="0" err="1" smtClean="0"/>
-                        <a:t>toCheck</a:t>
-                      </a:r>
-                      <a:r>
-                        <a:rPr lang="en-US" sz="1600" dirty="0" smtClean="0"/>
-                        <a:t>)</a:t>
-                      </a:r>
-                    </a:p>
-                    <a:p>
-                      <a:pPr algn="just"/>
-                      <a:r>
-                        <a:rPr lang="en-US" sz="1600" baseline="0" dirty="0" smtClean="0"/>
-                        <a:t>+ </a:t>
-                      </a:r>
-                      <a:r>
-                        <a:rPr lang="en-US" sz="1600" kern="1200" dirty="0" smtClean="0">
-                          <a:effectLst/>
-                        </a:rPr>
-                        <a:t>add</a:t>
-                      </a:r>
-                      <a:r>
-                        <a:rPr lang="en-US" sz="1600" dirty="0" smtClean="0"/>
-                        <a:t>(</a:t>
-                      </a:r>
-                      <a:r>
-                        <a:rPr lang="en-US" sz="1600" dirty="0" err="1" smtClean="0"/>
-                        <a:t>ReadOnlyPerson</a:t>
-                      </a:r>
-                      <a:r>
-                        <a:rPr lang="en-US" sz="1600" dirty="0" smtClean="0"/>
-                        <a:t> </a:t>
-                      </a:r>
-                      <a:r>
-                        <a:rPr lang="en-US" sz="1600" dirty="0" err="1" smtClean="0"/>
-                        <a:t>toAdd</a:t>
-                      </a:r>
-                      <a:r>
-                        <a:rPr lang="en-US" sz="1600" dirty="0" smtClean="0"/>
-                        <a:t>)</a:t>
-                      </a:r>
-                      <a:endParaRPr lang="en-US" sz="1600" baseline="0" dirty="0" smtClean="0"/>
-                    </a:p>
-                    <a:p>
-                      <a:pPr algn="just"/>
-                      <a:r>
-                        <a:rPr lang="en-US" sz="1600" baseline="0" dirty="0" smtClean="0"/>
-                        <a:t>+ </a:t>
-                      </a:r>
-                      <a:r>
-                        <a:rPr lang="en-US" sz="1600" kern="1200" dirty="0" err="1" smtClean="0">
-                          <a:effectLst/>
-                        </a:rPr>
-                        <a:t>setPerson</a:t>
-                      </a:r>
-                      <a:r>
-                        <a:rPr lang="en-US" sz="1600" dirty="0" smtClean="0"/>
-                        <a:t>(</a:t>
-                      </a:r>
-                      <a:r>
-                        <a:rPr lang="en-US" sz="1600" dirty="0" err="1" smtClean="0"/>
-                        <a:t>ReadOnlyPerson</a:t>
-                      </a:r>
-                      <a:r>
-                        <a:rPr lang="en-US" sz="1600" dirty="0" smtClean="0"/>
-                        <a:t> target</a:t>
-                      </a:r>
-                      <a:r>
-                        <a:rPr lang="en-US" sz="1600" kern="1200" dirty="0" smtClean="0">
-                          <a:effectLst/>
-                        </a:rPr>
-                        <a:t>, </a:t>
-                      </a:r>
-                      <a:r>
-                        <a:rPr lang="en-US" sz="1600" dirty="0" err="1" smtClean="0"/>
-                        <a:t>ReadOnlyPerson</a:t>
-                      </a:r>
-                      <a:r>
-                        <a:rPr lang="en-US" sz="1600" dirty="0" smtClean="0"/>
-                        <a:t> </a:t>
-                      </a:r>
-                      <a:r>
-                        <a:rPr lang="en-US" sz="1600" dirty="0" err="1" smtClean="0"/>
-                        <a:t>editedPerson</a:t>
-                      </a:r>
-                      <a:r>
-                        <a:rPr lang="en-US" sz="1600" dirty="0" smtClean="0"/>
-                        <a:t>)</a:t>
-                      </a:r>
-                    </a:p>
-                    <a:p>
-                      <a:pPr algn="just"/>
-                      <a:r>
-                        <a:rPr lang="mr-IN" sz="1600" dirty="0" smtClean="0"/>
-                        <a:t>…</a:t>
-                      </a:r>
-                      <a:endParaRPr lang="en-US" sz="1600" dirty="0"/>
-                    </a:p>
-                  </a:txBody>
-                  <a:tcPr/>
-                </a:tc>
-              </a:tr>
-            </a:tbl>
-          </a:graphicData>
-        </a:graphic>
-      </p:graphicFrame>
-      <p:graphicFrame>
-        <p:nvGraphicFramePr>
-          <p:cNvPr id="22" name="Table 21"/>
-          <p:cNvGraphicFramePr>
-            <a:graphicFrameLocks noGrp="1"/>
-          </p:cNvGraphicFramePr>
-          <p:nvPr>
-            <p:extLst>
-              <p:ext uri="{D42A27DB-BD31-4B8C-83A1-F6EECF244321}">
-                <p14:modId xmlns:p14="http://schemas.microsoft.com/office/powerpoint/2010/main" val="1974376187"/>
-              </p:ext>
-            </p:extLst>
-          </p:nvPr>
-        </p:nvGraphicFramePr>
-        <p:xfrm>
-          <a:off x="1312031" y="2623130"/>
-          <a:ext cx="2284070" cy="1112520"/>
-        </p:xfrm>
-        <a:graphic>
-          <a:graphicData uri="http://schemas.openxmlformats.org/drawingml/2006/table">
-            <a:tbl>
-              <a:tblPr firstRow="1" bandRow="1">
-                <a:tableStyleId>{93296810-A885-4BE3-A3E7-6D5BEEA58F35}</a:tableStyleId>
-              </a:tblPr>
-              <a:tblGrid>
-                <a:gridCol w="2284070"/>
-              </a:tblGrid>
-              <a:tr h="370840">
-                <a:tc>
-                  <a:txBody>
-                    <a:bodyPr/>
-                    <a:lstStyle/>
-                    <a:p>
-                      <a:pPr algn="just"/>
-                      <a:r>
-                        <a:rPr lang="en-US" sz="1600" dirty="0" err="1" smtClean="0"/>
-                        <a:t>AddressBookParser</a:t>
-                      </a:r>
-                      <a:endParaRPr lang="en-US" sz="1600" dirty="0"/>
-                    </a:p>
-                  </a:txBody>
-                  <a:tcPr/>
-                </a:tc>
-              </a:tr>
-              <a:tr h="370840">
-                <a:tc>
-                  <a:txBody>
-                    <a:bodyPr/>
-                    <a:lstStyle/>
-                    <a:p>
-                      <a:pPr algn="ctr"/>
-                      <a:r>
-                        <a:rPr lang="mr-IN" dirty="0" smtClean="0"/>
-                        <a:t>…</a:t>
-                      </a:r>
-                      <a:endParaRPr lang="en-US" dirty="0"/>
-                    </a:p>
-                  </a:txBody>
-                  <a:tcPr/>
-                </a:tc>
-              </a:tr>
-              <a:tr h="370840">
-                <a:tc>
-                  <a:txBody>
-                    <a:bodyPr/>
-                    <a:lstStyle/>
-                    <a:p>
-                      <a:pPr algn="ctr"/>
-                      <a:r>
-                        <a:rPr lang="mr-IN" dirty="0" smtClean="0"/>
-                        <a:t>…</a:t>
-                      </a:r>
-                      <a:endParaRPr lang="en-US" dirty="0"/>
-                    </a:p>
-                  </a:txBody>
-                  <a:tcPr/>
-                </a:tc>
-              </a:tr>
-            </a:tbl>
-          </a:graphicData>
-        </a:graphic>
-      </p:graphicFrame>
-      <p:graphicFrame>
-        <p:nvGraphicFramePr>
-          <p:cNvPr id="25" name="Table 24"/>
-          <p:cNvGraphicFramePr>
-            <a:graphicFrameLocks noGrp="1"/>
-          </p:cNvGraphicFramePr>
-          <p:nvPr>
-            <p:extLst>
-              <p:ext uri="{D42A27DB-BD31-4B8C-83A1-F6EECF244321}">
-                <p14:modId xmlns:p14="http://schemas.microsoft.com/office/powerpoint/2010/main" val="1123499173"/>
-              </p:ext>
-            </p:extLst>
-          </p:nvPr>
-        </p:nvGraphicFramePr>
-        <p:xfrm>
-          <a:off x="1329554" y="1137541"/>
-          <a:ext cx="2284070" cy="1112520"/>
-        </p:xfrm>
-        <a:graphic>
-          <a:graphicData uri="http://schemas.openxmlformats.org/drawingml/2006/table">
-            <a:tbl>
-              <a:tblPr firstRow="1" bandRow="1">
-                <a:tableStyleId>{93296810-A885-4BE3-A3E7-6D5BEEA58F35}</a:tableStyleId>
-              </a:tblPr>
-              <a:tblGrid>
-                <a:gridCol w="2284070"/>
-              </a:tblGrid>
-              <a:tr h="370840">
-                <a:tc>
-                  <a:txBody>
-                    <a:bodyPr/>
-                    <a:lstStyle/>
-                    <a:p>
-                      <a:pPr algn="just"/>
-                      <a:r>
-                        <a:rPr lang="en-US" sz="1600" dirty="0" err="1" smtClean="0"/>
-                        <a:t>LogicManager</a:t>
-                      </a:r>
-                      <a:endParaRPr lang="en-US" sz="1600" dirty="0"/>
-                    </a:p>
-                  </a:txBody>
-                  <a:tcPr/>
-                </a:tc>
-              </a:tr>
-              <a:tr h="370840">
-                <a:tc>
-                  <a:txBody>
-                    <a:bodyPr/>
-                    <a:lstStyle/>
-                    <a:p>
-                      <a:pPr algn="ctr"/>
-                      <a:r>
-                        <a:rPr lang="mr-IN" dirty="0" smtClean="0"/>
-                        <a:t>…</a:t>
-                      </a:r>
-                      <a:endParaRPr lang="en-US" dirty="0"/>
-                    </a:p>
-                  </a:txBody>
-                  <a:tcPr/>
-                </a:tc>
-              </a:tr>
-              <a:tr h="370840">
-                <a:tc>
-                  <a:txBody>
-                    <a:bodyPr/>
-                    <a:lstStyle/>
-                    <a:p>
-                      <a:pPr algn="ctr"/>
-                      <a:r>
-                        <a:rPr lang="mr-IN" dirty="0" smtClean="0"/>
-                        <a:t>…</a:t>
-                      </a:r>
-                      <a:endParaRPr lang="en-US" dirty="0"/>
+                        <a:rPr lang="en-US" sz="1400" dirty="0" err="1" smtClean="0"/>
+                        <a:t>resetFontSize</a:t>
+                      </a:r>
+                      <a:endParaRPr lang="en-US" sz="1400" dirty="0" smtClean="0"/>
                     </a:p>
                   </a:txBody>
                   <a:tcPr/>
@@ -5363,16 +4436,14 @@
       </p:graphicFrame>
       <p:cxnSp>
         <p:nvCxnSpPr>
-          <p:cNvPr id="7" name="Straight Arrow Connector 6"/>
-          <p:cNvCxnSpPr>
-            <a:endCxn id="22" idx="0"/>
-          </p:cNvCxnSpPr>
+          <p:cNvPr id="24" name="Straight Arrow Connector 23"/>
+          <p:cNvCxnSpPr/>
           <p:nvPr/>
         </p:nvCxnSpPr>
         <p:spPr>
           <a:xfrm>
-            <a:off x="2454066" y="2250061"/>
-            <a:ext cx="0" cy="373069"/>
+            <a:off x="7102383" y="2207900"/>
+            <a:ext cx="0" cy="332160"/>
           </a:xfrm>
           <a:prstGeom prst="straightConnector1">
             <a:avLst/>
@@ -5398,16 +4469,315 @@
       </p:cxnSp>
       <p:cxnSp>
         <p:nvCxnSpPr>
-          <p:cNvPr id="12" name="Straight Arrow Connector 11"/>
+          <p:cNvPr id="26" name="Straight Arrow Connector 25"/>
+          <p:cNvCxnSpPr/>
+          <p:nvPr/>
+        </p:nvCxnSpPr>
+        <p:spPr>
+          <a:xfrm>
+            <a:off x="7102383" y="4013260"/>
+            <a:ext cx="80433" cy="609657"/>
+          </a:xfrm>
+          <a:prstGeom prst="straightConnector1">
+            <a:avLst/>
+          </a:prstGeom>
+          <a:ln>
+            <a:tailEnd type="triangle"/>
+          </a:ln>
+        </p:spPr>
+        <p:style>
+          <a:lnRef idx="1">
+            <a:schemeClr val="accent1"/>
+          </a:lnRef>
+          <a:fillRef idx="0">
+            <a:schemeClr val="accent1"/>
+          </a:fillRef>
+          <a:effectRef idx="0">
+            <a:schemeClr val="accent1"/>
+          </a:effectRef>
+          <a:fontRef idx="minor">
+            <a:schemeClr val="tx1"/>
+          </a:fontRef>
+        </p:style>
+      </p:cxnSp>
+      <p:sp>
+        <p:nvSpPr>
+          <p:cNvPr id="27" name="TextBox 26"/>
+          <p:cNvSpPr txBox="1"/>
+          <p:nvPr/>
+        </p:nvSpPr>
+        <p:spPr>
+          <a:xfrm>
+            <a:off x="474133" y="393564"/>
+            <a:ext cx="3463833" cy="276999"/>
+          </a:xfrm>
+          <a:prstGeom prst="rect">
+            <a:avLst/>
+          </a:prstGeom>
+        </p:spPr>
+        <p:style>
+          <a:lnRef idx="2">
+            <a:schemeClr val="dk1"/>
+          </a:lnRef>
+          <a:fillRef idx="1">
+            <a:schemeClr val="lt1"/>
+          </a:fillRef>
+          <a:effectRef idx="0">
+            <a:schemeClr val="dk1"/>
+          </a:effectRef>
+          <a:fontRef idx="minor">
+            <a:schemeClr val="dk1"/>
+          </a:fontRef>
+        </p:style>
+        <p:txBody>
+          <a:bodyPr wrap="none" rtlCol="0">
+            <a:spAutoFit/>
+          </a:bodyPr>
+          <a:lstStyle/>
+          <a:p>
+            <a:r>
+              <a:rPr lang="en-US" sz="1200" dirty="0" smtClean="0"/>
+              <a:t>UML Class Diagram for Font Size Change </a:t>
+            </a:r>
+            <a:r>
+              <a:rPr lang="en-US" sz="1200" smtClean="0"/>
+              <a:t>Through </a:t>
+            </a:r>
+            <a:r>
+              <a:rPr lang="en-US" sz="1200" smtClean="0"/>
+              <a:t>CLI</a:t>
+            </a:r>
+            <a:endParaRPr lang="en-US" sz="1200" dirty="0"/>
+          </a:p>
+        </p:txBody>
+      </p:sp>
+      <p:graphicFrame>
+        <p:nvGraphicFramePr>
+          <p:cNvPr id="28" name="Table 27"/>
+          <p:cNvGraphicFramePr>
+            <a:graphicFrameLocks noGrp="1"/>
+          </p:cNvGraphicFramePr>
+          <p:nvPr>
+            <p:extLst>
+              <p:ext uri="{D42A27DB-BD31-4B8C-83A1-F6EECF244321}">
+                <p14:modId xmlns:p14="http://schemas.microsoft.com/office/powerpoint/2010/main" val="524193321"/>
+              </p:ext>
+            </p:extLst>
+          </p:nvPr>
+        </p:nvGraphicFramePr>
+        <p:xfrm>
+          <a:off x="9440369" y="2753420"/>
+          <a:ext cx="2123204" cy="1259840"/>
+        </p:xfrm>
+        <a:graphic>
+          <a:graphicData uri="http://schemas.openxmlformats.org/drawingml/2006/table">
+            <a:tbl>
+              <a:tblPr firstRow="1" bandRow="1">
+                <a:tableStyleId>{5C22544A-7EE6-4342-B048-85BDC9FD1C3A}</a:tableStyleId>
+              </a:tblPr>
+              <a:tblGrid>
+                <a:gridCol w="2123204"/>
+              </a:tblGrid>
+              <a:tr h="370840">
+                <a:tc>
+                  <a:txBody>
+                    <a:bodyPr/>
+                    <a:lstStyle/>
+                    <a:p>
+                      <a:pPr algn="just"/>
+                      <a:r>
+                        <a:rPr lang="en-US" sz="1400" dirty="0" err="1" smtClean="0"/>
+                        <a:t>TaskCard</a:t>
+                      </a:r>
+                      <a:endParaRPr lang="en-US" sz="1400" dirty="0"/>
+                    </a:p>
+                  </a:txBody>
+                  <a:tcPr/>
+                </a:tc>
+              </a:tr>
+              <a:tr h="370840">
+                <a:tc>
+                  <a:txBody>
+                    <a:bodyPr/>
+                    <a:lstStyle/>
+                    <a:p>
+                      <a:pPr marL="0" indent="0" algn="ctr">
+                        <a:buFontTx/>
+                        <a:buNone/>
+                      </a:pPr>
+                      <a:r>
+                        <a:rPr lang="mr-IN" sz="1400" dirty="0" smtClean="0"/>
+                        <a:t>…</a:t>
+                      </a:r>
+                      <a:endParaRPr lang="en-US" sz="1400" dirty="0"/>
+                    </a:p>
+                  </a:txBody>
+                  <a:tcPr/>
+                </a:tc>
+              </a:tr>
+              <a:tr h="370840">
+                <a:tc>
+                  <a:txBody>
+                    <a:bodyPr/>
+                    <a:lstStyle/>
+                    <a:p>
+                      <a:pPr algn="just"/>
+                      <a:r>
+                        <a:rPr lang="en-US" sz="1400" dirty="0" smtClean="0"/>
+                        <a:t>+ </a:t>
+                      </a:r>
+                      <a:r>
+                        <a:rPr lang="en-US" sz="1400" dirty="0" err="1" smtClean="0"/>
+                        <a:t>updateAttributeSizes</a:t>
+                      </a:r>
+                      <a:r>
+                        <a:rPr lang="en-US" sz="1400" dirty="0" smtClean="0"/>
+                        <a:t>()</a:t>
+                      </a:r>
+                    </a:p>
+                    <a:p>
+                      <a:pPr algn="ctr"/>
+                      <a:r>
+                        <a:rPr lang="mr-IN" sz="1400" dirty="0" smtClean="0"/>
+                        <a:t>…</a:t>
+                      </a:r>
+                      <a:endParaRPr lang="en-US" sz="1400" dirty="0"/>
+                    </a:p>
+                  </a:txBody>
+                  <a:tcPr/>
+                </a:tc>
+              </a:tr>
+            </a:tbl>
+          </a:graphicData>
+        </a:graphic>
+      </p:graphicFrame>
+      <p:graphicFrame>
+        <p:nvGraphicFramePr>
+          <p:cNvPr id="30" name="Table 29"/>
+          <p:cNvGraphicFramePr>
+            <a:graphicFrameLocks noGrp="1"/>
+          </p:cNvGraphicFramePr>
+          <p:nvPr>
+            <p:extLst>
+              <p:ext uri="{D42A27DB-BD31-4B8C-83A1-F6EECF244321}">
+                <p14:modId xmlns:p14="http://schemas.microsoft.com/office/powerpoint/2010/main" val="1264602240"/>
+              </p:ext>
+            </p:extLst>
+          </p:nvPr>
+        </p:nvGraphicFramePr>
+        <p:xfrm>
+          <a:off x="9279503" y="670563"/>
+          <a:ext cx="2284070" cy="1473200"/>
+        </p:xfrm>
+        <a:graphic>
+          <a:graphicData uri="http://schemas.openxmlformats.org/drawingml/2006/table">
+            <a:tbl>
+              <a:tblPr firstRow="1" bandRow="1">
+                <a:tableStyleId>{5C22544A-7EE6-4342-B048-85BDC9FD1C3A}</a:tableStyleId>
+              </a:tblPr>
+              <a:tblGrid>
+                <a:gridCol w="2284070"/>
+              </a:tblGrid>
+              <a:tr h="370840">
+                <a:tc>
+                  <a:txBody>
+                    <a:bodyPr/>
+                    <a:lstStyle/>
+                    <a:p>
+                      <a:pPr algn="just"/>
+                      <a:r>
+                        <a:rPr lang="en-US" sz="1600" dirty="0" err="1" smtClean="0"/>
+                        <a:t>TaskListPanel</a:t>
+                      </a:r>
+                      <a:endParaRPr lang="en-US" sz="1600" dirty="0"/>
+                    </a:p>
+                  </a:txBody>
+                  <a:tcPr/>
+                </a:tc>
+              </a:tr>
+              <a:tr h="370840">
+                <a:tc>
+                  <a:txBody>
+                    <a:bodyPr/>
+                    <a:lstStyle/>
+                    <a:p>
+                      <a:pPr algn="ctr"/>
+                      <a:r>
+                        <a:rPr lang="mr-IN" dirty="0" smtClean="0"/>
+                        <a:t>…</a:t>
+                      </a:r>
+                      <a:endParaRPr lang="en-US" dirty="0"/>
+                    </a:p>
+                  </a:txBody>
+                  <a:tcPr/>
+                </a:tc>
+              </a:tr>
+              <a:tr h="370840">
+                <a:tc>
+                  <a:txBody>
+                    <a:bodyPr/>
+                    <a:lstStyle/>
+                    <a:p>
+                      <a:pPr algn="just"/>
+                      <a:r>
+                        <a:rPr lang="en-US" sz="1400" dirty="0" smtClean="0"/>
+                        <a:t>+</a:t>
+                      </a:r>
+                      <a:r>
+                        <a:rPr lang="en-US" sz="1400" baseline="0" dirty="0" smtClean="0"/>
+                        <a:t> </a:t>
+                      </a:r>
+                      <a:r>
+                        <a:rPr lang="en-US" sz="1400" baseline="0" dirty="0" err="1" smtClean="0"/>
+                        <a:t>increaseFontSize</a:t>
+                      </a:r>
+                      <a:endParaRPr lang="en-US" sz="1400" baseline="0" dirty="0" smtClean="0"/>
+                    </a:p>
+                    <a:p>
+                      <a:pPr algn="just"/>
+                      <a:r>
+                        <a:rPr lang="en-US" sz="1400" baseline="0" dirty="0" smtClean="0"/>
+                        <a:t>+ </a:t>
+                      </a:r>
+                      <a:r>
+                        <a:rPr lang="en-US" sz="1400" baseline="0" dirty="0" err="1" smtClean="0"/>
+                        <a:t>decreaseFontSize</a:t>
+                      </a:r>
+                      <a:endParaRPr lang="en-US" sz="1400" baseline="0" dirty="0" smtClean="0"/>
+                    </a:p>
+                    <a:p>
+                      <a:pPr algn="just"/>
+                      <a:r>
+                        <a:rPr lang="en-US" sz="1400" baseline="0" dirty="0" smtClean="0"/>
+                        <a:t>+ </a:t>
+                      </a:r>
+                      <a:r>
+                        <a:rPr lang="en-US" sz="1400" baseline="0" dirty="0" err="1" smtClean="0"/>
+                        <a:t>resetFontSize</a:t>
+                      </a:r>
+                      <a:endParaRPr lang="en-US" sz="1400" dirty="0" smtClean="0"/>
+                    </a:p>
+                  </a:txBody>
+                  <a:tcPr/>
+                </a:tc>
+              </a:tr>
+            </a:tbl>
+          </a:graphicData>
+        </a:graphic>
+      </p:graphicFrame>
+      <p:cxnSp>
+        <p:nvCxnSpPr>
+          <p:cNvPr id="32" name="Straight Arrow Connector 31"/>
           <p:cNvCxnSpPr>
-            <a:endCxn id="18" idx="0"/>
+            <a:stCxn id="23" idx="3"/>
+            <a:endCxn id="30" idx="1"/>
           </p:cNvCxnSpPr>
           <p:nvPr/>
         </p:nvCxnSpPr>
         <p:spPr>
-          <a:xfrm>
-            <a:off x="2454066" y="3735650"/>
-            <a:ext cx="0" cy="439477"/>
+          <a:xfrm flipV="1">
+            <a:off x="8244418" y="1407163"/>
+            <a:ext cx="1035085" cy="64137"/>
           </a:xfrm>
           <a:prstGeom prst="straightConnector1">
             <a:avLst/>
@@ -5433,16 +4803,403 @@
       </p:cxnSp>
       <p:cxnSp>
         <p:nvCxnSpPr>
-          <p:cNvPr id="29" name="Straight Arrow Connector 28"/>
+          <p:cNvPr id="37" name="Straight Arrow Connector 36"/>
           <p:cNvCxnSpPr>
-            <a:endCxn id="16" idx="1"/>
+            <a:stCxn id="30" idx="2"/>
+            <a:endCxn id="28" idx="0"/>
           </p:cNvCxnSpPr>
           <p:nvPr/>
         </p:nvCxnSpPr>
         <p:spPr>
-          <a:xfrm flipV="1">
-            <a:off x="3596101" y="2623130"/>
-            <a:ext cx="679844" cy="1922837"/>
+          <a:xfrm>
+            <a:off x="10421538" y="2143763"/>
+            <a:ext cx="80433" cy="609657"/>
+          </a:xfrm>
+          <a:prstGeom prst="straightConnector1">
+            <a:avLst/>
+          </a:prstGeom>
+          <a:ln>
+            <a:tailEnd type="triangle"/>
+          </a:ln>
+        </p:spPr>
+        <p:style>
+          <a:lnRef idx="1">
+            <a:schemeClr val="accent1"/>
+          </a:lnRef>
+          <a:fillRef idx="0">
+            <a:schemeClr val="accent1"/>
+          </a:fillRef>
+          <a:effectRef idx="0">
+            <a:schemeClr val="accent1"/>
+          </a:effectRef>
+          <a:fontRef idx="minor">
+            <a:schemeClr val="tx1"/>
+          </a:fontRef>
+        </p:style>
+      </p:cxnSp>
+      <p:graphicFrame>
+        <p:nvGraphicFramePr>
+          <p:cNvPr id="38" name="Table 37"/>
+          <p:cNvGraphicFramePr>
+            <a:graphicFrameLocks noGrp="1"/>
+          </p:cNvGraphicFramePr>
+          <p:nvPr>
+            <p:extLst>
+              <p:ext uri="{D42A27DB-BD31-4B8C-83A1-F6EECF244321}">
+                <p14:modId xmlns:p14="http://schemas.microsoft.com/office/powerpoint/2010/main" val="668056921"/>
+              </p:ext>
+            </p:extLst>
+          </p:nvPr>
+        </p:nvGraphicFramePr>
+        <p:xfrm>
+          <a:off x="760460" y="920652"/>
+          <a:ext cx="2284070" cy="1046480"/>
+        </p:xfrm>
+        <a:graphic>
+          <a:graphicData uri="http://schemas.openxmlformats.org/drawingml/2006/table">
+            <a:tbl>
+              <a:tblPr firstRow="1" bandRow="1">
+                <a:tableStyleId>{5C22544A-7EE6-4342-B048-85BDC9FD1C3A}</a:tableStyleId>
+              </a:tblPr>
+              <a:tblGrid>
+                <a:gridCol w="2284070"/>
+              </a:tblGrid>
+              <a:tr h="0">
+                <a:tc>
+                  <a:txBody>
+                    <a:bodyPr/>
+                    <a:lstStyle/>
+                    <a:p>
+                      <a:pPr algn="just"/>
+                      <a:r>
+                        <a:rPr lang="en-US" sz="1400" dirty="0" err="1" smtClean="0"/>
+                        <a:t>AddressBookParser</a:t>
+                      </a:r>
+                      <a:endParaRPr lang="en-US" sz="1400" dirty="0"/>
+                    </a:p>
+                  </a:txBody>
+                  <a:tcPr/>
+                </a:tc>
+              </a:tr>
+              <a:tr h="370840">
+                <a:tc>
+                  <a:txBody>
+                    <a:bodyPr/>
+                    <a:lstStyle/>
+                    <a:p>
+                      <a:pPr algn="ctr"/>
+                      <a:r>
+                        <a:rPr lang="mr-IN" sz="1400" dirty="0" smtClean="0"/>
+                        <a:t>…</a:t>
+                      </a:r>
+                      <a:endParaRPr lang="en-US" sz="1400" dirty="0"/>
+                    </a:p>
+                  </a:txBody>
+                  <a:tcPr/>
+                </a:tc>
+              </a:tr>
+              <a:tr h="370840">
+                <a:tc>
+                  <a:txBody>
+                    <a:bodyPr/>
+                    <a:lstStyle/>
+                    <a:p>
+                      <a:pPr algn="ctr"/>
+                      <a:r>
+                        <a:rPr lang="mr-IN" sz="1400" dirty="0" smtClean="0"/>
+                        <a:t>…</a:t>
+                      </a:r>
+                      <a:r>
+                        <a:rPr lang="en-US" sz="1400" dirty="0" smtClean="0"/>
+                        <a:t>.</a:t>
+                      </a:r>
+                    </a:p>
+                  </a:txBody>
+                  <a:tcPr/>
+                </a:tc>
+              </a:tr>
+            </a:tbl>
+          </a:graphicData>
+        </a:graphic>
+      </p:graphicFrame>
+      <p:graphicFrame>
+        <p:nvGraphicFramePr>
+          <p:cNvPr id="39" name="Table 38"/>
+          <p:cNvGraphicFramePr>
+            <a:graphicFrameLocks noGrp="1"/>
+          </p:cNvGraphicFramePr>
+          <p:nvPr>
+            <p:extLst>
+              <p:ext uri="{D42A27DB-BD31-4B8C-83A1-F6EECF244321}">
+                <p14:modId xmlns:p14="http://schemas.microsoft.com/office/powerpoint/2010/main" val="1956581898"/>
+              </p:ext>
+            </p:extLst>
+          </p:nvPr>
+        </p:nvGraphicFramePr>
+        <p:xfrm>
+          <a:off x="760460" y="2290515"/>
+          <a:ext cx="2284070" cy="1193800"/>
+        </p:xfrm>
+        <a:graphic>
+          <a:graphicData uri="http://schemas.openxmlformats.org/drawingml/2006/table">
+            <a:tbl>
+              <a:tblPr firstRow="1" bandRow="1">
+                <a:tableStyleId>{5C22544A-7EE6-4342-B048-85BDC9FD1C3A}</a:tableStyleId>
+              </a:tblPr>
+              <a:tblGrid>
+                <a:gridCol w="2284070"/>
+              </a:tblGrid>
+              <a:tr h="0">
+                <a:tc>
+                  <a:txBody>
+                    <a:bodyPr/>
+                    <a:lstStyle/>
+                    <a:p>
+                      <a:pPr algn="just"/>
+                      <a:r>
+                        <a:rPr lang="en-US" sz="1400" dirty="0" err="1" smtClean="0"/>
+                        <a:t>FontSizeCommand</a:t>
+                      </a:r>
+                      <a:endParaRPr lang="en-US" sz="1400" dirty="0"/>
+                    </a:p>
+                  </a:txBody>
+                  <a:tcPr/>
+                </a:tc>
+              </a:tr>
+              <a:tr h="370840">
+                <a:tc>
+                  <a:txBody>
+                    <a:bodyPr/>
+                    <a:lstStyle/>
+                    <a:p>
+                      <a:pPr algn="l"/>
+                      <a:r>
+                        <a:rPr lang="en-US" sz="1400" dirty="0" smtClean="0"/>
+                        <a:t>+</a:t>
+                      </a:r>
+                      <a:r>
+                        <a:rPr lang="en-US" sz="1400" baseline="0" dirty="0" smtClean="0"/>
+                        <a:t> option: String</a:t>
+                      </a:r>
+                    </a:p>
+                    <a:p>
+                      <a:pPr algn="ctr"/>
+                      <a:r>
+                        <a:rPr lang="mr-IN" sz="1400" baseline="0" dirty="0" smtClean="0"/>
+                        <a:t>…</a:t>
+                      </a:r>
+                      <a:r>
+                        <a:rPr lang="en-US" sz="1400" baseline="0" dirty="0" smtClean="0"/>
+                        <a:t>.</a:t>
+                      </a:r>
+                      <a:endParaRPr lang="en-US" sz="1400" dirty="0"/>
+                    </a:p>
+                  </a:txBody>
+                  <a:tcPr/>
+                </a:tc>
+              </a:tr>
+              <a:tr h="370840">
+                <a:tc>
+                  <a:txBody>
+                    <a:bodyPr/>
+                    <a:lstStyle/>
+                    <a:p>
+                      <a:pPr algn="l"/>
+                      <a:r>
+                        <a:rPr lang="en-US" sz="1400" dirty="0" smtClean="0"/>
+                        <a:t>+</a:t>
+                      </a:r>
+                      <a:r>
+                        <a:rPr lang="en-US" sz="1400" baseline="0" dirty="0" smtClean="0"/>
+                        <a:t> execute()</a:t>
+                      </a:r>
+                      <a:endParaRPr lang="en-US" sz="1400" dirty="0" smtClean="0"/>
+                    </a:p>
+                  </a:txBody>
+                  <a:tcPr/>
+                </a:tc>
+              </a:tr>
+            </a:tbl>
+          </a:graphicData>
+        </a:graphic>
+      </p:graphicFrame>
+      <p:cxnSp>
+        <p:nvCxnSpPr>
+          <p:cNvPr id="40" name="Straight Arrow Connector 39"/>
+          <p:cNvCxnSpPr>
+            <a:stCxn id="38" idx="2"/>
+            <a:endCxn id="39" idx="0"/>
+          </p:cNvCxnSpPr>
+          <p:nvPr/>
+        </p:nvCxnSpPr>
+        <p:spPr>
+          <a:xfrm>
+            <a:off x="1902495" y="1967132"/>
+            <a:ext cx="0" cy="323383"/>
+          </a:xfrm>
+          <a:prstGeom prst="straightConnector1">
+            <a:avLst/>
+          </a:prstGeom>
+          <a:ln>
+            <a:tailEnd type="triangle"/>
+          </a:ln>
+        </p:spPr>
+        <p:style>
+          <a:lnRef idx="1">
+            <a:schemeClr val="accent1"/>
+          </a:lnRef>
+          <a:fillRef idx="0">
+            <a:schemeClr val="accent1"/>
+          </a:fillRef>
+          <a:effectRef idx="0">
+            <a:schemeClr val="accent1"/>
+          </a:effectRef>
+          <a:fontRef idx="minor">
+            <a:schemeClr val="tx1"/>
+          </a:fontRef>
+        </p:style>
+      </p:cxnSp>
+      <p:graphicFrame>
+        <p:nvGraphicFramePr>
+          <p:cNvPr id="41" name="Table 40"/>
+          <p:cNvGraphicFramePr>
+            <a:graphicFrameLocks noGrp="1"/>
+          </p:cNvGraphicFramePr>
+          <p:nvPr>
+            <p:extLst>
+              <p:ext uri="{D42A27DB-BD31-4B8C-83A1-F6EECF244321}">
+                <p14:modId xmlns:p14="http://schemas.microsoft.com/office/powerpoint/2010/main" val="1582231474"/>
+              </p:ext>
+            </p:extLst>
+          </p:nvPr>
+        </p:nvGraphicFramePr>
+        <p:xfrm>
+          <a:off x="776667" y="4282696"/>
+          <a:ext cx="2284070" cy="1407160"/>
+        </p:xfrm>
+        <a:graphic>
+          <a:graphicData uri="http://schemas.openxmlformats.org/drawingml/2006/table">
+            <a:tbl>
+              <a:tblPr firstRow="1" bandRow="1">
+                <a:tableStyleId>{5C22544A-7EE6-4342-B048-85BDC9FD1C3A}</a:tableStyleId>
+              </a:tblPr>
+              <a:tblGrid>
+                <a:gridCol w="2284070"/>
+              </a:tblGrid>
+              <a:tr h="0">
+                <a:tc>
+                  <a:txBody>
+                    <a:bodyPr/>
+                    <a:lstStyle/>
+                    <a:p>
+                      <a:pPr algn="just"/>
+                      <a:r>
+                        <a:rPr lang="en-US" sz="1400" dirty="0" err="1" smtClean="0"/>
+                        <a:t>ModelManager</a:t>
+                      </a:r>
+                      <a:endParaRPr lang="en-US" sz="1400" dirty="0"/>
+                    </a:p>
+                  </a:txBody>
+                  <a:tcPr/>
+                </a:tc>
+              </a:tr>
+              <a:tr h="370840">
+                <a:tc>
+                  <a:txBody>
+                    <a:bodyPr/>
+                    <a:lstStyle/>
+                    <a:p>
+                      <a:pPr algn="ctr"/>
+                      <a:r>
+                        <a:rPr lang="mr-IN" sz="1400" baseline="0" dirty="0" smtClean="0"/>
+                        <a:t>…</a:t>
+                      </a:r>
+                      <a:r>
+                        <a:rPr lang="en-US" sz="1400" baseline="0" dirty="0" smtClean="0"/>
+                        <a:t>.</a:t>
+                      </a:r>
+                      <a:endParaRPr lang="en-US" sz="1400" dirty="0"/>
+                    </a:p>
+                  </a:txBody>
+                  <a:tcPr/>
+                </a:tc>
+              </a:tr>
+              <a:tr h="370840">
+                <a:tc>
+                  <a:txBody>
+                    <a:bodyPr/>
+                    <a:lstStyle/>
+                    <a:p>
+                      <a:pPr algn="l"/>
+                      <a:r>
+                        <a:rPr lang="en-US" sz="1400" dirty="0" smtClean="0"/>
+                        <a:t>+</a:t>
+                      </a:r>
+                      <a:r>
+                        <a:rPr lang="en-US" sz="1400" baseline="0" dirty="0" smtClean="0"/>
+                        <a:t> </a:t>
+                      </a:r>
+                      <a:r>
+                        <a:rPr lang="en-US" sz="1400" baseline="0" dirty="0" err="1" smtClean="0"/>
+                        <a:t>increaseFontSize</a:t>
+                      </a:r>
+                      <a:r>
+                        <a:rPr lang="en-US" sz="1400" baseline="0" dirty="0" smtClean="0"/>
+                        <a:t>()</a:t>
+                      </a:r>
+                    </a:p>
+                    <a:p>
+                      <a:pPr algn="l"/>
+                      <a:r>
+                        <a:rPr lang="en-US" sz="1400" baseline="0" dirty="0" smtClean="0"/>
+                        <a:t>+ </a:t>
+                      </a:r>
+                      <a:r>
+                        <a:rPr lang="en-US" sz="1400" baseline="0" dirty="0" err="1" smtClean="0"/>
+                        <a:t>decreaseFontSize</a:t>
+                      </a:r>
+                      <a:r>
+                        <a:rPr lang="en-US" sz="1400" baseline="0" dirty="0" smtClean="0"/>
+                        <a:t>()</a:t>
+                      </a:r>
+                    </a:p>
+                    <a:p>
+                      <a:pPr algn="l"/>
+                      <a:r>
+                        <a:rPr lang="en-US" sz="1400" baseline="0" dirty="0" smtClean="0"/>
+                        <a:t>+ </a:t>
+                      </a:r>
+                      <a:r>
+                        <a:rPr lang="en-US" sz="1400" baseline="0" dirty="0" err="1" smtClean="0"/>
+                        <a:t>resetFontSize</a:t>
+                      </a:r>
+                      <a:r>
+                        <a:rPr lang="en-US" sz="1400" baseline="0" dirty="0" smtClean="0"/>
+                        <a:t>()</a:t>
+                      </a:r>
+                      <a:endParaRPr lang="en-US" sz="1400" dirty="0" smtClean="0"/>
+                    </a:p>
+                  </a:txBody>
+                  <a:tcPr/>
+                </a:tc>
+              </a:tr>
+            </a:tbl>
+          </a:graphicData>
+        </a:graphic>
+      </p:graphicFrame>
+      <p:cxnSp>
+        <p:nvCxnSpPr>
+          <p:cNvPr id="42" name="Straight Arrow Connector 41"/>
+          <p:cNvCxnSpPr>
+            <a:stCxn id="39" idx="2"/>
+            <a:endCxn id="41" idx="0"/>
+          </p:cNvCxnSpPr>
+          <p:nvPr/>
+        </p:nvCxnSpPr>
+        <p:spPr>
+          <a:xfrm>
+            <a:off x="1902495" y="3484315"/>
+            <a:ext cx="16207" cy="798381"/>
           </a:xfrm>
           <a:prstGeom prst="straightConnector1">
             <a:avLst/>
@@ -5468,16 +5225,17 @@
       </p:cxnSp>
       <p:cxnSp>
         <p:nvCxnSpPr>
-          <p:cNvPr id="31" name="Straight Arrow Connector 30"/>
+          <p:cNvPr id="43" name="Straight Arrow Connector 42"/>
           <p:cNvCxnSpPr>
-            <a:endCxn id="19" idx="1"/>
+            <a:stCxn id="41" idx="3"/>
+            <a:endCxn id="23" idx="1"/>
           </p:cNvCxnSpPr>
           <p:nvPr/>
         </p:nvCxnSpPr>
         <p:spPr>
           <a:xfrm flipV="1">
-            <a:off x="5944597" y="2504118"/>
-            <a:ext cx="697368" cy="346342"/>
+            <a:off x="3060737" y="1471300"/>
+            <a:ext cx="2899611" cy="3514976"/>
           </a:xfrm>
           <a:prstGeom prst="straightConnector1">
             <a:avLst/>
@@ -5501,92 +5259,6 @@
           </a:fontRef>
         </p:style>
       </p:cxnSp>
-      <p:cxnSp>
-        <p:nvCxnSpPr>
-          <p:cNvPr id="33" name="Straight Arrow Connector 32"/>
-          <p:cNvCxnSpPr>
-            <a:endCxn id="20" idx="0"/>
-          </p:cNvCxnSpPr>
-          <p:nvPr/>
-        </p:nvCxnSpPr>
-        <p:spPr>
-          <a:xfrm flipH="1">
-            <a:off x="7425545" y="3849740"/>
-            <a:ext cx="1368500" cy="325387"/>
-          </a:xfrm>
-          <a:prstGeom prst="straightConnector1">
-            <a:avLst/>
-          </a:prstGeom>
-          <a:ln>
-            <a:tailEnd type="triangle"/>
-          </a:ln>
-        </p:spPr>
-        <p:style>
-          <a:lnRef idx="1">
-            <a:schemeClr val="accent1"/>
-          </a:lnRef>
-          <a:fillRef idx="0">
-            <a:schemeClr val="accent1"/>
-          </a:fillRef>
-          <a:effectRef idx="0">
-            <a:schemeClr val="accent1"/>
-          </a:effectRef>
-          <a:fontRef idx="minor">
-            <a:schemeClr val="tx1"/>
-          </a:fontRef>
-        </p:style>
-      </p:cxnSp>
-      <p:sp>
-        <p:nvSpPr>
-          <p:cNvPr id="35" name="TextBox 34"/>
-          <p:cNvSpPr txBox="1"/>
-          <p:nvPr/>
-        </p:nvSpPr>
-        <p:spPr>
-          <a:xfrm>
-            <a:off x="474133" y="393564"/>
-            <a:ext cx="6226833" cy="369332"/>
-          </a:xfrm>
-          <a:prstGeom prst="rect">
-            <a:avLst/>
-          </a:prstGeom>
-        </p:spPr>
-        <p:style>
-          <a:lnRef idx="2">
-            <a:schemeClr val="dk1"/>
-          </a:lnRef>
-          <a:fillRef idx="1">
-            <a:schemeClr val="lt1"/>
-          </a:fillRef>
-          <a:effectRef idx="0">
-            <a:schemeClr val="dk1"/>
-          </a:effectRef>
-          <a:fontRef idx="minor">
-            <a:schemeClr val="dk1"/>
-          </a:fontRef>
-        </p:style>
-        <p:txBody>
-          <a:bodyPr wrap="none" rtlCol="0">
-            <a:spAutoFit/>
-          </a:bodyPr>
-          <a:lstStyle/>
-          <a:p>
-            <a:r>
-              <a:rPr lang="en-US" dirty="0" smtClean="0"/>
-              <a:t>UML Class Diagram for </a:t>
-            </a:r>
-            <a:r>
-              <a:rPr lang="en-US" dirty="0" smtClean="0"/>
-              <a:t>Font Size Change Through </a:t>
-            </a:r>
-            <a:r>
-              <a:rPr lang="en-US" dirty="0" err="1" smtClean="0"/>
-              <a:t>FontCommand</a:t>
-            </a:r>
-            <a:endParaRPr lang="en-US" dirty="0"/>
-          </a:p>
-        </p:txBody>
-      </p:sp>
     </p:spTree>
     <p:extLst>
       <p:ext uri="{BB962C8B-B14F-4D97-AF65-F5344CB8AC3E}">

</xml_diff>

<commit_message>
[DG] Updated developer guide to reflect new implementation for font size changes
</commit_message>
<xml_diff>
--- a/docs/diagrams/FontSizeCommandDiagrams.pptx
+++ b/docs/diagrams/FontSizeCommandDiagrams.pptx
@@ -5,11 +5,10 @@
     <p:sldMasterId id="2147483672" r:id="rId1"/>
   </p:sldMasterIdLst>
   <p:notesMasterIdLst>
-    <p:notesMasterId r:id="rId4"/>
+    <p:notesMasterId r:id="rId3"/>
   </p:notesMasterIdLst>
   <p:sldIdLst>
     <p:sldId id="256" r:id="rId2"/>
-    <p:sldId id="257" r:id="rId3"/>
   </p:sldIdLst>
   <p:sldSz cx="12192000" cy="6858000"/>
   <p:notesSz cx="6858000" cy="9144000"/>
@@ -198,7 +197,7 @@
           <a:p>
             <a:fld id="{756A9B74-E80F-5C4E-A7DD-E49C20F7C5ED}" type="datetimeFigureOut">
               <a:rPr lang="en-US" smtClean="0"/>
-              <a:t>11/4/17</a:t>
+              <a:t>11/5/17</a:t>
             </a:fld>
             <a:endParaRPr lang="en-US"/>
           </a:p>
@@ -597,7 +596,7 @@
           <a:p>
             <a:fld id="{4C707D6F-0D04-EC44-A702-F7C7F0C5C2B0}" type="datetimeFigureOut">
               <a:rPr lang="en-US" smtClean="0"/>
-              <a:t>11/4/17</a:t>
+              <a:t>11/5/17</a:t>
             </a:fld>
             <a:endParaRPr lang="en-US"/>
           </a:p>
@@ -762,7 +761,7 @@
           <a:p>
             <a:fld id="{4C707D6F-0D04-EC44-A702-F7C7F0C5C2B0}" type="datetimeFigureOut">
               <a:rPr lang="en-US" smtClean="0"/>
-              <a:t>11/4/17</a:t>
+              <a:t>11/5/17</a:t>
             </a:fld>
             <a:endParaRPr lang="en-US"/>
           </a:p>
@@ -937,7 +936,7 @@
           <a:p>
             <a:fld id="{4C707D6F-0D04-EC44-A702-F7C7F0C5C2B0}" type="datetimeFigureOut">
               <a:rPr lang="en-US" smtClean="0"/>
-              <a:t>11/4/17</a:t>
+              <a:t>11/5/17</a:t>
             </a:fld>
             <a:endParaRPr lang="en-US"/>
           </a:p>
@@ -1102,7 +1101,7 @@
           <a:p>
             <a:fld id="{4C707D6F-0D04-EC44-A702-F7C7F0C5C2B0}" type="datetimeFigureOut">
               <a:rPr lang="en-US" smtClean="0"/>
-              <a:t>11/4/17</a:t>
+              <a:t>11/5/17</a:t>
             </a:fld>
             <a:endParaRPr lang="en-US"/>
           </a:p>
@@ -1343,7 +1342,7 @@
           <a:p>
             <a:fld id="{4C707D6F-0D04-EC44-A702-F7C7F0C5C2B0}" type="datetimeFigureOut">
               <a:rPr lang="en-US" smtClean="0"/>
-              <a:t>11/4/17</a:t>
+              <a:t>11/5/17</a:t>
             </a:fld>
             <a:endParaRPr lang="en-US"/>
           </a:p>
@@ -1570,7 +1569,7 @@
           <a:p>
             <a:fld id="{4C707D6F-0D04-EC44-A702-F7C7F0C5C2B0}" type="datetimeFigureOut">
               <a:rPr lang="en-US" smtClean="0"/>
-              <a:t>11/4/17</a:t>
+              <a:t>11/5/17</a:t>
             </a:fld>
             <a:endParaRPr lang="en-US"/>
           </a:p>
@@ -1932,7 +1931,7 @@
           <a:p>
             <a:fld id="{4C707D6F-0D04-EC44-A702-F7C7F0C5C2B0}" type="datetimeFigureOut">
               <a:rPr lang="en-US" smtClean="0"/>
-              <a:t>11/4/17</a:t>
+              <a:t>11/5/17</a:t>
             </a:fld>
             <a:endParaRPr lang="en-US"/>
           </a:p>
@@ -2045,7 +2044,7 @@
           <a:p>
             <a:fld id="{4C707D6F-0D04-EC44-A702-F7C7F0C5C2B0}" type="datetimeFigureOut">
               <a:rPr lang="en-US" smtClean="0"/>
-              <a:t>11/4/17</a:t>
+              <a:t>11/5/17</a:t>
             </a:fld>
             <a:endParaRPr lang="en-US"/>
           </a:p>
@@ -2135,7 +2134,7 @@
           <a:p>
             <a:fld id="{4C707D6F-0D04-EC44-A702-F7C7F0C5C2B0}" type="datetimeFigureOut">
               <a:rPr lang="en-US" smtClean="0"/>
-              <a:t>11/4/17</a:t>
+              <a:t>11/5/17</a:t>
             </a:fld>
             <a:endParaRPr lang="en-US"/>
           </a:p>
@@ -2407,7 +2406,7 @@
           <a:p>
             <a:fld id="{4C707D6F-0D04-EC44-A702-F7C7F0C5C2B0}" type="datetimeFigureOut">
               <a:rPr lang="en-US" smtClean="0"/>
-              <a:t>11/4/17</a:t>
+              <a:t>11/5/17</a:t>
             </a:fld>
             <a:endParaRPr lang="en-US"/>
           </a:p>
@@ -2659,7 +2658,7 @@
           <a:p>
             <a:fld id="{4C707D6F-0D04-EC44-A702-F7C7F0C5C2B0}" type="datetimeFigureOut">
               <a:rPr lang="en-US" smtClean="0"/>
-              <a:t>11/4/17</a:t>
+              <a:t>11/5/17</a:t>
             </a:fld>
             <a:endParaRPr lang="en-US"/>
           </a:p>
@@ -2867,7 +2866,7 @@
           <a:p>
             <a:fld id="{4C707D6F-0D04-EC44-A702-F7C7F0C5C2B0}" type="datetimeFigureOut">
               <a:rPr lang="en-US" smtClean="0"/>
-              <a:t>11/4/17</a:t>
+              <a:t>11/5/17</a:t>
             </a:fld>
             <a:endParaRPr lang="en-US"/>
           </a:p>
@@ -3280,8 +3279,8 @@
         </p:nvSpPr>
         <p:spPr>
           <a:xfrm>
-            <a:off x="474133" y="395111"/>
-            <a:ext cx="7621355" cy="5883769"/>
+            <a:off x="0" y="0"/>
+            <a:ext cx="12192000" cy="6858000"/>
           </a:xfrm>
           <a:prstGeom prst="rect">
             <a:avLst/>
@@ -3306,354 +3305,125 @@
           <a:lstStyle/>
           <a:p>
             <a:pPr algn="ctr"/>
-            <a:endParaRPr lang="en-US" sz="1200"/>
-          </a:p>
-        </p:txBody>
-      </p:sp>
-      <p:graphicFrame>
-        <p:nvGraphicFramePr>
-          <p:cNvPr id="16" name="Table 15"/>
-          <p:cNvGraphicFramePr>
-            <a:graphicFrameLocks noGrp="1"/>
-          </p:cNvGraphicFramePr>
-          <p:nvPr>
-            <p:extLst>
-              <p:ext uri="{D42A27DB-BD31-4B8C-83A1-F6EECF244321}">
-                <p14:modId xmlns:p14="http://schemas.microsoft.com/office/powerpoint/2010/main" val="1237572775"/>
-              </p:ext>
-            </p:extLst>
-          </p:nvPr>
-        </p:nvGraphicFramePr>
-        <p:xfrm>
-          <a:off x="1472897" y="4705987"/>
-          <a:ext cx="2123204" cy="1259840"/>
-        </p:xfrm>
-        <a:graphic>
-          <a:graphicData uri="http://schemas.openxmlformats.org/drawingml/2006/table">
-            <a:tbl>
-              <a:tblPr firstRow="1" bandRow="1">
-                <a:tableStyleId>{073A0DAA-6AF3-43AB-8588-CEC1D06C72B9}</a:tableStyleId>
-              </a:tblPr>
-              <a:tblGrid>
-                <a:gridCol w="2123204"/>
-              </a:tblGrid>
-              <a:tr h="370840">
-                <a:tc>
-                  <a:txBody>
-                    <a:bodyPr/>
-                    <a:lstStyle/>
-                    <a:p>
-                      <a:pPr algn="just"/>
-                      <a:r>
-                        <a:rPr lang="en-US" sz="1400" dirty="0" err="1" smtClean="0"/>
-                        <a:t>PersonCard</a:t>
-                      </a:r>
-                      <a:endParaRPr lang="en-US" sz="1400" dirty="0"/>
-                    </a:p>
-                  </a:txBody>
-                  <a:tcPr/>
-                </a:tc>
-              </a:tr>
-              <a:tr h="370840">
-                <a:tc>
-                  <a:txBody>
-                    <a:bodyPr/>
-                    <a:lstStyle/>
-                    <a:p>
-                      <a:pPr marL="0" indent="0" algn="ctr">
-                        <a:buFontTx/>
-                        <a:buNone/>
-                      </a:pPr>
-                      <a:r>
-                        <a:rPr lang="mr-IN" sz="1400" dirty="0" smtClean="0"/>
-                        <a:t>…</a:t>
-                      </a:r>
-                      <a:endParaRPr lang="en-US" sz="1400" dirty="0"/>
-                    </a:p>
-                  </a:txBody>
-                  <a:tcPr/>
-                </a:tc>
-              </a:tr>
-              <a:tr h="370840">
-                <a:tc>
-                  <a:txBody>
-                    <a:bodyPr/>
-                    <a:lstStyle/>
-                    <a:p>
-                      <a:pPr algn="just"/>
-                      <a:r>
-                        <a:rPr lang="en-US" sz="1400" dirty="0" smtClean="0"/>
-                        <a:t>+ </a:t>
-                      </a:r>
-                      <a:r>
-                        <a:rPr lang="en-US" sz="1400" dirty="0" err="1" smtClean="0"/>
-                        <a:t>updateAttributeSizes</a:t>
-                      </a:r>
-                      <a:r>
-                        <a:rPr lang="en-US" sz="1400" dirty="0" smtClean="0"/>
-                        <a:t>()</a:t>
-                      </a:r>
-                    </a:p>
-                    <a:p>
-                      <a:pPr algn="ctr"/>
-                      <a:r>
-                        <a:rPr lang="mr-IN" sz="1400" dirty="0" smtClean="0"/>
-                        <a:t>…</a:t>
-                      </a:r>
-                      <a:endParaRPr lang="en-US" sz="1400" dirty="0"/>
-                    </a:p>
-                  </a:txBody>
-                  <a:tcPr/>
-                </a:tc>
-              </a:tr>
-            </a:tbl>
-          </a:graphicData>
-        </a:graphic>
-      </p:graphicFrame>
-      <p:graphicFrame>
-        <p:nvGraphicFramePr>
-          <p:cNvPr id="22" name="Table 21"/>
-          <p:cNvGraphicFramePr>
-            <a:graphicFrameLocks noGrp="1"/>
-          </p:cNvGraphicFramePr>
-          <p:nvPr>
-            <p:extLst>
-              <p:ext uri="{D42A27DB-BD31-4B8C-83A1-F6EECF244321}">
-                <p14:modId xmlns:p14="http://schemas.microsoft.com/office/powerpoint/2010/main" val="251057287"/>
-              </p:ext>
-            </p:extLst>
-          </p:nvPr>
-        </p:nvGraphicFramePr>
-        <p:xfrm>
-          <a:off x="1312031" y="2623130"/>
-          <a:ext cx="2284070" cy="1473200"/>
-        </p:xfrm>
-        <a:graphic>
-          <a:graphicData uri="http://schemas.openxmlformats.org/drawingml/2006/table">
-            <a:tbl>
-              <a:tblPr firstRow="1" bandRow="1">
-                <a:tableStyleId>{073A0DAA-6AF3-43AB-8588-CEC1D06C72B9}</a:tableStyleId>
-              </a:tblPr>
-              <a:tblGrid>
-                <a:gridCol w="2284070"/>
-              </a:tblGrid>
-              <a:tr h="370840">
-                <a:tc>
-                  <a:txBody>
-                    <a:bodyPr/>
-                    <a:lstStyle/>
-                    <a:p>
-                      <a:pPr algn="just"/>
-                      <a:r>
-                        <a:rPr lang="en-US" sz="1600" dirty="0" err="1" smtClean="0"/>
-                        <a:t>PersonListPanel</a:t>
-                      </a:r>
-                      <a:endParaRPr lang="en-US" sz="1600" dirty="0"/>
-                    </a:p>
-                  </a:txBody>
-                  <a:tcPr/>
-                </a:tc>
-              </a:tr>
-              <a:tr h="370840">
-                <a:tc>
-                  <a:txBody>
-                    <a:bodyPr/>
-                    <a:lstStyle/>
-                    <a:p>
-                      <a:pPr algn="ctr"/>
-                      <a:r>
-                        <a:rPr lang="mr-IN" dirty="0" smtClean="0"/>
-                        <a:t>…</a:t>
-                      </a:r>
-                      <a:endParaRPr lang="en-US" dirty="0"/>
-                    </a:p>
-                  </a:txBody>
-                  <a:tcPr/>
-                </a:tc>
-              </a:tr>
-              <a:tr h="370840">
-                <a:tc>
-                  <a:txBody>
-                    <a:bodyPr/>
-                    <a:lstStyle/>
-                    <a:p>
-                      <a:pPr algn="just"/>
-                      <a:r>
-                        <a:rPr lang="en-US" sz="1400" dirty="0" smtClean="0"/>
-                        <a:t>+</a:t>
-                      </a:r>
-                      <a:r>
-                        <a:rPr lang="en-US" sz="1400" baseline="0" dirty="0" smtClean="0"/>
-                        <a:t> </a:t>
-                      </a:r>
-                      <a:r>
-                        <a:rPr lang="en-US" sz="1400" baseline="0" dirty="0" err="1" smtClean="0"/>
-                        <a:t>increaseFontSize</a:t>
-                      </a:r>
-                      <a:endParaRPr lang="en-US" sz="1400" baseline="0" dirty="0" smtClean="0"/>
-                    </a:p>
-                    <a:p>
-                      <a:pPr algn="just"/>
-                      <a:r>
-                        <a:rPr lang="en-US" sz="1400" baseline="0" dirty="0" smtClean="0"/>
-                        <a:t>+ </a:t>
-                      </a:r>
-                      <a:r>
-                        <a:rPr lang="en-US" sz="1400" baseline="0" dirty="0" err="1" smtClean="0"/>
-                        <a:t>decreaseFontSize</a:t>
-                      </a:r>
-                      <a:endParaRPr lang="en-US" sz="1400" baseline="0" dirty="0" smtClean="0"/>
-                    </a:p>
-                    <a:p>
-                      <a:pPr algn="just"/>
-                      <a:r>
-                        <a:rPr lang="en-US" sz="1400" baseline="0" dirty="0" smtClean="0"/>
-                        <a:t>+ </a:t>
-                      </a:r>
-                      <a:r>
-                        <a:rPr lang="en-US" sz="1400" baseline="0" dirty="0" err="1" smtClean="0"/>
-                        <a:t>resetFontSize</a:t>
-                      </a:r>
-                      <a:endParaRPr lang="en-US" sz="1400" dirty="0" smtClean="0"/>
-                    </a:p>
-                  </a:txBody>
-                  <a:tcPr/>
-                </a:tc>
-              </a:tr>
-            </a:tbl>
-          </a:graphicData>
-        </a:graphic>
-      </p:graphicFrame>
-      <p:graphicFrame>
-        <p:nvGraphicFramePr>
-          <p:cNvPr id="25" name="Table 24"/>
-          <p:cNvGraphicFramePr>
-            <a:graphicFrameLocks noGrp="1"/>
-          </p:cNvGraphicFramePr>
-          <p:nvPr>
-            <p:extLst>
-              <p:ext uri="{D42A27DB-BD31-4B8C-83A1-F6EECF244321}">
-                <p14:modId xmlns:p14="http://schemas.microsoft.com/office/powerpoint/2010/main" val="2089167028"/>
-              </p:ext>
-            </p:extLst>
-          </p:nvPr>
-        </p:nvGraphicFramePr>
-        <p:xfrm>
-          <a:off x="1312031" y="817770"/>
-          <a:ext cx="2284070" cy="1473200"/>
-        </p:xfrm>
-        <a:graphic>
-          <a:graphicData uri="http://schemas.openxmlformats.org/drawingml/2006/table">
-            <a:tbl>
-              <a:tblPr firstRow="1" bandRow="1">
-                <a:tableStyleId>{073A0DAA-6AF3-43AB-8588-CEC1D06C72B9}</a:tableStyleId>
-              </a:tblPr>
-              <a:tblGrid>
-                <a:gridCol w="2284070"/>
-              </a:tblGrid>
-              <a:tr h="370840">
-                <a:tc>
-                  <a:txBody>
-                    <a:bodyPr/>
-                    <a:lstStyle/>
-                    <a:p>
-                      <a:pPr algn="just"/>
-                      <a:r>
-                        <a:rPr lang="en-US" sz="1400" dirty="0" err="1" smtClean="0"/>
-                        <a:t>MainWindow</a:t>
-                      </a:r>
-                      <a:endParaRPr lang="en-US" sz="1400" dirty="0"/>
-                    </a:p>
-                  </a:txBody>
-                  <a:tcPr/>
-                </a:tc>
-              </a:tr>
-              <a:tr h="370840">
-                <a:tc>
-                  <a:txBody>
-                    <a:bodyPr/>
-                    <a:lstStyle/>
-                    <a:p>
-                      <a:pPr algn="ctr"/>
-                      <a:r>
-                        <a:rPr lang="mr-IN" sz="1200" dirty="0" smtClean="0"/>
-                        <a:t>…</a:t>
-                      </a:r>
-                      <a:endParaRPr lang="en-US" sz="1200" dirty="0"/>
-                    </a:p>
-                  </a:txBody>
-                  <a:tcPr/>
-                </a:tc>
-              </a:tr>
-              <a:tr h="370840">
-                <a:tc>
-                  <a:txBody>
-                    <a:bodyPr/>
-                    <a:lstStyle/>
-                    <a:p>
-                      <a:pPr algn="just"/>
-                      <a:r>
-                        <a:rPr lang="en-US" sz="1400" dirty="0" smtClean="0"/>
-                        <a:t>+ </a:t>
-                      </a:r>
-                      <a:r>
-                        <a:rPr lang="en-US" sz="1400" dirty="0" err="1" smtClean="0"/>
-                        <a:t>increaseFontSize</a:t>
-                      </a:r>
-                      <a:endParaRPr lang="en-US" sz="1400" dirty="0" smtClean="0"/>
-                    </a:p>
-                    <a:p>
-                      <a:pPr algn="just"/>
-                      <a:r>
-                        <a:rPr lang="en-US" sz="1400" dirty="0" smtClean="0"/>
-                        <a:t>+ </a:t>
-                      </a:r>
-                      <a:r>
-                        <a:rPr lang="en-US" sz="1400" dirty="0" err="1" smtClean="0"/>
-                        <a:t>decreaseFontSize</a:t>
-                      </a:r>
-                      <a:endParaRPr lang="en-US" sz="1400" dirty="0" smtClean="0"/>
-                    </a:p>
-                    <a:p>
-                      <a:pPr algn="just"/>
-                      <a:r>
-                        <a:rPr lang="en-US" sz="1400" dirty="0" smtClean="0"/>
-                        <a:t>+ </a:t>
-                      </a:r>
-                      <a:r>
-                        <a:rPr lang="en-US" sz="1400" dirty="0" err="1" smtClean="0"/>
-                        <a:t>resetFontSize</a:t>
-                      </a:r>
-                      <a:endParaRPr lang="en-US" sz="1400" dirty="0" smtClean="0"/>
-                    </a:p>
-                  </a:txBody>
-                  <a:tcPr/>
-                </a:tc>
-              </a:tr>
-            </a:tbl>
-          </a:graphicData>
-        </a:graphic>
-      </p:graphicFrame>
+            <a:endParaRPr lang="en-US" sz="1200" dirty="0"/>
+          </a:p>
+        </p:txBody>
+      </p:sp>
+      <p:sp>
+        <p:nvSpPr>
+          <p:cNvPr id="35" name="TextBox 34"/>
+          <p:cNvSpPr txBox="1"/>
+          <p:nvPr/>
+        </p:nvSpPr>
+        <p:spPr>
+          <a:xfrm>
+            <a:off x="0" y="0"/>
+            <a:ext cx="3227422" cy="276999"/>
+          </a:xfrm>
+          <a:prstGeom prst="rect">
+            <a:avLst/>
+          </a:prstGeom>
+        </p:spPr>
+        <p:style>
+          <a:lnRef idx="2">
+            <a:schemeClr val="dk1"/>
+          </a:lnRef>
+          <a:fillRef idx="1">
+            <a:schemeClr val="lt1"/>
+          </a:fillRef>
+          <a:effectRef idx="0">
+            <a:schemeClr val="dk1"/>
+          </a:effectRef>
+          <a:fontRef idx="minor">
+            <a:schemeClr val="dk1"/>
+          </a:fontRef>
+        </p:style>
+        <p:txBody>
+          <a:bodyPr wrap="none" rtlCol="0">
+            <a:spAutoFit/>
+          </a:bodyPr>
+          <a:lstStyle/>
+          <a:p>
+            <a:r>
+              <a:rPr lang="en-US" sz="1200" dirty="0" smtClean="0"/>
+              <a:t>Sequence Diagram for </a:t>
+            </a:r>
+            <a:r>
+              <a:rPr lang="en-US" sz="1200" dirty="0" err="1" smtClean="0"/>
+              <a:t>FontSizeChangeCommand</a:t>
+            </a:r>
+            <a:endParaRPr lang="en-US" sz="1200" dirty="0"/>
+          </a:p>
+        </p:txBody>
+      </p:sp>
+      <p:sp>
+        <p:nvSpPr>
+          <p:cNvPr id="2" name="Rectangle 1"/>
+          <p:cNvSpPr/>
+          <p:nvPr/>
+        </p:nvSpPr>
+        <p:spPr>
+          <a:xfrm>
+            <a:off x="134112" y="440251"/>
+            <a:ext cx="2535936" cy="437573"/>
+          </a:xfrm>
+          <a:prstGeom prst="rect">
+            <a:avLst/>
+          </a:prstGeom>
+        </p:spPr>
+        <p:style>
+          <a:lnRef idx="2">
+            <a:schemeClr val="accent1">
+              <a:shade val="50000"/>
+            </a:schemeClr>
+          </a:lnRef>
+          <a:fillRef idx="1">
+            <a:schemeClr val="accent1"/>
+          </a:fillRef>
+          <a:effectRef idx="0">
+            <a:schemeClr val="accent1"/>
+          </a:effectRef>
+          <a:fontRef idx="minor">
+            <a:schemeClr val="lt1"/>
+          </a:fontRef>
+        </p:style>
+        <p:txBody>
+          <a:bodyPr rtlCol="0" anchor="ctr"/>
+          <a:lstStyle/>
+          <a:p>
+            <a:pPr algn="ctr"/>
+            <a:r>
+              <a:rPr lang="en-US" dirty="0" smtClean="0"/>
+              <a:t>:</a:t>
+            </a:r>
+            <a:r>
+              <a:rPr lang="en-US" dirty="0" err="1" smtClean="0"/>
+              <a:t>MainWindow</a:t>
+            </a:r>
+            <a:r>
+              <a:rPr lang="en-US" dirty="0" smtClean="0"/>
+              <a:t> Controller</a:t>
+            </a:r>
+            <a:endParaRPr lang="en-US" dirty="0"/>
+          </a:p>
+        </p:txBody>
+      </p:sp>
       <p:cxnSp>
         <p:nvCxnSpPr>
-          <p:cNvPr id="7" name="Straight Arrow Connector 6"/>
+          <p:cNvPr id="4" name="Straight Connector 3"/>
           <p:cNvCxnSpPr>
-            <a:stCxn id="25" idx="2"/>
-            <a:endCxn id="22" idx="0"/>
+            <a:stCxn id="19" idx="2"/>
           </p:cNvCxnSpPr>
           <p:nvPr/>
         </p:nvCxnSpPr>
         <p:spPr>
           <a:xfrm>
-            <a:off x="2454066" y="2290970"/>
-            <a:ext cx="0" cy="332160"/>
-          </a:xfrm>
-          <a:prstGeom prst="straightConnector1">
+            <a:off x="1402080" y="1315397"/>
+            <a:ext cx="12192" cy="5379350"/>
+          </a:xfrm>
+          <a:prstGeom prst="line">
             <a:avLst/>
           </a:prstGeom>
-          <a:ln>
-            <a:tailEnd type="triangle"/>
-          </a:ln>
         </p:spPr>
         <p:style>
           <a:lnRef idx="1">
@@ -3670,19 +3440,104 @@
           </a:fontRef>
         </p:style>
       </p:cxnSp>
+      <p:sp>
+        <p:nvSpPr>
+          <p:cNvPr id="19" name="Rectangle 18"/>
+          <p:cNvSpPr/>
+          <p:nvPr/>
+        </p:nvSpPr>
+        <p:spPr>
+          <a:xfrm>
+            <a:off x="134112" y="877824"/>
+            <a:ext cx="2535936" cy="437573"/>
+          </a:xfrm>
+          <a:prstGeom prst="rect">
+            <a:avLst/>
+          </a:prstGeom>
+        </p:spPr>
+        <p:style>
+          <a:lnRef idx="2">
+            <a:schemeClr val="accent2">
+              <a:shade val="50000"/>
+            </a:schemeClr>
+          </a:lnRef>
+          <a:fillRef idx="1">
+            <a:schemeClr val="accent2"/>
+          </a:fillRef>
+          <a:effectRef idx="0">
+            <a:schemeClr val="accent2"/>
+          </a:effectRef>
+          <a:fontRef idx="minor">
+            <a:schemeClr val="lt1"/>
+          </a:fontRef>
+        </p:style>
+        <p:txBody>
+          <a:bodyPr rtlCol="0" anchor="ctr"/>
+          <a:lstStyle/>
+          <a:p>
+            <a:pPr algn="ctr"/>
+            <a:r>
+              <a:rPr lang="en-US" dirty="0" smtClean="0"/>
+              <a:t>:</a:t>
+            </a:r>
+            <a:r>
+              <a:rPr lang="en-US" dirty="0" err="1" smtClean="0"/>
+              <a:t>FontSizeCommand</a:t>
+            </a:r>
+            <a:endParaRPr lang="en-US" dirty="0"/>
+          </a:p>
+        </p:txBody>
+      </p:sp>
+      <p:sp>
+        <p:nvSpPr>
+          <p:cNvPr id="11" name="Rectangle 10"/>
+          <p:cNvSpPr/>
+          <p:nvPr/>
+        </p:nvSpPr>
+        <p:spPr>
+          <a:xfrm>
+            <a:off x="1274064" y="1384092"/>
+            <a:ext cx="262128" cy="5053284"/>
+          </a:xfrm>
+          <a:prstGeom prst="rect">
+            <a:avLst/>
+          </a:prstGeom>
+        </p:spPr>
+        <p:style>
+          <a:lnRef idx="2">
+            <a:schemeClr val="accent1">
+              <a:shade val="50000"/>
+            </a:schemeClr>
+          </a:lnRef>
+          <a:fillRef idx="1">
+            <a:schemeClr val="accent1"/>
+          </a:fillRef>
+          <a:effectRef idx="0">
+            <a:schemeClr val="accent1"/>
+          </a:effectRef>
+          <a:fontRef idx="minor">
+            <a:schemeClr val="lt1"/>
+          </a:fontRef>
+        </p:style>
+        <p:txBody>
+          <a:bodyPr rtlCol="0" anchor="ctr"/>
+          <a:lstStyle/>
+          <a:p>
+            <a:pPr algn="ctr"/>
+            <a:endParaRPr lang="en-US"/>
+          </a:p>
+        </p:txBody>
+      </p:sp>
       <p:cxnSp>
         <p:nvCxnSpPr>
-          <p:cNvPr id="29" name="Straight Arrow Connector 28"/>
-          <p:cNvCxnSpPr>
-            <a:stCxn id="22" idx="2"/>
-            <a:endCxn id="16" idx="0"/>
-          </p:cNvCxnSpPr>
+          <p:cNvPr id="15" name="Straight Arrow Connector 14"/>
+          <p:cNvCxnSpPr/>
           <p:nvPr/>
         </p:nvCxnSpPr>
         <p:spPr>
           <a:xfrm>
-            <a:off x="2454066" y="4096330"/>
-            <a:ext cx="80433" cy="609657"/>
+            <a:off x="1536192" y="1621536"/>
+            <a:ext cx="3132668" cy="0"/>
           </a:xfrm>
           <a:prstGeom prst="straightConnector1">
             <a:avLst/>
@@ -3708,274 +3563,224 @@
       </p:cxnSp>
       <p:sp>
         <p:nvSpPr>
-          <p:cNvPr id="35" name="TextBox 34"/>
+          <p:cNvPr id="18" name="TextBox 17"/>
           <p:cNvSpPr txBox="1"/>
           <p:nvPr/>
         </p:nvSpPr>
         <p:spPr>
           <a:xfrm>
-            <a:off x="474133" y="393564"/>
-            <a:ext cx="3417346" cy="276999"/>
+            <a:off x="2203871" y="1333985"/>
+            <a:ext cx="1880643" cy="276999"/>
           </a:xfrm>
           <a:prstGeom prst="rect">
             <a:avLst/>
           </a:prstGeom>
+          <a:noFill/>
+        </p:spPr>
+        <p:txBody>
+          <a:bodyPr wrap="none" rtlCol="0">
+            <a:spAutoFit/>
+          </a:bodyPr>
+          <a:lstStyle/>
+          <a:p>
+            <a:r>
+              <a:rPr lang="en-US" sz="1200" dirty="0" smtClean="0"/>
+              <a:t>post(</a:t>
+            </a:r>
+            <a:r>
+              <a:rPr lang="en-US" sz="1200" dirty="0" err="1"/>
+              <a:t>C</a:t>
+            </a:r>
+            <a:r>
+              <a:rPr lang="en-US" sz="1200" dirty="0" err="1" smtClean="0"/>
+              <a:t>hangeFontSizeEvent</a:t>
+            </a:r>
+            <a:r>
+              <a:rPr lang="en-US" sz="1200" dirty="0" smtClean="0"/>
+              <a:t>)</a:t>
+            </a:r>
+            <a:endParaRPr lang="en-US" sz="1200" dirty="0"/>
+          </a:p>
+        </p:txBody>
+      </p:sp>
+      <p:cxnSp>
+        <p:nvCxnSpPr>
+          <p:cNvPr id="33" name="Straight Connector 32"/>
+          <p:cNvCxnSpPr>
+            <a:stCxn id="38" idx="2"/>
+          </p:cNvCxnSpPr>
+          <p:nvPr/>
+        </p:nvCxnSpPr>
+        <p:spPr>
+          <a:xfrm>
+            <a:off x="9392741" y="947559"/>
+            <a:ext cx="0" cy="5819601"/>
+          </a:xfrm>
+          <a:prstGeom prst="line">
+            <a:avLst/>
+          </a:prstGeom>
         </p:spPr>
         <p:style>
-          <a:lnRef idx="2">
+          <a:lnRef idx="1">
             <a:schemeClr val="dk1"/>
           </a:lnRef>
-          <a:fillRef idx="1">
-            <a:schemeClr val="lt1"/>
+          <a:fillRef idx="0">
+            <a:schemeClr val="dk1"/>
           </a:fillRef>
           <a:effectRef idx="0">
             <a:schemeClr val="dk1"/>
           </a:effectRef>
           <a:fontRef idx="minor">
-            <a:schemeClr val="dk1"/>
+            <a:schemeClr val="tx1"/>
           </a:fontRef>
         </p:style>
-        <p:txBody>
-          <a:bodyPr wrap="none" rtlCol="0">
-            <a:spAutoFit/>
-          </a:bodyPr>
-          <a:lstStyle/>
-          <a:p>
-            <a:r>
-              <a:rPr lang="en-US" sz="1200" dirty="0" smtClean="0"/>
-              <a:t>UML Class Diagram for Font Size Change Through UI</a:t>
-            </a:r>
-            <a:endParaRPr lang="en-US" sz="1200" dirty="0"/>
-          </a:p>
-        </p:txBody>
-      </p:sp>
-      <p:graphicFrame>
-        <p:nvGraphicFramePr>
-          <p:cNvPr id="26" name="Table 25"/>
-          <p:cNvGraphicFramePr>
-            <a:graphicFrameLocks noGrp="1"/>
-          </p:cNvGraphicFramePr>
-          <p:nvPr>
-            <p:extLst>
-              <p:ext uri="{D42A27DB-BD31-4B8C-83A1-F6EECF244321}">
-                <p14:modId xmlns:p14="http://schemas.microsoft.com/office/powerpoint/2010/main" val="1006823134"/>
-              </p:ext>
-            </p:extLst>
-          </p:nvPr>
-        </p:nvGraphicFramePr>
-        <p:xfrm>
-          <a:off x="5587697" y="2900627"/>
-          <a:ext cx="2123204" cy="1259840"/>
-        </p:xfrm>
-        <a:graphic>
-          <a:graphicData uri="http://schemas.openxmlformats.org/drawingml/2006/table">
-            <a:tbl>
-              <a:tblPr firstRow="1" bandRow="1">
-                <a:tableStyleId>{073A0DAA-6AF3-43AB-8588-CEC1D06C72B9}</a:tableStyleId>
-              </a:tblPr>
-              <a:tblGrid>
-                <a:gridCol w="2123204"/>
-              </a:tblGrid>
-              <a:tr h="370840">
-                <a:tc>
-                  <a:txBody>
-                    <a:bodyPr/>
-                    <a:lstStyle/>
-                    <a:p>
-                      <a:pPr algn="just"/>
-                      <a:r>
-                        <a:rPr lang="en-US" sz="1400" dirty="0" err="1" smtClean="0"/>
-                        <a:t>TaskCard</a:t>
-                      </a:r>
-                      <a:endParaRPr lang="en-US" sz="1400" dirty="0"/>
-                    </a:p>
-                  </a:txBody>
-                  <a:tcPr/>
-                </a:tc>
-              </a:tr>
-              <a:tr h="370840">
-                <a:tc>
-                  <a:txBody>
-                    <a:bodyPr/>
-                    <a:lstStyle/>
-                    <a:p>
-                      <a:pPr marL="0" indent="0" algn="ctr">
-                        <a:buFontTx/>
-                        <a:buNone/>
-                      </a:pPr>
-                      <a:r>
-                        <a:rPr lang="mr-IN" sz="1400" dirty="0" smtClean="0"/>
-                        <a:t>…</a:t>
-                      </a:r>
-                      <a:endParaRPr lang="en-US" sz="1400" dirty="0"/>
-                    </a:p>
-                  </a:txBody>
-                  <a:tcPr/>
-                </a:tc>
-              </a:tr>
-              <a:tr h="370840">
-                <a:tc>
-                  <a:txBody>
-                    <a:bodyPr/>
-                    <a:lstStyle/>
-                    <a:p>
-                      <a:pPr algn="just"/>
-                      <a:r>
-                        <a:rPr lang="en-US" sz="1400" dirty="0" smtClean="0"/>
-                        <a:t>+ </a:t>
-                      </a:r>
-                      <a:r>
-                        <a:rPr lang="en-US" sz="1400" dirty="0" err="1" smtClean="0"/>
-                        <a:t>updateAttributeSizes</a:t>
-                      </a:r>
-                      <a:r>
-                        <a:rPr lang="en-US" sz="1400" dirty="0" smtClean="0"/>
-                        <a:t>()</a:t>
-                      </a:r>
-                    </a:p>
-                    <a:p>
-                      <a:pPr algn="ctr"/>
-                      <a:r>
-                        <a:rPr lang="mr-IN" sz="1400" dirty="0" smtClean="0"/>
-                        <a:t>…</a:t>
-                      </a:r>
-                      <a:endParaRPr lang="en-US" sz="1400" dirty="0"/>
-                    </a:p>
-                  </a:txBody>
-                  <a:tcPr/>
-                </a:tc>
-              </a:tr>
-            </a:tbl>
-          </a:graphicData>
-        </a:graphic>
-      </p:graphicFrame>
-      <p:graphicFrame>
-        <p:nvGraphicFramePr>
-          <p:cNvPr id="27" name="Table 26"/>
-          <p:cNvGraphicFramePr>
-            <a:graphicFrameLocks noGrp="1"/>
-          </p:cNvGraphicFramePr>
-          <p:nvPr>
-            <p:extLst>
-              <p:ext uri="{D42A27DB-BD31-4B8C-83A1-F6EECF244321}">
-                <p14:modId xmlns:p14="http://schemas.microsoft.com/office/powerpoint/2010/main" val="398177872"/>
-              </p:ext>
-            </p:extLst>
-          </p:nvPr>
-        </p:nvGraphicFramePr>
-        <p:xfrm>
-          <a:off x="5426831" y="817770"/>
-          <a:ext cx="2284070" cy="1473200"/>
-        </p:xfrm>
-        <a:graphic>
-          <a:graphicData uri="http://schemas.openxmlformats.org/drawingml/2006/table">
-            <a:tbl>
-              <a:tblPr firstRow="1" bandRow="1">
-                <a:tableStyleId>{073A0DAA-6AF3-43AB-8588-CEC1D06C72B9}</a:tableStyleId>
-              </a:tblPr>
-              <a:tblGrid>
-                <a:gridCol w="2284070"/>
-              </a:tblGrid>
-              <a:tr h="370840">
-                <a:tc>
-                  <a:txBody>
-                    <a:bodyPr/>
-                    <a:lstStyle/>
-                    <a:p>
-                      <a:pPr algn="just"/>
-                      <a:r>
-                        <a:rPr lang="en-US" sz="1600" dirty="0" err="1" smtClean="0"/>
-                        <a:t>TaskListPanel</a:t>
-                      </a:r>
-                      <a:endParaRPr lang="en-US" sz="1600" dirty="0"/>
-                    </a:p>
-                  </a:txBody>
-                  <a:tcPr/>
-                </a:tc>
-              </a:tr>
-              <a:tr h="370840">
-                <a:tc>
-                  <a:txBody>
-                    <a:bodyPr/>
-                    <a:lstStyle/>
-                    <a:p>
-                      <a:pPr algn="ctr"/>
-                      <a:r>
-                        <a:rPr lang="mr-IN" dirty="0" smtClean="0"/>
-                        <a:t>…</a:t>
-                      </a:r>
-                      <a:endParaRPr lang="en-US" dirty="0"/>
-                    </a:p>
-                  </a:txBody>
-                  <a:tcPr/>
-                </a:tc>
-              </a:tr>
-              <a:tr h="370840">
-                <a:tc>
-                  <a:txBody>
-                    <a:bodyPr/>
-                    <a:lstStyle/>
-                    <a:p>
-                      <a:pPr algn="just"/>
-                      <a:r>
-                        <a:rPr lang="en-US" sz="1400" dirty="0" smtClean="0"/>
-                        <a:t>+</a:t>
-                      </a:r>
-                      <a:r>
-                        <a:rPr lang="en-US" sz="1400" baseline="0" dirty="0" smtClean="0"/>
-                        <a:t> </a:t>
-                      </a:r>
-                      <a:r>
-                        <a:rPr lang="en-US" sz="1400" baseline="0" dirty="0" err="1" smtClean="0"/>
-                        <a:t>increaseFontSize</a:t>
-                      </a:r>
-                      <a:endParaRPr lang="en-US" sz="1400" baseline="0" dirty="0" smtClean="0"/>
-                    </a:p>
-                    <a:p>
-                      <a:pPr algn="just"/>
-                      <a:r>
-                        <a:rPr lang="en-US" sz="1400" baseline="0" dirty="0" smtClean="0"/>
-                        <a:t>+ </a:t>
-                      </a:r>
-                      <a:r>
-                        <a:rPr lang="en-US" sz="1400" baseline="0" dirty="0" err="1" smtClean="0"/>
-                        <a:t>decreaseFontSize</a:t>
-                      </a:r>
-                      <a:endParaRPr lang="en-US" sz="1400" baseline="0" dirty="0" smtClean="0"/>
-                    </a:p>
-                    <a:p>
-                      <a:pPr algn="just"/>
-                      <a:r>
-                        <a:rPr lang="en-US" sz="1400" baseline="0" dirty="0" smtClean="0"/>
-                        <a:t>+ </a:t>
-                      </a:r>
-                      <a:r>
-                        <a:rPr lang="en-US" sz="1400" baseline="0" dirty="0" err="1" smtClean="0"/>
-                        <a:t>resetFontSize</a:t>
-                      </a:r>
-                      <a:endParaRPr lang="en-US" sz="1400" dirty="0" smtClean="0"/>
-                    </a:p>
-                  </a:txBody>
-                  <a:tcPr/>
-                </a:tc>
-              </a:tr>
-            </a:tbl>
-          </a:graphicData>
-        </a:graphic>
-      </p:graphicFrame>
+      </p:cxnSp>
+      <p:sp>
+        <p:nvSpPr>
+          <p:cNvPr id="36" name="Rectangle 35"/>
+          <p:cNvSpPr/>
+          <p:nvPr/>
+        </p:nvSpPr>
+        <p:spPr>
+          <a:xfrm>
+            <a:off x="9279760" y="1708220"/>
+            <a:ext cx="239018" cy="2607748"/>
+          </a:xfrm>
+          <a:prstGeom prst="rect">
+            <a:avLst/>
+          </a:prstGeom>
+        </p:spPr>
+        <p:style>
+          <a:lnRef idx="2">
+            <a:schemeClr val="dk1">
+              <a:shade val="50000"/>
+            </a:schemeClr>
+          </a:lnRef>
+          <a:fillRef idx="1">
+            <a:schemeClr val="dk1"/>
+          </a:fillRef>
+          <a:effectRef idx="0">
+            <a:schemeClr val="dk1"/>
+          </a:effectRef>
+          <a:fontRef idx="minor">
+            <a:schemeClr val="lt1"/>
+          </a:fontRef>
+        </p:style>
+        <p:txBody>
+          <a:bodyPr rtlCol="0" anchor="ctr"/>
+          <a:lstStyle/>
+          <a:p>
+            <a:pPr algn="ctr"/>
+            <a:endParaRPr lang="en-US"/>
+          </a:p>
+        </p:txBody>
+      </p:sp>
+      <p:sp>
+        <p:nvSpPr>
+          <p:cNvPr id="37" name="Rectangle 36"/>
+          <p:cNvSpPr/>
+          <p:nvPr/>
+        </p:nvSpPr>
+        <p:spPr>
+          <a:xfrm>
+            <a:off x="8124773" y="72413"/>
+            <a:ext cx="2535936" cy="437573"/>
+          </a:xfrm>
+          <a:prstGeom prst="rect">
+            <a:avLst/>
+          </a:prstGeom>
+        </p:spPr>
+        <p:style>
+          <a:lnRef idx="2">
+            <a:schemeClr val="accent3">
+              <a:shade val="50000"/>
+            </a:schemeClr>
+          </a:lnRef>
+          <a:fillRef idx="1">
+            <a:schemeClr val="accent3"/>
+          </a:fillRef>
+          <a:effectRef idx="0">
+            <a:schemeClr val="accent3"/>
+          </a:effectRef>
+          <a:fontRef idx="minor">
+            <a:schemeClr val="lt1"/>
+          </a:fontRef>
+        </p:style>
+        <p:txBody>
+          <a:bodyPr rtlCol="0" anchor="ctr"/>
+          <a:lstStyle/>
+          <a:p>
+            <a:pPr algn="ctr"/>
+            <a:r>
+              <a:rPr lang="en-US" dirty="0" smtClean="0"/>
+              <a:t>:</a:t>
+            </a:r>
+            <a:r>
+              <a:rPr lang="en-US" dirty="0" err="1" smtClean="0"/>
+              <a:t>PersonListPanel</a:t>
+            </a:r>
+            <a:endParaRPr lang="en-US" dirty="0"/>
+          </a:p>
+        </p:txBody>
+      </p:sp>
+      <p:sp>
+        <p:nvSpPr>
+          <p:cNvPr id="38" name="Rectangle 37"/>
+          <p:cNvSpPr/>
+          <p:nvPr/>
+        </p:nvSpPr>
+        <p:spPr>
+          <a:xfrm>
+            <a:off x="8124773" y="509986"/>
+            <a:ext cx="2535936" cy="437573"/>
+          </a:xfrm>
+          <a:prstGeom prst="rect">
+            <a:avLst/>
+          </a:prstGeom>
+        </p:spPr>
+        <p:style>
+          <a:lnRef idx="2">
+            <a:schemeClr val="dk1">
+              <a:shade val="50000"/>
+            </a:schemeClr>
+          </a:lnRef>
+          <a:fillRef idx="1">
+            <a:schemeClr val="dk1"/>
+          </a:fillRef>
+          <a:effectRef idx="0">
+            <a:schemeClr val="dk1"/>
+          </a:effectRef>
+          <a:fontRef idx="minor">
+            <a:schemeClr val="lt1"/>
+          </a:fontRef>
+        </p:style>
+        <p:txBody>
+          <a:bodyPr rtlCol="0" anchor="ctr"/>
+          <a:lstStyle/>
+          <a:p>
+            <a:pPr algn="ctr"/>
+            <a:r>
+              <a:rPr lang="en-US" dirty="0" smtClean="0"/>
+              <a:t>:</a:t>
+            </a:r>
+            <a:r>
+              <a:rPr lang="en-US" dirty="0" err="1" smtClean="0"/>
+              <a:t>TaskListPanel</a:t>
+            </a:r>
+            <a:endParaRPr lang="en-US" dirty="0"/>
+          </a:p>
+        </p:txBody>
+      </p:sp>
       <p:cxnSp>
         <p:nvCxnSpPr>
-          <p:cNvPr id="28" name="Straight Arrow Connector 27"/>
-          <p:cNvCxnSpPr>
-            <a:stCxn id="25" idx="3"/>
-            <a:endCxn id="27" idx="1"/>
-          </p:cNvCxnSpPr>
+          <p:cNvPr id="39" name="Straight Arrow Connector 38"/>
+          <p:cNvCxnSpPr/>
           <p:nvPr/>
         </p:nvCxnSpPr>
         <p:spPr>
           <a:xfrm>
-            <a:off x="3596101" y="1554370"/>
-            <a:ext cx="1830730" cy="0"/>
+            <a:off x="4923743" y="1712976"/>
+            <a:ext cx="4356017" cy="0"/>
           </a:xfrm>
           <a:prstGeom prst="straightConnector1">
             <a:avLst/>
@@ -3999,19 +3804,106 @@
           </a:fontRef>
         </p:style>
       </p:cxnSp>
+      <p:sp>
+        <p:nvSpPr>
+          <p:cNvPr id="40" name="TextBox 39"/>
+          <p:cNvSpPr txBox="1"/>
+          <p:nvPr/>
+        </p:nvSpPr>
+        <p:spPr>
+          <a:xfrm>
+            <a:off x="5747998" y="1222239"/>
+            <a:ext cx="3419782" cy="461665"/>
+          </a:xfrm>
+          <a:prstGeom prst="rect">
+            <a:avLst/>
+          </a:prstGeom>
+          <a:noFill/>
+        </p:spPr>
+        <p:txBody>
+          <a:bodyPr wrap="square" rtlCol="0">
+            <a:spAutoFit/>
+          </a:bodyPr>
+          <a:lstStyle/>
+          <a:p>
+            <a:r>
+              <a:rPr lang="en-US" sz="1200" dirty="0" err="1" smtClean="0"/>
+              <a:t>handlePersonCardChangeFontSizeEvent</a:t>
+            </a:r>
+            <a:endParaRPr lang="en-US" sz="1200" dirty="0" smtClean="0"/>
+          </a:p>
+          <a:p>
+            <a:r>
+              <a:rPr lang="en-US" sz="1200" dirty="0" smtClean="0"/>
+              <a:t>(</a:t>
+            </a:r>
+            <a:r>
+              <a:rPr lang="en-US" sz="1200" dirty="0" err="1" smtClean="0"/>
+              <a:t>ChangeFontSizeEvent</a:t>
+            </a:r>
+            <a:r>
+              <a:rPr lang="en-US" sz="1200" dirty="0" smtClean="0"/>
+              <a:t> event)</a:t>
+            </a:r>
+            <a:endParaRPr lang="en-US" sz="1200" dirty="0"/>
+          </a:p>
+        </p:txBody>
+      </p:sp>
+      <p:sp>
+        <p:nvSpPr>
+          <p:cNvPr id="46" name="TextBox 45"/>
+          <p:cNvSpPr txBox="1"/>
+          <p:nvPr/>
+        </p:nvSpPr>
+        <p:spPr>
+          <a:xfrm>
+            <a:off x="5764502" y="1888490"/>
+            <a:ext cx="3331719" cy="461665"/>
+          </a:xfrm>
+          <a:prstGeom prst="rect">
+            <a:avLst/>
+          </a:prstGeom>
+          <a:noFill/>
+        </p:spPr>
+        <p:txBody>
+          <a:bodyPr wrap="square" rtlCol="0">
+            <a:spAutoFit/>
+          </a:bodyPr>
+          <a:lstStyle/>
+          <a:p>
+            <a:r>
+              <a:rPr lang="en-US" sz="1200" dirty="0" err="1" smtClean="0"/>
+              <a:t>handleTaskCardChangeFontSizeEvent</a:t>
+            </a:r>
+            <a:endParaRPr lang="en-US" sz="1200" dirty="0" smtClean="0"/>
+          </a:p>
+          <a:p>
+            <a:r>
+              <a:rPr lang="en-US" sz="1200" dirty="0" smtClean="0"/>
+              <a:t>(</a:t>
+            </a:r>
+            <a:r>
+              <a:rPr lang="en-US" sz="1200" dirty="0" err="1" smtClean="0"/>
+              <a:t>ChangeFontSizeEvent</a:t>
+            </a:r>
+            <a:r>
+              <a:rPr lang="en-US" sz="1200" dirty="0" smtClean="0"/>
+              <a:t> event)</a:t>
+            </a:r>
+            <a:endParaRPr lang="en-US" sz="1200" dirty="0"/>
+          </a:p>
+        </p:txBody>
+      </p:sp>
       <p:cxnSp>
         <p:nvCxnSpPr>
-          <p:cNvPr id="30" name="Straight Arrow Connector 29"/>
-          <p:cNvCxnSpPr>
-            <a:stCxn id="27" idx="2"/>
-            <a:endCxn id="26" idx="0"/>
-          </p:cNvCxnSpPr>
+          <p:cNvPr id="48" name="Straight Arrow Connector 47"/>
+          <p:cNvCxnSpPr/>
           <p:nvPr/>
         </p:nvCxnSpPr>
         <p:spPr>
           <a:xfrm>
-            <a:off x="6568866" y="2290970"/>
-            <a:ext cx="80433" cy="609657"/>
+            <a:off x="4923743" y="1811852"/>
+            <a:ext cx="4356017" cy="0"/>
           </a:xfrm>
           <a:prstGeom prst="straightConnector1">
             <a:avLst/>
@@ -4035,53 +3927,16 @@
           </a:fontRef>
         </p:style>
       </p:cxnSp>
-    </p:spTree>
-    <p:extLst>
-      <p:ext uri="{BB962C8B-B14F-4D97-AF65-F5344CB8AC3E}">
-        <p14:creationId xmlns:p14="http://schemas.microsoft.com/office/powerpoint/2010/main" val="358168963"/>
-      </p:ext>
-    </p:extLst>
-  </p:cSld>
-  <p:clrMapOvr>
-    <a:masterClrMapping/>
-  </p:clrMapOvr>
-  <p:timing>
-    <p:tnLst>
-      <p:par>
-        <p:cTn id="1" dur="indefinite" restart="never" nodeType="tmRoot"/>
-      </p:par>
-    </p:tnLst>
-  </p:timing>
-</p:sld>
-</file>
-
-<file path=ppt/slides/slide2.xml><?xml version="1.0" encoding="utf-8"?>
-<p:sld xmlns:a="http://schemas.openxmlformats.org/drawingml/2006/main" xmlns:r="http://schemas.openxmlformats.org/officeDocument/2006/relationships" xmlns:p="http://schemas.openxmlformats.org/presentationml/2006/main">
-  <p:cSld>
-    <p:spTree>
-      <p:nvGrpSpPr>
-        <p:cNvPr id="1" name=""/>
-        <p:cNvGrpSpPr/>
-        <p:nvPr/>
-      </p:nvGrpSpPr>
-      <p:grpSpPr>
-        <a:xfrm>
-          <a:off x="0" y="0"/>
-          <a:ext cx="0" cy="0"/>
-          <a:chOff x="0" y="0"/>
-          <a:chExt cx="0" cy="0"/>
-        </a:xfrm>
-      </p:grpSpPr>
-      <p:sp>
-        <p:nvSpPr>
-          <p:cNvPr id="15" name="Rectangle 14"/>
+      <p:sp>
+        <p:nvSpPr>
+          <p:cNvPr id="51" name="Rectangle 50"/>
           <p:cNvSpPr/>
           <p:nvPr/>
         </p:nvSpPr>
         <p:spPr>
           <a:xfrm>
-            <a:off x="474133" y="395111"/>
-            <a:ext cx="11303339" cy="5883769"/>
+            <a:off x="3666727" y="440251"/>
+            <a:ext cx="2271170" cy="512064"/>
           </a:xfrm>
           <a:prstGeom prst="rect">
             <a:avLst/>
@@ -4089,16 +3944,18 @@
         </p:spPr>
         <p:style>
           <a:lnRef idx="2">
-            <a:schemeClr val="dk1"/>
+            <a:schemeClr val="accent6">
+              <a:shade val="50000"/>
+            </a:schemeClr>
           </a:lnRef>
           <a:fillRef idx="1">
-            <a:schemeClr val="lt1"/>
+            <a:schemeClr val="accent6"/>
           </a:fillRef>
           <a:effectRef idx="0">
-            <a:schemeClr val="dk1"/>
+            <a:schemeClr val="accent6"/>
           </a:effectRef>
           <a:fontRef idx="minor">
-            <a:schemeClr val="dk1"/>
+            <a:schemeClr val="lt1"/>
           </a:fontRef>
         </p:style>
         <p:txBody>
@@ -4106,344 +3963,637 @@
           <a:lstStyle/>
           <a:p>
             <a:pPr algn="ctr"/>
-            <a:endParaRPr lang="en-US" sz="1200"/>
-          </a:p>
-        </p:txBody>
-      </p:sp>
-      <p:graphicFrame>
-        <p:nvGraphicFramePr>
-          <p:cNvPr id="17" name="Table 16"/>
-          <p:cNvGraphicFramePr>
-            <a:graphicFrameLocks noGrp="1"/>
-          </p:cNvGraphicFramePr>
-          <p:nvPr>
-            <p:extLst>
-              <p:ext uri="{D42A27DB-BD31-4B8C-83A1-F6EECF244321}">
-                <p14:modId xmlns:p14="http://schemas.microsoft.com/office/powerpoint/2010/main" val="1071767061"/>
-              </p:ext>
-            </p:extLst>
-          </p:nvPr>
-        </p:nvGraphicFramePr>
-        <p:xfrm>
-          <a:off x="6121214" y="4622917"/>
-          <a:ext cx="2123204" cy="1259840"/>
-        </p:xfrm>
-        <a:graphic>
-          <a:graphicData uri="http://schemas.openxmlformats.org/drawingml/2006/table">
-            <a:tbl>
-              <a:tblPr firstRow="1" bandRow="1">
-                <a:tableStyleId>{5C22544A-7EE6-4342-B048-85BDC9FD1C3A}</a:tableStyleId>
-              </a:tblPr>
-              <a:tblGrid>
-                <a:gridCol w="2123204"/>
-              </a:tblGrid>
-              <a:tr h="370840">
-                <a:tc>
-                  <a:txBody>
-                    <a:bodyPr/>
-                    <a:lstStyle/>
-                    <a:p>
-                      <a:pPr algn="just"/>
-                      <a:r>
-                        <a:rPr lang="en-US" sz="1400" dirty="0" err="1" smtClean="0"/>
-                        <a:t>PersonCard</a:t>
-                      </a:r>
-                      <a:endParaRPr lang="en-US" sz="1400" dirty="0"/>
-                    </a:p>
-                  </a:txBody>
-                  <a:tcPr/>
-                </a:tc>
-              </a:tr>
-              <a:tr h="370840">
-                <a:tc>
-                  <a:txBody>
-                    <a:bodyPr/>
-                    <a:lstStyle/>
-                    <a:p>
-                      <a:pPr marL="0" indent="0" algn="ctr">
-                        <a:buFontTx/>
-                        <a:buNone/>
-                      </a:pPr>
-                      <a:r>
-                        <a:rPr lang="mr-IN" sz="1400" dirty="0" smtClean="0"/>
-                        <a:t>…</a:t>
-                      </a:r>
-                      <a:endParaRPr lang="en-US" sz="1400" dirty="0"/>
-                    </a:p>
-                  </a:txBody>
-                  <a:tcPr/>
-                </a:tc>
-              </a:tr>
-              <a:tr h="370840">
-                <a:tc>
-                  <a:txBody>
-                    <a:bodyPr/>
-                    <a:lstStyle/>
-                    <a:p>
-                      <a:pPr algn="just"/>
-                      <a:r>
-                        <a:rPr lang="en-US" sz="1400" dirty="0" smtClean="0"/>
-                        <a:t>+ </a:t>
-                      </a:r>
-                      <a:r>
-                        <a:rPr lang="en-US" sz="1400" dirty="0" err="1" smtClean="0"/>
-                        <a:t>updateAttributeSizes</a:t>
-                      </a:r>
-                      <a:r>
-                        <a:rPr lang="en-US" sz="1400" dirty="0" smtClean="0"/>
-                        <a:t>()</a:t>
-                      </a:r>
-                    </a:p>
-                    <a:p>
-                      <a:pPr algn="ctr"/>
-                      <a:r>
-                        <a:rPr lang="mr-IN" sz="1400" dirty="0" smtClean="0"/>
-                        <a:t>…</a:t>
-                      </a:r>
-                      <a:endParaRPr lang="en-US" sz="1400" dirty="0"/>
-                    </a:p>
-                  </a:txBody>
-                  <a:tcPr/>
-                </a:tc>
-              </a:tr>
-            </a:tbl>
-          </a:graphicData>
-        </a:graphic>
-      </p:graphicFrame>
-      <p:graphicFrame>
-        <p:nvGraphicFramePr>
-          <p:cNvPr id="21" name="Table 20"/>
-          <p:cNvGraphicFramePr>
-            <a:graphicFrameLocks noGrp="1"/>
-          </p:cNvGraphicFramePr>
-          <p:nvPr>
-            <p:extLst>
-              <p:ext uri="{D42A27DB-BD31-4B8C-83A1-F6EECF244321}">
-                <p14:modId xmlns:p14="http://schemas.microsoft.com/office/powerpoint/2010/main" val="443862272"/>
-              </p:ext>
-            </p:extLst>
-          </p:nvPr>
-        </p:nvGraphicFramePr>
-        <p:xfrm>
-          <a:off x="5960348" y="2540060"/>
-          <a:ext cx="2284070" cy="1473200"/>
-        </p:xfrm>
-        <a:graphic>
-          <a:graphicData uri="http://schemas.openxmlformats.org/drawingml/2006/table">
-            <a:tbl>
-              <a:tblPr firstRow="1" bandRow="1">
-                <a:tableStyleId>{5C22544A-7EE6-4342-B048-85BDC9FD1C3A}</a:tableStyleId>
-              </a:tblPr>
-              <a:tblGrid>
-                <a:gridCol w="2284070"/>
-              </a:tblGrid>
-              <a:tr h="370840">
-                <a:tc>
-                  <a:txBody>
-                    <a:bodyPr/>
-                    <a:lstStyle/>
-                    <a:p>
-                      <a:pPr algn="just"/>
-                      <a:r>
-                        <a:rPr lang="en-US" sz="1600" dirty="0" err="1" smtClean="0"/>
-                        <a:t>PersonListPanel</a:t>
-                      </a:r>
-                      <a:endParaRPr lang="en-US" sz="1600" dirty="0"/>
-                    </a:p>
-                  </a:txBody>
-                  <a:tcPr/>
-                </a:tc>
-              </a:tr>
-              <a:tr h="370840">
-                <a:tc>
-                  <a:txBody>
-                    <a:bodyPr/>
-                    <a:lstStyle/>
-                    <a:p>
-                      <a:pPr algn="ctr"/>
-                      <a:r>
-                        <a:rPr lang="mr-IN" dirty="0" smtClean="0"/>
-                        <a:t>…</a:t>
-                      </a:r>
-                      <a:endParaRPr lang="en-US" dirty="0"/>
-                    </a:p>
-                  </a:txBody>
-                  <a:tcPr/>
-                </a:tc>
-              </a:tr>
-              <a:tr h="370840">
-                <a:tc>
-                  <a:txBody>
-                    <a:bodyPr/>
-                    <a:lstStyle/>
-                    <a:p>
-                      <a:pPr algn="just"/>
-                      <a:r>
-                        <a:rPr lang="en-US" sz="1400" dirty="0" smtClean="0"/>
-                        <a:t>+</a:t>
-                      </a:r>
-                      <a:r>
-                        <a:rPr lang="en-US" sz="1400" baseline="0" dirty="0" smtClean="0"/>
-                        <a:t> </a:t>
-                      </a:r>
-                      <a:r>
-                        <a:rPr lang="en-US" sz="1400" baseline="0" dirty="0" err="1" smtClean="0"/>
-                        <a:t>increaseFontSize</a:t>
-                      </a:r>
-                      <a:endParaRPr lang="en-US" sz="1400" baseline="0" dirty="0" smtClean="0"/>
-                    </a:p>
-                    <a:p>
-                      <a:pPr algn="just"/>
-                      <a:r>
-                        <a:rPr lang="en-US" sz="1400" baseline="0" dirty="0" smtClean="0"/>
-                        <a:t>+ </a:t>
-                      </a:r>
-                      <a:r>
-                        <a:rPr lang="en-US" sz="1400" baseline="0" dirty="0" err="1" smtClean="0"/>
-                        <a:t>decreaseFontSize</a:t>
-                      </a:r>
-                      <a:endParaRPr lang="en-US" sz="1400" baseline="0" dirty="0" smtClean="0"/>
-                    </a:p>
-                    <a:p>
-                      <a:pPr algn="just"/>
-                      <a:r>
-                        <a:rPr lang="en-US" sz="1400" baseline="0" dirty="0" smtClean="0"/>
-                        <a:t>+ </a:t>
-                      </a:r>
-                      <a:r>
-                        <a:rPr lang="en-US" sz="1400" baseline="0" dirty="0" err="1" smtClean="0"/>
-                        <a:t>resetFontSize</a:t>
-                      </a:r>
-                      <a:endParaRPr lang="en-US" sz="1400" dirty="0" smtClean="0"/>
-                    </a:p>
-                  </a:txBody>
-                  <a:tcPr/>
-                </a:tc>
-              </a:tr>
-            </a:tbl>
-          </a:graphicData>
-        </a:graphic>
-      </p:graphicFrame>
-      <p:graphicFrame>
-        <p:nvGraphicFramePr>
-          <p:cNvPr id="23" name="Table 22"/>
-          <p:cNvGraphicFramePr>
-            <a:graphicFrameLocks noGrp="1"/>
-          </p:cNvGraphicFramePr>
-          <p:nvPr>
-            <p:extLst>
-              <p:ext uri="{D42A27DB-BD31-4B8C-83A1-F6EECF244321}">
-                <p14:modId xmlns:p14="http://schemas.microsoft.com/office/powerpoint/2010/main" val="1782499473"/>
-              </p:ext>
-            </p:extLst>
-          </p:nvPr>
-        </p:nvGraphicFramePr>
-        <p:xfrm>
-          <a:off x="5960348" y="734700"/>
-          <a:ext cx="2284070" cy="1473200"/>
-        </p:xfrm>
-        <a:graphic>
-          <a:graphicData uri="http://schemas.openxmlformats.org/drawingml/2006/table">
-            <a:tbl>
-              <a:tblPr firstRow="1" bandRow="1">
-                <a:tableStyleId>{5C22544A-7EE6-4342-B048-85BDC9FD1C3A}</a:tableStyleId>
-              </a:tblPr>
-              <a:tblGrid>
-                <a:gridCol w="2284070"/>
-              </a:tblGrid>
-              <a:tr h="370840">
-                <a:tc>
-                  <a:txBody>
-                    <a:bodyPr/>
-                    <a:lstStyle/>
-                    <a:p>
-                      <a:pPr algn="just"/>
-                      <a:r>
-                        <a:rPr lang="en-US" sz="1400" dirty="0" err="1" smtClean="0"/>
-                        <a:t>MainWindow</a:t>
-                      </a:r>
-                      <a:endParaRPr lang="en-US" sz="1400" dirty="0"/>
-                    </a:p>
-                  </a:txBody>
-                  <a:tcPr/>
-                </a:tc>
-              </a:tr>
-              <a:tr h="370840">
-                <a:tc>
-                  <a:txBody>
-                    <a:bodyPr/>
-                    <a:lstStyle/>
-                    <a:p>
-                      <a:pPr algn="ctr"/>
-                      <a:r>
-                        <a:rPr lang="mr-IN" sz="1200" dirty="0" smtClean="0"/>
-                        <a:t>…</a:t>
-                      </a:r>
-                      <a:endParaRPr lang="en-US" sz="1200" dirty="0"/>
-                    </a:p>
-                  </a:txBody>
-                  <a:tcPr/>
-                </a:tc>
-              </a:tr>
-              <a:tr h="370840">
-                <a:tc>
-                  <a:txBody>
-                    <a:bodyPr/>
-                    <a:lstStyle/>
-                    <a:p>
-                      <a:pPr algn="just"/>
-                      <a:r>
-                        <a:rPr lang="en-US" sz="1400" dirty="0" smtClean="0"/>
-                        <a:t>+ </a:t>
-                      </a:r>
-                      <a:r>
-                        <a:rPr lang="en-US" sz="1400" dirty="0" err="1" smtClean="0"/>
-                        <a:t>increaseFontSize</a:t>
-                      </a:r>
-                      <a:endParaRPr lang="en-US" sz="1400" dirty="0" smtClean="0"/>
-                    </a:p>
-                    <a:p>
-                      <a:pPr algn="just"/>
-                      <a:r>
-                        <a:rPr lang="en-US" sz="1400" dirty="0" smtClean="0"/>
-                        <a:t>+ </a:t>
-                      </a:r>
-                      <a:r>
-                        <a:rPr lang="en-US" sz="1400" dirty="0" err="1" smtClean="0"/>
-                        <a:t>decreaseFontSize</a:t>
-                      </a:r>
-                      <a:endParaRPr lang="en-US" sz="1400" dirty="0" smtClean="0"/>
-                    </a:p>
-                    <a:p>
-                      <a:pPr algn="just"/>
-                      <a:r>
-                        <a:rPr lang="en-US" sz="1400" dirty="0" smtClean="0"/>
-                        <a:t>+ </a:t>
-                      </a:r>
-                      <a:r>
-                        <a:rPr lang="en-US" sz="1400" dirty="0" err="1" smtClean="0"/>
-                        <a:t>resetFontSize</a:t>
-                      </a:r>
-                      <a:endParaRPr lang="en-US" sz="1400" dirty="0" smtClean="0"/>
-                    </a:p>
-                  </a:txBody>
-                  <a:tcPr/>
-                </a:tc>
-              </a:tr>
-            </a:tbl>
-          </a:graphicData>
-        </a:graphic>
-      </p:graphicFrame>
+            <a:r>
+              <a:rPr lang="en-US" dirty="0" smtClean="0"/>
+              <a:t>:</a:t>
+            </a:r>
+            <a:r>
+              <a:rPr lang="en-US" dirty="0" err="1" smtClean="0"/>
+              <a:t>EventsCenter</a:t>
+            </a:r>
+            <a:endParaRPr lang="en-US" dirty="0"/>
+          </a:p>
+        </p:txBody>
+      </p:sp>
       <p:cxnSp>
         <p:nvCxnSpPr>
-          <p:cNvPr id="24" name="Straight Arrow Connector 23"/>
+          <p:cNvPr id="52" name="Straight Connector 51"/>
           <p:cNvCxnSpPr/>
           <p:nvPr/>
         </p:nvCxnSpPr>
         <p:spPr>
           <a:xfrm>
-            <a:off x="7102383" y="2207900"/>
-            <a:ext cx="0" cy="332160"/>
+            <a:off x="4802312" y="952315"/>
+            <a:ext cx="0" cy="5719387"/>
+          </a:xfrm>
+          <a:prstGeom prst="line">
+            <a:avLst/>
+          </a:prstGeom>
+        </p:spPr>
+        <p:style>
+          <a:lnRef idx="1">
+            <a:schemeClr val="accent6"/>
+          </a:lnRef>
+          <a:fillRef idx="0">
+            <a:schemeClr val="accent6"/>
+          </a:fillRef>
+          <a:effectRef idx="0">
+            <a:schemeClr val="accent6"/>
+          </a:effectRef>
+          <a:fontRef idx="minor">
+            <a:schemeClr val="tx1"/>
+          </a:fontRef>
+        </p:style>
+      </p:cxnSp>
+      <p:sp>
+        <p:nvSpPr>
+          <p:cNvPr id="53" name="Rectangle 52"/>
+          <p:cNvSpPr/>
+          <p:nvPr/>
+        </p:nvSpPr>
+        <p:spPr>
+          <a:xfrm>
+            <a:off x="4668860" y="1609344"/>
+            <a:ext cx="254883" cy="3596640"/>
+          </a:xfrm>
+          <a:prstGeom prst="rect">
+            <a:avLst/>
+          </a:prstGeom>
+        </p:spPr>
+        <p:style>
+          <a:lnRef idx="2">
+            <a:schemeClr val="accent6">
+              <a:shade val="50000"/>
+            </a:schemeClr>
+          </a:lnRef>
+          <a:fillRef idx="1">
+            <a:schemeClr val="accent6"/>
+          </a:fillRef>
+          <a:effectRef idx="0">
+            <a:schemeClr val="accent6"/>
+          </a:effectRef>
+          <a:fontRef idx="minor">
+            <a:schemeClr val="lt1"/>
+          </a:fontRef>
+        </p:style>
+        <p:txBody>
+          <a:bodyPr rtlCol="0" anchor="ctr"/>
+          <a:lstStyle/>
+          <a:p>
+            <a:pPr algn="ctr"/>
+            <a:endParaRPr lang="en-US"/>
+          </a:p>
+        </p:txBody>
+      </p:sp>
+      <p:sp>
+        <p:nvSpPr>
+          <p:cNvPr id="58" name="Rectangle 57"/>
+          <p:cNvSpPr/>
+          <p:nvPr/>
+        </p:nvSpPr>
+        <p:spPr>
+          <a:xfrm>
+            <a:off x="9426259" y="1968638"/>
+            <a:ext cx="225972" cy="1042785"/>
+          </a:xfrm>
+          <a:prstGeom prst="rect">
+            <a:avLst/>
+          </a:prstGeom>
+        </p:spPr>
+        <p:style>
+          <a:lnRef idx="2">
+            <a:schemeClr val="accent1">
+              <a:shade val="50000"/>
+            </a:schemeClr>
+          </a:lnRef>
+          <a:fillRef idx="1">
+            <a:schemeClr val="accent1"/>
+          </a:fillRef>
+          <a:effectRef idx="0">
+            <a:schemeClr val="accent1"/>
+          </a:effectRef>
+          <a:fontRef idx="minor">
+            <a:schemeClr val="lt1"/>
+          </a:fontRef>
+        </p:style>
+        <p:txBody>
+          <a:bodyPr rtlCol="0" anchor="ctr"/>
+          <a:lstStyle/>
+          <a:p>
+            <a:pPr algn="ctr"/>
+            <a:endParaRPr lang="en-US"/>
+          </a:p>
+        </p:txBody>
+      </p:sp>
+      <p:sp>
+        <p:nvSpPr>
+          <p:cNvPr id="61" name="Freeform 60"/>
+          <p:cNvSpPr/>
+          <p:nvPr/>
+        </p:nvSpPr>
+        <p:spPr>
+          <a:xfrm>
+            <a:off x="9665082" y="2084832"/>
+            <a:ext cx="195072" cy="731520"/>
+          </a:xfrm>
+          <a:custGeom>
+            <a:avLst/>
+            <a:gdLst>
+              <a:gd name="connsiteX0" fmla="*/ 0 w 195072"/>
+              <a:gd name="connsiteY0" fmla="*/ 0 h 731520"/>
+              <a:gd name="connsiteX1" fmla="*/ 195072 w 195072"/>
+              <a:gd name="connsiteY1" fmla="*/ 438912 h 731520"/>
+              <a:gd name="connsiteX2" fmla="*/ 0 w 195072"/>
+              <a:gd name="connsiteY2" fmla="*/ 731520 h 731520"/>
+            </a:gdLst>
+            <a:ahLst/>
+            <a:cxnLst>
+              <a:cxn ang="0">
+                <a:pos x="connsiteX0" y="connsiteY0"/>
+              </a:cxn>
+              <a:cxn ang="0">
+                <a:pos x="connsiteX1" y="connsiteY1"/>
+              </a:cxn>
+              <a:cxn ang="0">
+                <a:pos x="connsiteX2" y="connsiteY2"/>
+              </a:cxn>
+            </a:cxnLst>
+            <a:rect l="l" t="t" r="r" b="b"/>
+            <a:pathLst>
+              <a:path w="195072" h="731520">
+                <a:moveTo>
+                  <a:pt x="0" y="0"/>
+                </a:moveTo>
+                <a:cubicBezTo>
+                  <a:pt x="97536" y="158496"/>
+                  <a:pt x="195072" y="316992"/>
+                  <a:pt x="195072" y="438912"/>
+                </a:cubicBezTo>
+                <a:cubicBezTo>
+                  <a:pt x="195072" y="560832"/>
+                  <a:pt x="0" y="731520"/>
+                  <a:pt x="0" y="731520"/>
+                </a:cubicBezTo>
+              </a:path>
+            </a:pathLst>
+          </a:custGeom>
+          <a:noFill/>
+        </p:spPr>
+        <p:style>
+          <a:lnRef idx="2">
+            <a:schemeClr val="accent1">
+              <a:shade val="50000"/>
+            </a:schemeClr>
+          </a:lnRef>
+          <a:fillRef idx="1">
+            <a:schemeClr val="accent1"/>
+          </a:fillRef>
+          <a:effectRef idx="0">
+            <a:schemeClr val="accent1"/>
+          </a:effectRef>
+          <a:fontRef idx="minor">
+            <a:schemeClr val="lt1"/>
+          </a:fontRef>
+        </p:style>
+        <p:txBody>
+          <a:bodyPr rtlCol="0" anchor="ctr"/>
+          <a:lstStyle/>
+          <a:p>
+            <a:pPr algn="ctr"/>
+            <a:endParaRPr lang="en-US"/>
+          </a:p>
+        </p:txBody>
+      </p:sp>
+      <p:sp>
+        <p:nvSpPr>
+          <p:cNvPr id="62" name="Freeform 61"/>
+          <p:cNvSpPr/>
+          <p:nvPr/>
+        </p:nvSpPr>
+        <p:spPr>
+          <a:xfrm>
+            <a:off x="9628506" y="2766252"/>
+            <a:ext cx="97536" cy="111060"/>
+          </a:xfrm>
+          <a:custGeom>
+            <a:avLst/>
+            <a:gdLst>
+              <a:gd name="connsiteX0" fmla="*/ 36576 w 97536"/>
+              <a:gd name="connsiteY0" fmla="*/ 50100 h 111060"/>
+              <a:gd name="connsiteX1" fmla="*/ 48768 w 97536"/>
+              <a:gd name="connsiteY1" fmla="*/ 1332 h 111060"/>
+              <a:gd name="connsiteX2" fmla="*/ 0 w 97536"/>
+              <a:gd name="connsiteY2" fmla="*/ 74484 h 111060"/>
+              <a:gd name="connsiteX3" fmla="*/ 97536 w 97536"/>
+              <a:gd name="connsiteY3" fmla="*/ 111060 h 111060"/>
+            </a:gdLst>
+            <a:ahLst/>
+            <a:cxnLst>
+              <a:cxn ang="0">
+                <a:pos x="connsiteX0" y="connsiteY0"/>
+              </a:cxn>
+              <a:cxn ang="0">
+                <a:pos x="connsiteX1" y="connsiteY1"/>
+              </a:cxn>
+              <a:cxn ang="0">
+                <a:pos x="connsiteX2" y="connsiteY2"/>
+              </a:cxn>
+              <a:cxn ang="0">
+                <a:pos x="connsiteX3" y="connsiteY3"/>
+              </a:cxn>
+            </a:cxnLst>
+            <a:rect l="l" t="t" r="r" b="b"/>
+            <a:pathLst>
+              <a:path w="97536" h="111060">
+                <a:moveTo>
+                  <a:pt x="36576" y="50100"/>
+                </a:moveTo>
+                <a:cubicBezTo>
+                  <a:pt x="40640" y="33844"/>
+                  <a:pt x="62710" y="-7963"/>
+                  <a:pt x="48768" y="1332"/>
+                </a:cubicBezTo>
+                <a:cubicBezTo>
+                  <a:pt x="24384" y="17588"/>
+                  <a:pt x="0" y="74484"/>
+                  <a:pt x="0" y="74484"/>
+                </a:cubicBezTo>
+                <a:cubicBezTo>
+                  <a:pt x="81773" y="101742"/>
+                  <a:pt x="50163" y="87373"/>
+                  <a:pt x="97536" y="111060"/>
+                </a:cubicBezTo>
+              </a:path>
+            </a:pathLst>
+          </a:custGeom>
+          <a:noFill/>
+        </p:spPr>
+        <p:style>
+          <a:lnRef idx="2">
+            <a:schemeClr val="accent1">
+              <a:shade val="50000"/>
+            </a:schemeClr>
+          </a:lnRef>
+          <a:fillRef idx="1">
+            <a:schemeClr val="accent1"/>
+          </a:fillRef>
+          <a:effectRef idx="0">
+            <a:schemeClr val="accent1"/>
+          </a:effectRef>
+          <a:fontRef idx="minor">
+            <a:schemeClr val="lt1"/>
+          </a:fontRef>
+        </p:style>
+        <p:txBody>
+          <a:bodyPr rtlCol="0" anchor="ctr"/>
+          <a:lstStyle/>
+          <a:p>
+            <a:pPr algn="ctr"/>
+            <a:endParaRPr lang="en-US"/>
+          </a:p>
+        </p:txBody>
+      </p:sp>
+      <p:sp>
+        <p:nvSpPr>
+          <p:cNvPr id="63" name="TextBox 62"/>
+          <p:cNvSpPr txBox="1"/>
+          <p:nvPr/>
+        </p:nvSpPr>
+        <p:spPr>
+          <a:xfrm>
+            <a:off x="9835770" y="2058507"/>
+            <a:ext cx="2188715" cy="276999"/>
+          </a:xfrm>
+          <a:prstGeom prst="rect">
+            <a:avLst/>
+          </a:prstGeom>
+          <a:noFill/>
+        </p:spPr>
+        <p:txBody>
+          <a:bodyPr wrap="square" rtlCol="0">
+            <a:spAutoFit/>
+          </a:bodyPr>
+          <a:lstStyle/>
+          <a:p>
+            <a:r>
+              <a:rPr lang="en-US" sz="1200" dirty="0" err="1" smtClean="0"/>
+              <a:t>setFontSizeMultiplier</a:t>
+            </a:r>
+            <a:r>
+              <a:rPr lang="en-US" sz="1200" dirty="0" smtClean="0"/>
+              <a:t>(</a:t>
+            </a:r>
+            <a:r>
+              <a:rPr lang="en-US" sz="1200" dirty="0" err="1" smtClean="0"/>
+              <a:t>int</a:t>
+            </a:r>
+            <a:r>
+              <a:rPr lang="en-US" sz="1200" dirty="0"/>
+              <a:t> </a:t>
+            </a:r>
+            <a:r>
+              <a:rPr lang="en-US" sz="1200" dirty="0" err="1" smtClean="0"/>
+              <a:t>arg</a:t>
+            </a:r>
+            <a:r>
+              <a:rPr lang="en-US" sz="1200" dirty="0" smtClean="0"/>
+              <a:t>)</a:t>
+            </a:r>
+          </a:p>
+        </p:txBody>
+      </p:sp>
+      <p:sp>
+        <p:nvSpPr>
+          <p:cNvPr id="71" name="Rectangle 70"/>
+          <p:cNvSpPr/>
+          <p:nvPr/>
+        </p:nvSpPr>
+        <p:spPr>
+          <a:xfrm>
+            <a:off x="5581226" y="3581175"/>
+            <a:ext cx="2728059" cy="461665"/>
+          </a:xfrm>
+          <a:prstGeom prst="rect">
+            <a:avLst/>
+          </a:prstGeom>
+        </p:spPr>
+        <p:txBody>
+          <a:bodyPr wrap="square">
+            <a:spAutoFit/>
+          </a:bodyPr>
+          <a:lstStyle/>
+          <a:p>
+            <a:r>
+              <a:rPr lang="en-US" sz="1200" dirty="0" err="1" smtClean="0"/>
+              <a:t>setConnections</a:t>
+            </a:r>
+            <a:endParaRPr lang="en-US" sz="1200" dirty="0" smtClean="0"/>
+          </a:p>
+          <a:p>
+            <a:r>
+              <a:rPr lang="en-US" sz="1200" dirty="0" smtClean="0"/>
+              <a:t>(</a:t>
+            </a:r>
+            <a:r>
+              <a:rPr lang="en-US" sz="1200" dirty="0" err="1" smtClean="0"/>
+              <a:t>PersonListPanel</a:t>
+            </a:r>
+            <a:r>
+              <a:rPr lang="en-US" sz="1200" dirty="0" smtClean="0"/>
+              <a:t>/</a:t>
+            </a:r>
+            <a:r>
+              <a:rPr lang="en-US" sz="1200" dirty="0" err="1" smtClean="0"/>
+              <a:t>TaskListPanel</a:t>
+            </a:r>
+            <a:r>
+              <a:rPr lang="en-US" sz="1200" dirty="0" smtClean="0"/>
+              <a:t> </a:t>
+            </a:r>
+            <a:r>
+              <a:rPr lang="en-US" sz="1200" dirty="0" err="1"/>
+              <a:t>arg</a:t>
+            </a:r>
+            <a:r>
+              <a:rPr lang="en-US" sz="1200" dirty="0"/>
+              <a:t>)</a:t>
+            </a:r>
+          </a:p>
+        </p:txBody>
+      </p:sp>
+      <p:sp>
+        <p:nvSpPr>
+          <p:cNvPr id="72" name="Rectangle 71"/>
+          <p:cNvSpPr/>
+          <p:nvPr/>
+        </p:nvSpPr>
+        <p:spPr>
+          <a:xfrm>
+            <a:off x="9156840" y="3154465"/>
+            <a:ext cx="225972" cy="1042785"/>
+          </a:xfrm>
+          <a:prstGeom prst="rect">
+            <a:avLst/>
+          </a:prstGeom>
+        </p:spPr>
+        <p:style>
+          <a:lnRef idx="2">
+            <a:schemeClr val="accent1">
+              <a:shade val="50000"/>
+            </a:schemeClr>
+          </a:lnRef>
+          <a:fillRef idx="1">
+            <a:schemeClr val="accent1"/>
+          </a:fillRef>
+          <a:effectRef idx="0">
+            <a:schemeClr val="accent1"/>
+          </a:effectRef>
+          <a:fontRef idx="minor">
+            <a:schemeClr val="lt1"/>
+          </a:fontRef>
+        </p:style>
+        <p:txBody>
+          <a:bodyPr rtlCol="0" anchor="ctr"/>
+          <a:lstStyle/>
+          <a:p>
+            <a:pPr algn="ctr"/>
+            <a:endParaRPr lang="en-US"/>
+          </a:p>
+        </p:txBody>
+      </p:sp>
+      <p:grpSp>
+        <p:nvGrpSpPr>
+          <p:cNvPr id="76" name="Group 75"/>
+          <p:cNvGrpSpPr/>
+          <p:nvPr/>
+        </p:nvGrpSpPr>
+        <p:grpSpPr>
+          <a:xfrm flipH="1">
+            <a:off x="8779530" y="3284705"/>
+            <a:ext cx="326882" cy="653311"/>
+            <a:chOff x="8324158" y="3335551"/>
+            <a:chExt cx="231648" cy="792480"/>
+          </a:xfrm>
+        </p:grpSpPr>
+        <p:sp>
+          <p:nvSpPr>
+            <p:cNvPr id="73" name="Freeform 72"/>
+            <p:cNvSpPr/>
+            <p:nvPr/>
+          </p:nvSpPr>
+          <p:spPr>
+            <a:xfrm>
+              <a:off x="8360734" y="3335551"/>
+              <a:ext cx="195072" cy="731520"/>
+            </a:xfrm>
+            <a:custGeom>
+              <a:avLst/>
+              <a:gdLst>
+                <a:gd name="connsiteX0" fmla="*/ 0 w 195072"/>
+                <a:gd name="connsiteY0" fmla="*/ 0 h 731520"/>
+                <a:gd name="connsiteX1" fmla="*/ 195072 w 195072"/>
+                <a:gd name="connsiteY1" fmla="*/ 438912 h 731520"/>
+                <a:gd name="connsiteX2" fmla="*/ 0 w 195072"/>
+                <a:gd name="connsiteY2" fmla="*/ 731520 h 731520"/>
+              </a:gdLst>
+              <a:ahLst/>
+              <a:cxnLst>
+                <a:cxn ang="0">
+                  <a:pos x="connsiteX0" y="connsiteY0"/>
+                </a:cxn>
+                <a:cxn ang="0">
+                  <a:pos x="connsiteX1" y="connsiteY1"/>
+                </a:cxn>
+                <a:cxn ang="0">
+                  <a:pos x="connsiteX2" y="connsiteY2"/>
+                </a:cxn>
+              </a:cxnLst>
+              <a:rect l="l" t="t" r="r" b="b"/>
+              <a:pathLst>
+                <a:path w="195072" h="731520">
+                  <a:moveTo>
+                    <a:pt x="0" y="0"/>
+                  </a:moveTo>
+                  <a:cubicBezTo>
+                    <a:pt x="97536" y="158496"/>
+                    <a:pt x="195072" y="316992"/>
+                    <a:pt x="195072" y="438912"/>
+                  </a:cubicBezTo>
+                  <a:cubicBezTo>
+                    <a:pt x="195072" y="560832"/>
+                    <a:pt x="0" y="731520"/>
+                    <a:pt x="0" y="731520"/>
+                  </a:cubicBezTo>
+                </a:path>
+              </a:pathLst>
+            </a:custGeom>
+            <a:noFill/>
+          </p:spPr>
+          <p:style>
+            <a:lnRef idx="2">
+              <a:schemeClr val="accent1">
+                <a:shade val="50000"/>
+              </a:schemeClr>
+            </a:lnRef>
+            <a:fillRef idx="1">
+              <a:schemeClr val="accent1"/>
+            </a:fillRef>
+            <a:effectRef idx="0">
+              <a:schemeClr val="accent1"/>
+            </a:effectRef>
+            <a:fontRef idx="minor">
+              <a:schemeClr val="lt1"/>
+            </a:fontRef>
+          </p:style>
+          <p:txBody>
+            <a:bodyPr rtlCol="0" anchor="ctr"/>
+            <a:lstStyle/>
+            <a:p>
+              <a:pPr algn="ctr"/>
+              <a:endParaRPr lang="en-US"/>
+            </a:p>
+          </p:txBody>
+        </p:sp>
+        <p:sp>
+          <p:nvSpPr>
+            <p:cNvPr id="74" name="Freeform 73"/>
+            <p:cNvSpPr/>
+            <p:nvPr/>
+          </p:nvSpPr>
+          <p:spPr>
+            <a:xfrm>
+              <a:off x="8324158" y="4016971"/>
+              <a:ext cx="97536" cy="111060"/>
+            </a:xfrm>
+            <a:custGeom>
+              <a:avLst/>
+              <a:gdLst>
+                <a:gd name="connsiteX0" fmla="*/ 36576 w 97536"/>
+                <a:gd name="connsiteY0" fmla="*/ 50100 h 111060"/>
+                <a:gd name="connsiteX1" fmla="*/ 48768 w 97536"/>
+                <a:gd name="connsiteY1" fmla="*/ 1332 h 111060"/>
+                <a:gd name="connsiteX2" fmla="*/ 0 w 97536"/>
+                <a:gd name="connsiteY2" fmla="*/ 74484 h 111060"/>
+                <a:gd name="connsiteX3" fmla="*/ 97536 w 97536"/>
+                <a:gd name="connsiteY3" fmla="*/ 111060 h 111060"/>
+              </a:gdLst>
+              <a:ahLst/>
+              <a:cxnLst>
+                <a:cxn ang="0">
+                  <a:pos x="connsiteX0" y="connsiteY0"/>
+                </a:cxn>
+                <a:cxn ang="0">
+                  <a:pos x="connsiteX1" y="connsiteY1"/>
+                </a:cxn>
+                <a:cxn ang="0">
+                  <a:pos x="connsiteX2" y="connsiteY2"/>
+                </a:cxn>
+                <a:cxn ang="0">
+                  <a:pos x="connsiteX3" y="connsiteY3"/>
+                </a:cxn>
+              </a:cxnLst>
+              <a:rect l="l" t="t" r="r" b="b"/>
+              <a:pathLst>
+                <a:path w="97536" h="111060">
+                  <a:moveTo>
+                    <a:pt x="36576" y="50100"/>
+                  </a:moveTo>
+                  <a:cubicBezTo>
+                    <a:pt x="40640" y="33844"/>
+                    <a:pt x="62710" y="-7963"/>
+                    <a:pt x="48768" y="1332"/>
+                  </a:cubicBezTo>
+                  <a:cubicBezTo>
+                    <a:pt x="24384" y="17588"/>
+                    <a:pt x="0" y="74484"/>
+                    <a:pt x="0" y="74484"/>
+                  </a:cubicBezTo>
+                  <a:cubicBezTo>
+                    <a:pt x="81773" y="101742"/>
+                    <a:pt x="50163" y="87373"/>
+                    <a:pt x="97536" y="111060"/>
+                  </a:cubicBezTo>
+                </a:path>
+              </a:pathLst>
+            </a:custGeom>
+            <a:noFill/>
+          </p:spPr>
+          <p:style>
+            <a:lnRef idx="2">
+              <a:schemeClr val="accent1">
+                <a:shade val="50000"/>
+              </a:schemeClr>
+            </a:lnRef>
+            <a:fillRef idx="1">
+              <a:schemeClr val="accent1"/>
+            </a:fillRef>
+            <a:effectRef idx="0">
+              <a:schemeClr val="accent1"/>
+            </a:effectRef>
+            <a:fontRef idx="minor">
+              <a:schemeClr val="lt1"/>
+            </a:fontRef>
+          </p:style>
+          <p:txBody>
+            <a:bodyPr rtlCol="0" anchor="ctr"/>
+            <a:lstStyle/>
+            <a:p>
+              <a:pPr algn="ctr"/>
+              <a:endParaRPr lang="en-US"/>
+            </a:p>
+          </p:txBody>
+        </p:sp>
+      </p:grpSp>
+      <p:cxnSp>
+        <p:nvCxnSpPr>
+          <p:cNvPr id="78" name="Straight Arrow Connector 77"/>
+          <p:cNvCxnSpPr/>
+          <p:nvPr/>
+        </p:nvCxnSpPr>
+        <p:spPr>
+          <a:xfrm flipH="1">
+            <a:off x="4923743" y="4097551"/>
+            <a:ext cx="4244037" cy="0"/>
           </a:xfrm>
           <a:prstGeom prst="straightConnector1">
             <a:avLst/>
@@ -4467,802 +4617,42 @@
           </a:fontRef>
         </p:style>
       </p:cxnSp>
-      <p:cxnSp>
-        <p:nvCxnSpPr>
-          <p:cNvPr id="26" name="Straight Arrow Connector 25"/>
-          <p:cNvCxnSpPr/>
+      <p:sp>
+        <p:nvSpPr>
+          <p:cNvPr id="79" name="Rectangle 78"/>
+          <p:cNvSpPr/>
           <p:nvPr/>
-        </p:nvCxnSpPr>
-        <p:spPr>
-          <a:xfrm>
-            <a:off x="7102383" y="4013260"/>
-            <a:ext cx="80433" cy="609657"/>
-          </a:xfrm>
-          <a:prstGeom prst="straightConnector1">
-            <a:avLst/>
-          </a:prstGeom>
-          <a:ln>
-            <a:tailEnd type="triangle"/>
-          </a:ln>
-        </p:spPr>
-        <p:style>
-          <a:lnRef idx="1">
-            <a:schemeClr val="accent1"/>
-          </a:lnRef>
-          <a:fillRef idx="0">
-            <a:schemeClr val="accent1"/>
-          </a:fillRef>
-          <a:effectRef idx="0">
-            <a:schemeClr val="accent1"/>
-          </a:effectRef>
-          <a:fontRef idx="minor">
-            <a:schemeClr val="tx1"/>
-          </a:fontRef>
-        </p:style>
-      </p:cxnSp>
-      <p:sp>
-        <p:nvSpPr>
-          <p:cNvPr id="27" name="TextBox 26"/>
-          <p:cNvSpPr txBox="1"/>
-          <p:nvPr/>
-        </p:nvSpPr>
-        <p:spPr>
-          <a:xfrm>
-            <a:off x="474133" y="393564"/>
-            <a:ext cx="3463833" cy="276999"/>
+        </p:nvSpPr>
+        <p:spPr>
+          <a:xfrm>
+            <a:off x="5526347" y="4136290"/>
+            <a:ext cx="2894703" cy="276999"/>
           </a:xfrm>
           <a:prstGeom prst="rect">
             <a:avLst/>
           </a:prstGeom>
         </p:spPr>
-        <p:style>
-          <a:lnRef idx="2">
-            <a:schemeClr val="dk1"/>
-          </a:lnRef>
-          <a:fillRef idx="1">
-            <a:schemeClr val="lt1"/>
-          </a:fillRef>
-          <a:effectRef idx="0">
-            <a:schemeClr val="dk1"/>
-          </a:effectRef>
-          <a:fontRef idx="minor">
-            <a:schemeClr val="dk1"/>
-          </a:fontRef>
-        </p:style>
-        <p:txBody>
-          <a:bodyPr wrap="none" rtlCol="0">
+        <p:txBody>
+          <a:bodyPr wrap="none">
             <a:spAutoFit/>
           </a:bodyPr>
           <a:lstStyle/>
           <a:p>
             <a:r>
-              <a:rPr lang="en-US" sz="1200" dirty="0" smtClean="0"/>
-              <a:t>UML Class Diagram for Font Size Change </a:t>
-            </a:r>
-            <a:r>
-              <a:rPr lang="en-US" sz="1200" smtClean="0"/>
-              <a:t>Through </a:t>
-            </a:r>
-            <a:r>
-              <a:rPr lang="en-US" sz="1200" smtClean="0"/>
-              <a:t>CLI</a:t>
-            </a:r>
-            <a:endParaRPr lang="en-US" sz="1200" dirty="0"/>
-          </a:p>
-        </p:txBody>
-      </p:sp>
-      <p:graphicFrame>
-        <p:nvGraphicFramePr>
-          <p:cNvPr id="28" name="Table 27"/>
-          <p:cNvGraphicFramePr>
-            <a:graphicFrameLocks noGrp="1"/>
-          </p:cNvGraphicFramePr>
-          <p:nvPr>
-            <p:extLst>
-              <p:ext uri="{D42A27DB-BD31-4B8C-83A1-F6EECF244321}">
-                <p14:modId xmlns:p14="http://schemas.microsoft.com/office/powerpoint/2010/main" val="524193321"/>
-              </p:ext>
-            </p:extLst>
-          </p:nvPr>
-        </p:nvGraphicFramePr>
-        <p:xfrm>
-          <a:off x="9440369" y="2753420"/>
-          <a:ext cx="2123204" cy="1259840"/>
-        </p:xfrm>
-        <a:graphic>
-          <a:graphicData uri="http://schemas.openxmlformats.org/drawingml/2006/table">
-            <a:tbl>
-              <a:tblPr firstRow="1" bandRow="1">
-                <a:tableStyleId>{5C22544A-7EE6-4342-B048-85BDC9FD1C3A}</a:tableStyleId>
-              </a:tblPr>
-              <a:tblGrid>
-                <a:gridCol w="2123204"/>
-              </a:tblGrid>
-              <a:tr h="370840">
-                <a:tc>
-                  <a:txBody>
-                    <a:bodyPr/>
-                    <a:lstStyle/>
-                    <a:p>
-                      <a:pPr algn="just"/>
-                      <a:r>
-                        <a:rPr lang="en-US" sz="1400" dirty="0" err="1" smtClean="0"/>
-                        <a:t>TaskCard</a:t>
-                      </a:r>
-                      <a:endParaRPr lang="en-US" sz="1400" dirty="0"/>
-                    </a:p>
-                  </a:txBody>
-                  <a:tcPr/>
-                </a:tc>
-              </a:tr>
-              <a:tr h="370840">
-                <a:tc>
-                  <a:txBody>
-                    <a:bodyPr/>
-                    <a:lstStyle/>
-                    <a:p>
-                      <a:pPr marL="0" indent="0" algn="ctr">
-                        <a:buFontTx/>
-                        <a:buNone/>
-                      </a:pPr>
-                      <a:r>
-                        <a:rPr lang="mr-IN" sz="1400" dirty="0" smtClean="0"/>
-                        <a:t>…</a:t>
-                      </a:r>
-                      <a:endParaRPr lang="en-US" sz="1400" dirty="0"/>
-                    </a:p>
-                  </a:txBody>
-                  <a:tcPr/>
-                </a:tc>
-              </a:tr>
-              <a:tr h="370840">
-                <a:tc>
-                  <a:txBody>
-                    <a:bodyPr/>
-                    <a:lstStyle/>
-                    <a:p>
-                      <a:pPr algn="just"/>
-                      <a:r>
-                        <a:rPr lang="en-US" sz="1400" dirty="0" smtClean="0"/>
-                        <a:t>+ </a:t>
-                      </a:r>
-                      <a:r>
-                        <a:rPr lang="en-US" sz="1400" dirty="0" err="1" smtClean="0"/>
-                        <a:t>updateAttributeSizes</a:t>
-                      </a:r>
-                      <a:r>
-                        <a:rPr lang="en-US" sz="1400" dirty="0" smtClean="0"/>
-                        <a:t>()</a:t>
-                      </a:r>
-                    </a:p>
-                    <a:p>
-                      <a:pPr algn="ctr"/>
-                      <a:r>
-                        <a:rPr lang="mr-IN" sz="1400" dirty="0" smtClean="0"/>
-                        <a:t>…</a:t>
-                      </a:r>
-                      <a:endParaRPr lang="en-US" sz="1400" dirty="0"/>
-                    </a:p>
-                  </a:txBody>
-                  <a:tcPr/>
-                </a:tc>
-              </a:tr>
-            </a:tbl>
-          </a:graphicData>
-        </a:graphic>
-      </p:graphicFrame>
-      <p:graphicFrame>
-        <p:nvGraphicFramePr>
-          <p:cNvPr id="30" name="Table 29"/>
-          <p:cNvGraphicFramePr>
-            <a:graphicFrameLocks noGrp="1"/>
-          </p:cNvGraphicFramePr>
-          <p:nvPr>
-            <p:extLst>
-              <p:ext uri="{D42A27DB-BD31-4B8C-83A1-F6EECF244321}">
-                <p14:modId xmlns:p14="http://schemas.microsoft.com/office/powerpoint/2010/main" val="1264602240"/>
-              </p:ext>
-            </p:extLst>
-          </p:nvPr>
-        </p:nvGraphicFramePr>
-        <p:xfrm>
-          <a:off x="9279503" y="670563"/>
-          <a:ext cx="2284070" cy="1473200"/>
-        </p:xfrm>
-        <a:graphic>
-          <a:graphicData uri="http://schemas.openxmlformats.org/drawingml/2006/table">
-            <a:tbl>
-              <a:tblPr firstRow="1" bandRow="1">
-                <a:tableStyleId>{5C22544A-7EE6-4342-B048-85BDC9FD1C3A}</a:tableStyleId>
-              </a:tblPr>
-              <a:tblGrid>
-                <a:gridCol w="2284070"/>
-              </a:tblGrid>
-              <a:tr h="370840">
-                <a:tc>
-                  <a:txBody>
-                    <a:bodyPr/>
-                    <a:lstStyle/>
-                    <a:p>
-                      <a:pPr algn="just"/>
-                      <a:r>
-                        <a:rPr lang="en-US" sz="1600" dirty="0" err="1" smtClean="0"/>
-                        <a:t>TaskListPanel</a:t>
-                      </a:r>
-                      <a:endParaRPr lang="en-US" sz="1600" dirty="0"/>
-                    </a:p>
-                  </a:txBody>
-                  <a:tcPr/>
-                </a:tc>
-              </a:tr>
-              <a:tr h="370840">
-                <a:tc>
-                  <a:txBody>
-                    <a:bodyPr/>
-                    <a:lstStyle/>
-                    <a:p>
-                      <a:pPr algn="ctr"/>
-                      <a:r>
-                        <a:rPr lang="mr-IN" dirty="0" smtClean="0"/>
-                        <a:t>…</a:t>
-                      </a:r>
-                      <a:endParaRPr lang="en-US" dirty="0"/>
-                    </a:p>
-                  </a:txBody>
-                  <a:tcPr/>
-                </a:tc>
-              </a:tr>
-              <a:tr h="370840">
-                <a:tc>
-                  <a:txBody>
-                    <a:bodyPr/>
-                    <a:lstStyle/>
-                    <a:p>
-                      <a:pPr algn="just"/>
-                      <a:r>
-                        <a:rPr lang="en-US" sz="1400" dirty="0" smtClean="0"/>
-                        <a:t>+</a:t>
-                      </a:r>
-                      <a:r>
-                        <a:rPr lang="en-US" sz="1400" baseline="0" dirty="0" smtClean="0"/>
-                        <a:t> </a:t>
-                      </a:r>
-                      <a:r>
-                        <a:rPr lang="en-US" sz="1400" baseline="0" dirty="0" err="1" smtClean="0"/>
-                        <a:t>increaseFontSize</a:t>
-                      </a:r>
-                      <a:endParaRPr lang="en-US" sz="1400" baseline="0" dirty="0" smtClean="0"/>
-                    </a:p>
-                    <a:p>
-                      <a:pPr algn="just"/>
-                      <a:r>
-                        <a:rPr lang="en-US" sz="1400" baseline="0" dirty="0" smtClean="0"/>
-                        <a:t>+ </a:t>
-                      </a:r>
-                      <a:r>
-                        <a:rPr lang="en-US" sz="1400" baseline="0" dirty="0" err="1" smtClean="0"/>
-                        <a:t>decreaseFontSize</a:t>
-                      </a:r>
-                      <a:endParaRPr lang="en-US" sz="1400" baseline="0" dirty="0" smtClean="0"/>
-                    </a:p>
-                    <a:p>
-                      <a:pPr algn="just"/>
-                      <a:r>
-                        <a:rPr lang="en-US" sz="1400" baseline="0" dirty="0" smtClean="0"/>
-                        <a:t>+ </a:t>
-                      </a:r>
-                      <a:r>
-                        <a:rPr lang="en-US" sz="1400" baseline="0" dirty="0" err="1" smtClean="0"/>
-                        <a:t>resetFontSize</a:t>
-                      </a:r>
-                      <a:endParaRPr lang="en-US" sz="1400" dirty="0" smtClean="0"/>
-                    </a:p>
-                  </a:txBody>
-                  <a:tcPr/>
-                </a:tc>
-              </a:tr>
-            </a:tbl>
-          </a:graphicData>
-        </a:graphic>
-      </p:graphicFrame>
-      <p:cxnSp>
-        <p:nvCxnSpPr>
-          <p:cNvPr id="32" name="Straight Arrow Connector 31"/>
-          <p:cNvCxnSpPr>
-            <a:stCxn id="23" idx="3"/>
-            <a:endCxn id="30" idx="1"/>
-          </p:cNvCxnSpPr>
-          <p:nvPr/>
-        </p:nvCxnSpPr>
-        <p:spPr>
-          <a:xfrm flipV="1">
-            <a:off x="8244418" y="1407163"/>
-            <a:ext cx="1035085" cy="64137"/>
-          </a:xfrm>
-          <a:prstGeom prst="straightConnector1">
-            <a:avLst/>
-          </a:prstGeom>
-          <a:ln>
-            <a:tailEnd type="triangle"/>
-          </a:ln>
-        </p:spPr>
-        <p:style>
-          <a:lnRef idx="1">
-            <a:schemeClr val="accent1"/>
-          </a:lnRef>
-          <a:fillRef idx="0">
-            <a:schemeClr val="accent1"/>
-          </a:fillRef>
-          <a:effectRef idx="0">
-            <a:schemeClr val="accent1"/>
-          </a:effectRef>
-          <a:fontRef idx="minor">
-            <a:schemeClr val="tx1"/>
-          </a:fontRef>
-        </p:style>
-      </p:cxnSp>
-      <p:cxnSp>
-        <p:nvCxnSpPr>
-          <p:cNvPr id="37" name="Straight Arrow Connector 36"/>
-          <p:cNvCxnSpPr>
-            <a:stCxn id="30" idx="2"/>
-            <a:endCxn id="28" idx="0"/>
-          </p:cNvCxnSpPr>
-          <p:nvPr/>
-        </p:nvCxnSpPr>
-        <p:spPr>
-          <a:xfrm>
-            <a:off x="10421538" y="2143763"/>
-            <a:ext cx="80433" cy="609657"/>
-          </a:xfrm>
-          <a:prstGeom prst="straightConnector1">
-            <a:avLst/>
-          </a:prstGeom>
-          <a:ln>
-            <a:tailEnd type="triangle"/>
-          </a:ln>
-        </p:spPr>
-        <p:style>
-          <a:lnRef idx="1">
-            <a:schemeClr val="accent1"/>
-          </a:lnRef>
-          <a:fillRef idx="0">
-            <a:schemeClr val="accent1"/>
-          </a:fillRef>
-          <a:effectRef idx="0">
-            <a:schemeClr val="accent1"/>
-          </a:effectRef>
-          <a:fontRef idx="minor">
-            <a:schemeClr val="tx1"/>
-          </a:fontRef>
-        </p:style>
-      </p:cxnSp>
-      <p:graphicFrame>
-        <p:nvGraphicFramePr>
-          <p:cNvPr id="38" name="Table 37"/>
-          <p:cNvGraphicFramePr>
-            <a:graphicFrameLocks noGrp="1"/>
-          </p:cNvGraphicFramePr>
-          <p:nvPr>
-            <p:extLst>
-              <p:ext uri="{D42A27DB-BD31-4B8C-83A1-F6EECF244321}">
-                <p14:modId xmlns:p14="http://schemas.microsoft.com/office/powerpoint/2010/main" val="668056921"/>
-              </p:ext>
-            </p:extLst>
-          </p:nvPr>
-        </p:nvGraphicFramePr>
-        <p:xfrm>
-          <a:off x="760460" y="920652"/>
-          <a:ext cx="2284070" cy="1046480"/>
-        </p:xfrm>
-        <a:graphic>
-          <a:graphicData uri="http://schemas.openxmlformats.org/drawingml/2006/table">
-            <a:tbl>
-              <a:tblPr firstRow="1" bandRow="1">
-                <a:tableStyleId>{5C22544A-7EE6-4342-B048-85BDC9FD1C3A}</a:tableStyleId>
-              </a:tblPr>
-              <a:tblGrid>
-                <a:gridCol w="2284070"/>
-              </a:tblGrid>
-              <a:tr h="0">
-                <a:tc>
-                  <a:txBody>
-                    <a:bodyPr/>
-                    <a:lstStyle/>
-                    <a:p>
-                      <a:pPr algn="just"/>
-                      <a:r>
-                        <a:rPr lang="en-US" sz="1400" dirty="0" err="1" smtClean="0"/>
-                        <a:t>AddressBookParser</a:t>
-                      </a:r>
-                      <a:endParaRPr lang="en-US" sz="1400" dirty="0"/>
-                    </a:p>
-                  </a:txBody>
-                  <a:tcPr/>
-                </a:tc>
-              </a:tr>
-              <a:tr h="370840">
-                <a:tc>
-                  <a:txBody>
-                    <a:bodyPr/>
-                    <a:lstStyle/>
-                    <a:p>
-                      <a:pPr algn="ctr"/>
-                      <a:r>
-                        <a:rPr lang="mr-IN" sz="1400" dirty="0" smtClean="0"/>
-                        <a:t>…</a:t>
-                      </a:r>
-                      <a:endParaRPr lang="en-US" sz="1400" dirty="0"/>
-                    </a:p>
-                  </a:txBody>
-                  <a:tcPr/>
-                </a:tc>
-              </a:tr>
-              <a:tr h="370840">
-                <a:tc>
-                  <a:txBody>
-                    <a:bodyPr/>
-                    <a:lstStyle/>
-                    <a:p>
-                      <a:pPr algn="ctr"/>
-                      <a:r>
-                        <a:rPr lang="mr-IN" sz="1400" dirty="0" smtClean="0"/>
-                        <a:t>…</a:t>
-                      </a:r>
-                      <a:r>
-                        <a:rPr lang="en-US" sz="1400" dirty="0" smtClean="0"/>
-                        <a:t>.</a:t>
-                      </a:r>
-                    </a:p>
-                  </a:txBody>
-                  <a:tcPr/>
-                </a:tc>
-              </a:tr>
-            </a:tbl>
-          </a:graphicData>
-        </a:graphic>
-      </p:graphicFrame>
-      <p:graphicFrame>
-        <p:nvGraphicFramePr>
-          <p:cNvPr id="39" name="Table 38"/>
-          <p:cNvGraphicFramePr>
-            <a:graphicFrameLocks noGrp="1"/>
-          </p:cNvGraphicFramePr>
-          <p:nvPr>
-            <p:extLst>
-              <p:ext uri="{D42A27DB-BD31-4B8C-83A1-F6EECF244321}">
-                <p14:modId xmlns:p14="http://schemas.microsoft.com/office/powerpoint/2010/main" val="1956581898"/>
-              </p:ext>
-            </p:extLst>
-          </p:nvPr>
-        </p:nvGraphicFramePr>
-        <p:xfrm>
-          <a:off x="760460" y="2290515"/>
-          <a:ext cx="2284070" cy="1193800"/>
-        </p:xfrm>
-        <a:graphic>
-          <a:graphicData uri="http://schemas.openxmlformats.org/drawingml/2006/table">
-            <a:tbl>
-              <a:tblPr firstRow="1" bandRow="1">
-                <a:tableStyleId>{5C22544A-7EE6-4342-B048-85BDC9FD1C3A}</a:tableStyleId>
-              </a:tblPr>
-              <a:tblGrid>
-                <a:gridCol w="2284070"/>
-              </a:tblGrid>
-              <a:tr h="0">
-                <a:tc>
-                  <a:txBody>
-                    <a:bodyPr/>
-                    <a:lstStyle/>
-                    <a:p>
-                      <a:pPr algn="just"/>
-                      <a:r>
-                        <a:rPr lang="en-US" sz="1400" dirty="0" err="1" smtClean="0"/>
-                        <a:t>FontSizeCommand</a:t>
-                      </a:r>
-                      <a:endParaRPr lang="en-US" sz="1400" dirty="0"/>
-                    </a:p>
-                  </a:txBody>
-                  <a:tcPr/>
-                </a:tc>
-              </a:tr>
-              <a:tr h="370840">
-                <a:tc>
-                  <a:txBody>
-                    <a:bodyPr/>
-                    <a:lstStyle/>
-                    <a:p>
-                      <a:pPr algn="l"/>
-                      <a:r>
-                        <a:rPr lang="en-US" sz="1400" dirty="0" smtClean="0"/>
-                        <a:t>+</a:t>
-                      </a:r>
-                      <a:r>
-                        <a:rPr lang="en-US" sz="1400" baseline="0" dirty="0" smtClean="0"/>
-                        <a:t> option: String</a:t>
-                      </a:r>
-                    </a:p>
-                    <a:p>
-                      <a:pPr algn="ctr"/>
-                      <a:r>
-                        <a:rPr lang="mr-IN" sz="1400" baseline="0" dirty="0" smtClean="0"/>
-                        <a:t>…</a:t>
-                      </a:r>
-                      <a:r>
-                        <a:rPr lang="en-US" sz="1400" baseline="0" dirty="0" smtClean="0"/>
-                        <a:t>.</a:t>
-                      </a:r>
-                      <a:endParaRPr lang="en-US" sz="1400" dirty="0"/>
-                    </a:p>
-                  </a:txBody>
-                  <a:tcPr/>
-                </a:tc>
-              </a:tr>
-              <a:tr h="370840">
-                <a:tc>
-                  <a:txBody>
-                    <a:bodyPr/>
-                    <a:lstStyle/>
-                    <a:p>
-                      <a:pPr algn="l"/>
-                      <a:r>
-                        <a:rPr lang="en-US" sz="1400" dirty="0" smtClean="0"/>
-                        <a:t>+</a:t>
-                      </a:r>
-                      <a:r>
-                        <a:rPr lang="en-US" sz="1400" baseline="0" dirty="0" smtClean="0"/>
-                        <a:t> execute()</a:t>
-                      </a:r>
-                      <a:endParaRPr lang="en-US" sz="1400" dirty="0" smtClean="0"/>
-                    </a:p>
-                  </a:txBody>
-                  <a:tcPr/>
-                </a:tc>
-              </a:tr>
-            </a:tbl>
-          </a:graphicData>
-        </a:graphic>
-      </p:graphicFrame>
-      <p:cxnSp>
-        <p:nvCxnSpPr>
-          <p:cNvPr id="40" name="Straight Arrow Connector 39"/>
-          <p:cNvCxnSpPr>
-            <a:stCxn id="38" idx="2"/>
-            <a:endCxn id="39" idx="0"/>
-          </p:cNvCxnSpPr>
-          <p:nvPr/>
-        </p:nvCxnSpPr>
-        <p:spPr>
-          <a:xfrm>
-            <a:off x="1902495" y="1967132"/>
-            <a:ext cx="0" cy="323383"/>
-          </a:xfrm>
-          <a:prstGeom prst="straightConnector1">
-            <a:avLst/>
-          </a:prstGeom>
-          <a:ln>
-            <a:tailEnd type="triangle"/>
-          </a:ln>
-        </p:spPr>
-        <p:style>
-          <a:lnRef idx="1">
-            <a:schemeClr val="accent1"/>
-          </a:lnRef>
-          <a:fillRef idx="0">
-            <a:schemeClr val="accent1"/>
-          </a:fillRef>
-          <a:effectRef idx="0">
-            <a:schemeClr val="accent1"/>
-          </a:effectRef>
-          <a:fontRef idx="minor">
-            <a:schemeClr val="tx1"/>
-          </a:fontRef>
-        </p:style>
-      </p:cxnSp>
-      <p:graphicFrame>
-        <p:nvGraphicFramePr>
-          <p:cNvPr id="41" name="Table 40"/>
-          <p:cNvGraphicFramePr>
-            <a:graphicFrameLocks noGrp="1"/>
-          </p:cNvGraphicFramePr>
-          <p:nvPr>
-            <p:extLst>
-              <p:ext uri="{D42A27DB-BD31-4B8C-83A1-F6EECF244321}">
-                <p14:modId xmlns:p14="http://schemas.microsoft.com/office/powerpoint/2010/main" val="1582231474"/>
-              </p:ext>
-            </p:extLst>
-          </p:nvPr>
-        </p:nvGraphicFramePr>
-        <p:xfrm>
-          <a:off x="776667" y="4282696"/>
-          <a:ext cx="2284070" cy="1407160"/>
-        </p:xfrm>
-        <a:graphic>
-          <a:graphicData uri="http://schemas.openxmlformats.org/drawingml/2006/table">
-            <a:tbl>
-              <a:tblPr firstRow="1" bandRow="1">
-                <a:tableStyleId>{5C22544A-7EE6-4342-B048-85BDC9FD1C3A}</a:tableStyleId>
-              </a:tblPr>
-              <a:tblGrid>
-                <a:gridCol w="2284070"/>
-              </a:tblGrid>
-              <a:tr h="0">
-                <a:tc>
-                  <a:txBody>
-                    <a:bodyPr/>
-                    <a:lstStyle/>
-                    <a:p>
-                      <a:pPr algn="just"/>
-                      <a:r>
-                        <a:rPr lang="en-US" sz="1400" dirty="0" err="1" smtClean="0"/>
-                        <a:t>ModelManager</a:t>
-                      </a:r>
-                      <a:endParaRPr lang="en-US" sz="1400" dirty="0"/>
-                    </a:p>
-                  </a:txBody>
-                  <a:tcPr/>
-                </a:tc>
-              </a:tr>
-              <a:tr h="370840">
-                <a:tc>
-                  <a:txBody>
-                    <a:bodyPr/>
-                    <a:lstStyle/>
-                    <a:p>
-                      <a:pPr algn="ctr"/>
-                      <a:r>
-                        <a:rPr lang="mr-IN" sz="1400" baseline="0" dirty="0" smtClean="0"/>
-                        <a:t>…</a:t>
-                      </a:r>
-                      <a:r>
-                        <a:rPr lang="en-US" sz="1400" baseline="0" dirty="0" smtClean="0"/>
-                        <a:t>.</a:t>
-                      </a:r>
-                      <a:endParaRPr lang="en-US" sz="1400" dirty="0"/>
-                    </a:p>
-                  </a:txBody>
-                  <a:tcPr/>
-                </a:tc>
-              </a:tr>
-              <a:tr h="370840">
-                <a:tc>
-                  <a:txBody>
-                    <a:bodyPr/>
-                    <a:lstStyle/>
-                    <a:p>
-                      <a:pPr algn="l"/>
-                      <a:r>
-                        <a:rPr lang="en-US" sz="1400" dirty="0" smtClean="0"/>
-                        <a:t>+</a:t>
-                      </a:r>
-                      <a:r>
-                        <a:rPr lang="en-US" sz="1400" baseline="0" dirty="0" smtClean="0"/>
-                        <a:t> </a:t>
-                      </a:r>
-                      <a:r>
-                        <a:rPr lang="en-US" sz="1400" baseline="0" dirty="0" err="1" smtClean="0"/>
-                        <a:t>increaseFontSize</a:t>
-                      </a:r>
-                      <a:r>
-                        <a:rPr lang="en-US" sz="1400" baseline="0" dirty="0" smtClean="0"/>
-                        <a:t>()</a:t>
-                      </a:r>
-                    </a:p>
-                    <a:p>
-                      <a:pPr algn="l"/>
-                      <a:r>
-                        <a:rPr lang="en-US" sz="1400" baseline="0" dirty="0" smtClean="0"/>
-                        <a:t>+ </a:t>
-                      </a:r>
-                      <a:r>
-                        <a:rPr lang="en-US" sz="1400" baseline="0" dirty="0" err="1" smtClean="0"/>
-                        <a:t>decreaseFontSize</a:t>
-                      </a:r>
-                      <a:r>
-                        <a:rPr lang="en-US" sz="1400" baseline="0" dirty="0" smtClean="0"/>
-                        <a:t>()</a:t>
-                      </a:r>
-                    </a:p>
-                    <a:p>
-                      <a:pPr algn="l"/>
-                      <a:r>
-                        <a:rPr lang="en-US" sz="1400" baseline="0" dirty="0" smtClean="0"/>
-                        <a:t>+ </a:t>
-                      </a:r>
-                      <a:r>
-                        <a:rPr lang="en-US" sz="1400" baseline="0" dirty="0" err="1" smtClean="0"/>
-                        <a:t>resetFontSize</a:t>
-                      </a:r>
-                      <a:r>
-                        <a:rPr lang="en-US" sz="1400" baseline="0" dirty="0" smtClean="0"/>
-                        <a:t>()</a:t>
-                      </a:r>
-                      <a:endParaRPr lang="en-US" sz="1400" dirty="0" smtClean="0"/>
-                    </a:p>
-                  </a:txBody>
-                  <a:tcPr/>
-                </a:tc>
-              </a:tr>
-            </a:tbl>
-          </a:graphicData>
-        </a:graphic>
-      </p:graphicFrame>
-      <p:cxnSp>
-        <p:nvCxnSpPr>
-          <p:cNvPr id="42" name="Straight Arrow Connector 41"/>
-          <p:cNvCxnSpPr>
-            <a:stCxn id="39" idx="2"/>
-            <a:endCxn id="41" idx="0"/>
-          </p:cNvCxnSpPr>
-          <p:nvPr/>
-        </p:nvCxnSpPr>
-        <p:spPr>
-          <a:xfrm>
-            <a:off x="1902495" y="3484315"/>
-            <a:ext cx="16207" cy="798381"/>
-          </a:xfrm>
-          <a:prstGeom prst="straightConnector1">
-            <a:avLst/>
-          </a:prstGeom>
-          <a:ln>
-            <a:tailEnd type="triangle"/>
-          </a:ln>
-        </p:spPr>
-        <p:style>
-          <a:lnRef idx="1">
-            <a:schemeClr val="accent1"/>
-          </a:lnRef>
-          <a:fillRef idx="0">
-            <a:schemeClr val="accent1"/>
-          </a:fillRef>
-          <a:effectRef idx="0">
-            <a:schemeClr val="accent1"/>
-          </a:effectRef>
-          <a:fontRef idx="minor">
-            <a:schemeClr val="tx1"/>
-          </a:fontRef>
-        </p:style>
-      </p:cxnSp>
-      <p:cxnSp>
-        <p:nvCxnSpPr>
-          <p:cNvPr id="43" name="Straight Arrow Connector 42"/>
-          <p:cNvCxnSpPr>
-            <a:stCxn id="41" idx="3"/>
-            <a:endCxn id="23" idx="1"/>
-          </p:cNvCxnSpPr>
-          <p:nvPr/>
-        </p:nvCxnSpPr>
-        <p:spPr>
-          <a:xfrm flipV="1">
-            <a:off x="3060737" y="1471300"/>
-            <a:ext cx="2899611" cy="3514976"/>
-          </a:xfrm>
-          <a:prstGeom prst="straightConnector1">
-            <a:avLst/>
-          </a:prstGeom>
-          <a:ln>
-            <a:tailEnd type="triangle"/>
-          </a:ln>
-        </p:spPr>
-        <p:style>
-          <a:lnRef idx="1">
-            <a:schemeClr val="accent1"/>
-          </a:lnRef>
-          <a:fillRef idx="0">
-            <a:schemeClr val="accent1"/>
-          </a:fillRef>
-          <a:effectRef idx="0">
-            <a:schemeClr val="accent1"/>
-          </a:effectRef>
-          <a:fontRef idx="minor">
-            <a:schemeClr val="tx1"/>
-          </a:fontRef>
-        </p:style>
-      </p:cxnSp>
+              <a:rPr lang="en-US" sz="1200" dirty="0" err="1"/>
+              <a:t>setEventHandlerForSelectionChangeEvent</a:t>
+            </a:r>
+            <a:r>
+              <a:rPr lang="en-US" sz="1200" dirty="0"/>
+              <a:t>()</a:t>
+            </a:r>
+          </a:p>
+        </p:txBody>
+      </p:sp>
     </p:spTree>
     <p:extLst>
       <p:ext uri="{BB962C8B-B14F-4D97-AF65-F5344CB8AC3E}">
-        <p14:creationId xmlns:p14="http://schemas.microsoft.com/office/powerpoint/2010/main" val="318096514"/>
+        <p14:creationId xmlns:p14="http://schemas.microsoft.com/office/powerpoint/2010/main" val="358168963"/>
       </p:ext>
     </p:extLst>
   </p:cSld>

</xml_diff>